<commit_message>
final plots for arxiv submission
</commit_message>
<xml_diff>
--- a/plots/Fig2.pptx
+++ b/plots/Fig2.pptx
@@ -197,7 +197,7 @@
           <a:p>
             <a:fld id="{1E5698F5-DEA0-574B-8461-10AB5FBB4AF3}" type="datetimeFigureOut">
               <a:rPr lang="en-GB" smtClean="0"/>
-              <a:t>16/05/2022</a:t>
+              <a:t>18/05/2022</a:t>
             </a:fld>
             <a:endParaRPr lang="en-GB"/>
           </a:p>
@@ -679,7 +679,7 @@
           <a:p>
             <a:fld id="{68B74616-76D1-994D-8327-C5E87A869FBE}" type="datetimeFigureOut">
               <a:rPr lang="en-GB" smtClean="0"/>
-              <a:t>16/05/2022</a:t>
+              <a:t>18/05/2022</a:t>
             </a:fld>
             <a:endParaRPr lang="en-GB"/>
           </a:p>
@@ -849,7 +849,7 @@
           <a:p>
             <a:fld id="{68B74616-76D1-994D-8327-C5E87A869FBE}" type="datetimeFigureOut">
               <a:rPr lang="en-GB" smtClean="0"/>
-              <a:t>16/05/2022</a:t>
+              <a:t>18/05/2022</a:t>
             </a:fld>
             <a:endParaRPr lang="en-GB"/>
           </a:p>
@@ -1029,7 +1029,7 @@
           <a:p>
             <a:fld id="{68B74616-76D1-994D-8327-C5E87A869FBE}" type="datetimeFigureOut">
               <a:rPr lang="en-GB" smtClean="0"/>
-              <a:t>16/05/2022</a:t>
+              <a:t>18/05/2022</a:t>
             </a:fld>
             <a:endParaRPr lang="en-GB"/>
           </a:p>
@@ -1199,7 +1199,7 @@
           <a:p>
             <a:fld id="{68B74616-76D1-994D-8327-C5E87A869FBE}" type="datetimeFigureOut">
               <a:rPr lang="en-GB" smtClean="0"/>
-              <a:t>16/05/2022</a:t>
+              <a:t>18/05/2022</a:t>
             </a:fld>
             <a:endParaRPr lang="en-GB"/>
           </a:p>
@@ -1443,7 +1443,7 @@
           <a:p>
             <a:fld id="{68B74616-76D1-994D-8327-C5E87A869FBE}" type="datetimeFigureOut">
               <a:rPr lang="en-GB" smtClean="0"/>
-              <a:t>16/05/2022</a:t>
+              <a:t>18/05/2022</a:t>
             </a:fld>
             <a:endParaRPr lang="en-GB"/>
           </a:p>
@@ -1675,7 +1675,7 @@
           <a:p>
             <a:fld id="{68B74616-76D1-994D-8327-C5E87A869FBE}" type="datetimeFigureOut">
               <a:rPr lang="en-GB" smtClean="0"/>
-              <a:t>16/05/2022</a:t>
+              <a:t>18/05/2022</a:t>
             </a:fld>
             <a:endParaRPr lang="en-GB"/>
           </a:p>
@@ -2042,7 +2042,7 @@
           <a:p>
             <a:fld id="{68B74616-76D1-994D-8327-C5E87A869FBE}" type="datetimeFigureOut">
               <a:rPr lang="en-GB" smtClean="0"/>
-              <a:t>16/05/2022</a:t>
+              <a:t>18/05/2022</a:t>
             </a:fld>
             <a:endParaRPr lang="en-GB"/>
           </a:p>
@@ -2160,7 +2160,7 @@
           <a:p>
             <a:fld id="{68B74616-76D1-994D-8327-C5E87A869FBE}" type="datetimeFigureOut">
               <a:rPr lang="en-GB" smtClean="0"/>
-              <a:t>16/05/2022</a:t>
+              <a:t>18/05/2022</a:t>
             </a:fld>
             <a:endParaRPr lang="en-GB"/>
           </a:p>
@@ -2255,7 +2255,7 @@
           <a:p>
             <a:fld id="{68B74616-76D1-994D-8327-C5E87A869FBE}" type="datetimeFigureOut">
               <a:rPr lang="en-GB" smtClean="0"/>
-              <a:t>16/05/2022</a:t>
+              <a:t>18/05/2022</a:t>
             </a:fld>
             <a:endParaRPr lang="en-GB"/>
           </a:p>
@@ -2532,7 +2532,7 @@
           <a:p>
             <a:fld id="{68B74616-76D1-994D-8327-C5E87A869FBE}" type="datetimeFigureOut">
               <a:rPr lang="en-GB" smtClean="0"/>
-              <a:t>16/05/2022</a:t>
+              <a:t>18/05/2022</a:t>
             </a:fld>
             <a:endParaRPr lang="en-GB"/>
           </a:p>
@@ -2789,7 +2789,7 @@
           <a:p>
             <a:fld id="{68B74616-76D1-994D-8327-C5E87A869FBE}" type="datetimeFigureOut">
               <a:rPr lang="en-GB" smtClean="0"/>
-              <a:t>16/05/2022</a:t>
+              <a:t>18/05/2022</a:t>
             </a:fld>
             <a:endParaRPr lang="en-GB"/>
           </a:p>
@@ -3002,7 +3002,7 @@
           <a:p>
             <a:fld id="{68B74616-76D1-994D-8327-C5E87A869FBE}" type="datetimeFigureOut">
               <a:rPr lang="en-GB" smtClean="0"/>
-              <a:t>16/05/2022</a:t>
+              <a:t>18/05/2022</a:t>
             </a:fld>
             <a:endParaRPr lang="en-GB"/>
           </a:p>
@@ -3650,35 +3650,6 @@
           </a:prstGeom>
         </p:spPr>
       </p:pic>
-      <p:pic>
-        <p:nvPicPr>
-          <p:cNvPr id="16" name="Picture 15" descr="Chart&#10;&#10;Description automatically generated">
-            <a:extLst>
-              <a:ext uri="{FF2B5EF4-FFF2-40B4-BE49-F238E27FC236}">
-                <a16:creationId xmlns:a16="http://schemas.microsoft.com/office/drawing/2014/main" id="{395665B4-5626-AC46-98CD-1B371EF65CFA}"/>
-              </a:ext>
-            </a:extLst>
-          </p:cNvPr>
-          <p:cNvPicPr>
-            <a:picLocks noChangeAspect="1"/>
-          </p:cNvPicPr>
-          <p:nvPr/>
-        </p:nvPicPr>
-        <p:blipFill rotWithShape="1">
-          <a:blip r:embed="rId4"/>
-          <a:srcRect l="22730" t="8222" r="5022" b="18486"/>
-          <a:stretch/>
-        </p:blipFill>
-        <p:spPr>
-          <a:xfrm>
-            <a:off x="3023407" y="4969851"/>
-            <a:ext cx="3834088" cy="3889477"/>
-          </a:xfrm>
-          <a:prstGeom prst="rect">
-            <a:avLst/>
-          </a:prstGeom>
-        </p:spPr>
-      </p:pic>
       <p:sp>
         <p:nvSpPr>
           <p:cNvPr id="2" name="Rectangle 1">
@@ -3762,6 +3733,184 @@
       </p:pic>
       <p:pic>
         <p:nvPicPr>
+          <p:cNvPr id="18" name="Picture 17">
+            <a:extLst>
+              <a:ext uri="{FF2B5EF4-FFF2-40B4-BE49-F238E27FC236}">
+                <a16:creationId xmlns:a16="http://schemas.microsoft.com/office/drawing/2014/main" id="{7B038B35-EC17-2C55-C213-ADE7996DBD0C}"/>
+              </a:ext>
+            </a:extLst>
+          </p:cNvPr>
+          <p:cNvPicPr>
+            <a:picLocks noChangeAspect="1"/>
+          </p:cNvPicPr>
+          <p:nvPr/>
+        </p:nvPicPr>
+        <p:blipFill rotWithShape="1">
+          <a:blip r:embed="rId4"/>
+          <a:srcRect l="9230" r="1569"/>
+          <a:stretch/>
+        </p:blipFill>
+        <p:spPr>
+          <a:xfrm>
+            <a:off x="2466959" y="34730"/>
+            <a:ext cx="4341961" cy="4867567"/>
+          </a:xfrm>
+          <a:prstGeom prst="rect">
+            <a:avLst/>
+          </a:prstGeom>
+        </p:spPr>
+      </p:pic>
+      <p:pic>
+        <p:nvPicPr>
+          <p:cNvPr id="7" name="Picture 6" descr="Chart&#10;&#10;Description automatically generated">
+            <a:extLst>
+              <a:ext uri="{FF2B5EF4-FFF2-40B4-BE49-F238E27FC236}">
+                <a16:creationId xmlns:a16="http://schemas.microsoft.com/office/drawing/2014/main" id="{0C3A1F27-03F9-B967-0380-009202DEDFFE}"/>
+              </a:ext>
+            </a:extLst>
+          </p:cNvPr>
+          <p:cNvPicPr>
+            <a:picLocks noChangeAspect="1"/>
+          </p:cNvPicPr>
+          <p:nvPr/>
+        </p:nvPicPr>
+        <p:blipFill rotWithShape="1">
+          <a:blip r:embed="rId5"/>
+          <a:srcRect l="19032" t="5636" r="4165" b="15787"/>
+          <a:stretch/>
+        </p:blipFill>
+        <p:spPr>
+          <a:xfrm>
+            <a:off x="3044321" y="4806795"/>
+            <a:ext cx="3811435" cy="3899485"/>
+          </a:xfrm>
+          <a:prstGeom prst="rect">
+            <a:avLst/>
+          </a:prstGeom>
+        </p:spPr>
+      </p:pic>
+      <p:pic>
+        <p:nvPicPr>
+          <p:cNvPr id="20" name="Picture 19">
+            <a:extLst>
+              <a:ext uri="{FF2B5EF4-FFF2-40B4-BE49-F238E27FC236}">
+                <a16:creationId xmlns:a16="http://schemas.microsoft.com/office/drawing/2014/main" id="{502C0BE7-0DC8-7108-A431-71CFC1A2DE06}"/>
+              </a:ext>
+            </a:extLst>
+          </p:cNvPr>
+          <p:cNvPicPr>
+            <a:picLocks noChangeAspect="1"/>
+          </p:cNvPicPr>
+          <p:nvPr/>
+        </p:nvPicPr>
+        <p:blipFill>
+          <a:blip r:embed="rId6"/>
+          <a:stretch>
+            <a:fillRect/>
+          </a:stretch>
+        </p:blipFill>
+        <p:spPr>
+          <a:xfrm>
+            <a:off x="2788683" y="5754798"/>
+            <a:ext cx="255638" cy="242856"/>
+          </a:xfrm>
+          <a:prstGeom prst="rect">
+            <a:avLst/>
+          </a:prstGeom>
+        </p:spPr>
+      </p:pic>
+      <p:pic>
+        <p:nvPicPr>
+          <p:cNvPr id="28" name="Picture 27">
+            <a:extLst>
+              <a:ext uri="{FF2B5EF4-FFF2-40B4-BE49-F238E27FC236}">
+                <a16:creationId xmlns:a16="http://schemas.microsoft.com/office/drawing/2014/main" id="{6497B254-0030-2111-C3B9-A2BD927B0DD3}"/>
+              </a:ext>
+            </a:extLst>
+          </p:cNvPr>
+          <p:cNvPicPr>
+            <a:picLocks noChangeAspect="1"/>
+          </p:cNvPicPr>
+          <p:nvPr/>
+        </p:nvPicPr>
+        <p:blipFill>
+          <a:blip r:embed="rId7"/>
+          <a:stretch>
+            <a:fillRect/>
+          </a:stretch>
+        </p:blipFill>
+        <p:spPr>
+          <a:xfrm>
+            <a:off x="2683148" y="6756537"/>
+            <a:ext cx="361173" cy="242857"/>
+          </a:xfrm>
+          <a:prstGeom prst="rect">
+            <a:avLst/>
+          </a:prstGeom>
+        </p:spPr>
+      </p:pic>
+      <p:pic>
+        <p:nvPicPr>
+          <p:cNvPr id="30" name="Picture 29">
+            <a:extLst>
+              <a:ext uri="{FF2B5EF4-FFF2-40B4-BE49-F238E27FC236}">
+                <a16:creationId xmlns:a16="http://schemas.microsoft.com/office/drawing/2014/main" id="{56B924FF-0442-A5F6-BBD3-297789CF4635}"/>
+              </a:ext>
+            </a:extLst>
+          </p:cNvPr>
+          <p:cNvPicPr>
+            <a:picLocks noChangeAspect="1"/>
+          </p:cNvPicPr>
+          <p:nvPr/>
+        </p:nvPicPr>
+        <p:blipFill>
+          <a:blip r:embed="rId8"/>
+          <a:stretch>
+            <a:fillRect/>
+          </a:stretch>
+        </p:blipFill>
+        <p:spPr>
+          <a:xfrm>
+            <a:off x="2680037" y="7702696"/>
+            <a:ext cx="364284" cy="242856"/>
+          </a:xfrm>
+          <a:prstGeom prst="rect">
+            <a:avLst/>
+          </a:prstGeom>
+        </p:spPr>
+      </p:pic>
+      <p:pic>
+        <p:nvPicPr>
+          <p:cNvPr id="24" name="Picture 23">
+            <a:extLst>
+              <a:ext uri="{FF2B5EF4-FFF2-40B4-BE49-F238E27FC236}">
+                <a16:creationId xmlns:a16="http://schemas.microsoft.com/office/drawing/2014/main" id="{C9908C2B-5BF0-13B2-03EA-AB2FA3489D3C}"/>
+              </a:ext>
+            </a:extLst>
+          </p:cNvPr>
+          <p:cNvPicPr>
+            <a:picLocks noChangeAspect="1"/>
+          </p:cNvPicPr>
+          <p:nvPr/>
+        </p:nvPicPr>
+        <p:blipFill>
+          <a:blip r:embed="rId9"/>
+          <a:stretch>
+            <a:fillRect/>
+          </a:stretch>
+        </p:blipFill>
+        <p:spPr>
+          <a:xfrm>
+            <a:off x="2887814" y="4780869"/>
+            <a:ext cx="156507" cy="242856"/>
+          </a:xfrm>
+          <a:prstGeom prst="rect">
+            <a:avLst/>
+          </a:prstGeom>
+        </p:spPr>
+      </p:pic>
+      <p:pic>
+        <p:nvPicPr>
           <p:cNvPr id="6" name="Picture 5">
             <a:extLst>
               <a:ext uri="{FF2B5EF4-FFF2-40B4-BE49-F238E27FC236}">
@@ -3775,7 +3924,7 @@
           <p:nvPr/>
         </p:nvPicPr>
         <p:blipFill>
-          <a:blip r:embed="rId5"/>
+          <a:blip r:embed="rId10"/>
           <a:stretch>
             <a:fillRect/>
           </a:stretch>
@@ -3784,6 +3933,36 @@
           <a:xfrm>
             <a:off x="2171767" y="6425040"/>
             <a:ext cx="269656" cy="1277656"/>
+          </a:xfrm>
+          <a:prstGeom prst="rect">
+            <a:avLst/>
+          </a:prstGeom>
+        </p:spPr>
+      </p:pic>
+      <p:pic>
+        <p:nvPicPr>
+          <p:cNvPr id="17" name="Picture 16">
+            <a:extLst>
+              <a:ext uri="{FF2B5EF4-FFF2-40B4-BE49-F238E27FC236}">
+                <a16:creationId xmlns:a16="http://schemas.microsoft.com/office/drawing/2014/main" id="{6E60CFE5-1434-AFB9-CA33-6E0DAD671F89}"/>
+              </a:ext>
+            </a:extLst>
+          </p:cNvPr>
+          <p:cNvPicPr>
+            <a:picLocks noChangeAspect="1"/>
+          </p:cNvPicPr>
+          <p:nvPr/>
+        </p:nvPicPr>
+        <p:blipFill>
+          <a:blip r:embed="rId9"/>
+          <a:stretch>
+            <a:fillRect/>
+          </a:stretch>
+        </p:blipFill>
+        <p:spPr>
+          <a:xfrm>
+            <a:off x="3093418" y="8689125"/>
+            <a:ext cx="156507" cy="242856"/>
           </a:xfrm>
           <a:prstGeom prst="rect">
             <a:avLst/>
@@ -3805,6 +3984,36 @@
           <p:nvPr/>
         </p:nvPicPr>
         <p:blipFill>
+          <a:blip r:embed="rId11"/>
+          <a:stretch>
+            <a:fillRect/>
+          </a:stretch>
+        </p:blipFill>
+        <p:spPr>
+          <a:xfrm>
+            <a:off x="4319144" y="8949136"/>
+            <a:ext cx="1261788" cy="258666"/>
+          </a:xfrm>
+          <a:prstGeom prst="rect">
+            <a:avLst/>
+          </a:prstGeom>
+        </p:spPr>
+      </p:pic>
+      <p:pic>
+        <p:nvPicPr>
+          <p:cNvPr id="31" name="Picture 30">
+            <a:extLst>
+              <a:ext uri="{FF2B5EF4-FFF2-40B4-BE49-F238E27FC236}">
+                <a16:creationId xmlns:a16="http://schemas.microsoft.com/office/drawing/2014/main" id="{40619379-7200-DE5D-1402-4FBD5A3E1A13}"/>
+              </a:ext>
+            </a:extLst>
+          </p:cNvPr>
+          <p:cNvPicPr>
+            <a:picLocks noChangeAspect="1"/>
+          </p:cNvPicPr>
+          <p:nvPr/>
+        </p:nvPicPr>
+        <p:blipFill>
           <a:blip r:embed="rId6"/>
           <a:stretch>
             <a:fillRect/>
@@ -3812,8 +4021,8 @@
         </p:blipFill>
         <p:spPr>
           <a:xfrm>
-            <a:off x="4309557" y="9090476"/>
-            <a:ext cx="1261788" cy="258666"/>
+            <a:off x="3967626" y="8712398"/>
+            <a:ext cx="255638" cy="242856"/>
           </a:xfrm>
           <a:prstGeom prst="rect">
             <a:avLst/>
@@ -3822,10 +4031,10 @@
       </p:pic>
       <p:pic>
         <p:nvPicPr>
-          <p:cNvPr id="17" name="Picture 16">
+          <p:cNvPr id="32" name="Picture 31">
             <a:extLst>
               <a:ext uri="{FF2B5EF4-FFF2-40B4-BE49-F238E27FC236}">
-                <a16:creationId xmlns:a16="http://schemas.microsoft.com/office/drawing/2014/main" id="{6E60CFE5-1434-AFB9-CA33-6E0DAD671F89}"/>
+                <a16:creationId xmlns:a16="http://schemas.microsoft.com/office/drawing/2014/main" id="{D8B9CEC3-753F-81A5-F122-A9AD55D89539}"/>
               </a:ext>
             </a:extLst>
           </p:cNvPr>
@@ -3842,8 +4051,8 @@
         </p:blipFill>
         <p:spPr>
           <a:xfrm>
-            <a:off x="3025878" y="8847620"/>
-            <a:ext cx="156507" cy="242856"/>
+            <a:off x="4868705" y="8706280"/>
+            <a:ext cx="361173" cy="242857"/>
           </a:xfrm>
           <a:prstGeom prst="rect">
             <a:avLst/>
@@ -3852,10 +4061,10 @@
       </p:pic>
       <p:pic>
         <p:nvPicPr>
-          <p:cNvPr id="19" name="Picture 18">
+          <p:cNvPr id="33" name="Picture 32">
             <a:extLst>
               <a:ext uri="{FF2B5EF4-FFF2-40B4-BE49-F238E27FC236}">
-                <a16:creationId xmlns:a16="http://schemas.microsoft.com/office/drawing/2014/main" id="{4F2303C7-5E80-C5C2-82D7-21EB6B7AAC63}"/>
+                <a16:creationId xmlns:a16="http://schemas.microsoft.com/office/drawing/2014/main" id="{02346339-2803-8773-E5DF-5388E026FE73}"/>
               </a:ext>
             </a:extLst>
           </p:cNvPr>
@@ -3872,217 +4081,8 @@
         </p:blipFill>
         <p:spPr>
           <a:xfrm>
-            <a:off x="4029331" y="8859379"/>
-            <a:ext cx="253649" cy="221268"/>
-          </a:xfrm>
-          <a:prstGeom prst="rect">
-            <a:avLst/>
-          </a:prstGeom>
-        </p:spPr>
-      </p:pic>
-      <p:pic>
-        <p:nvPicPr>
-          <p:cNvPr id="21" name="Picture 20">
-            <a:extLst>
-              <a:ext uri="{FF2B5EF4-FFF2-40B4-BE49-F238E27FC236}">
-                <a16:creationId xmlns:a16="http://schemas.microsoft.com/office/drawing/2014/main" id="{31E9D2D9-19CE-32CE-EB80-F34B79EEA4BD}"/>
-              </a:ext>
-            </a:extLst>
-          </p:cNvPr>
-          <p:cNvPicPr>
-            <a:picLocks noChangeAspect="1"/>
-          </p:cNvPicPr>
-          <p:nvPr/>
-        </p:nvPicPr>
-        <p:blipFill>
-          <a:blip r:embed="rId9"/>
-          <a:stretch>
-            <a:fillRect/>
-          </a:stretch>
-        </p:blipFill>
-        <p:spPr>
-          <a:xfrm>
-            <a:off x="5044051" y="8837792"/>
-            <a:ext cx="350791" cy="242855"/>
-          </a:xfrm>
-          <a:prstGeom prst="rect">
-            <a:avLst/>
-          </a:prstGeom>
-        </p:spPr>
-      </p:pic>
-      <p:pic>
-        <p:nvPicPr>
-          <p:cNvPr id="23" name="Picture 22">
-            <a:extLst>
-              <a:ext uri="{FF2B5EF4-FFF2-40B4-BE49-F238E27FC236}">
-                <a16:creationId xmlns:a16="http://schemas.microsoft.com/office/drawing/2014/main" id="{A0E24072-BCC8-E9D8-9D40-28939FD791DD}"/>
-              </a:ext>
-            </a:extLst>
-          </p:cNvPr>
-          <p:cNvPicPr>
-            <a:picLocks noChangeAspect="1"/>
-          </p:cNvPicPr>
-          <p:nvPr/>
-        </p:nvPicPr>
-        <p:blipFill>
-          <a:blip r:embed="rId10"/>
-          <a:stretch>
-            <a:fillRect/>
-          </a:stretch>
-        </p:blipFill>
-        <p:spPr>
-          <a:xfrm>
-            <a:off x="6377070" y="8880940"/>
-            <a:ext cx="356188" cy="178094"/>
-          </a:xfrm>
-          <a:prstGeom prst="rect">
-            <a:avLst/>
-          </a:prstGeom>
-        </p:spPr>
-      </p:pic>
-      <p:pic>
-        <p:nvPicPr>
-          <p:cNvPr id="24" name="Picture 23">
-            <a:extLst>
-              <a:ext uri="{FF2B5EF4-FFF2-40B4-BE49-F238E27FC236}">
-                <a16:creationId xmlns:a16="http://schemas.microsoft.com/office/drawing/2014/main" id="{C9908C2B-5BF0-13B2-03EA-AB2FA3489D3C}"/>
-              </a:ext>
-            </a:extLst>
-          </p:cNvPr>
-          <p:cNvPicPr>
-            <a:picLocks noChangeAspect="1"/>
-          </p:cNvPicPr>
-          <p:nvPr/>
-        </p:nvPicPr>
-        <p:blipFill>
-          <a:blip r:embed="rId7"/>
-          <a:stretch>
-            <a:fillRect/>
-          </a:stretch>
-        </p:blipFill>
-        <p:spPr>
-          <a:xfrm>
-            <a:off x="2887814" y="4902348"/>
-            <a:ext cx="156507" cy="242856"/>
-          </a:xfrm>
-          <a:prstGeom prst="rect">
-            <a:avLst/>
-          </a:prstGeom>
-        </p:spPr>
-      </p:pic>
-      <p:pic>
-        <p:nvPicPr>
-          <p:cNvPr id="25" name="Picture 24">
-            <a:extLst>
-              <a:ext uri="{FF2B5EF4-FFF2-40B4-BE49-F238E27FC236}">
-                <a16:creationId xmlns:a16="http://schemas.microsoft.com/office/drawing/2014/main" id="{D6C3A612-5FDA-6518-55FD-2BB5C5A22110}"/>
-              </a:ext>
-            </a:extLst>
-          </p:cNvPr>
-          <p:cNvPicPr>
-            <a:picLocks noChangeAspect="1"/>
-          </p:cNvPicPr>
-          <p:nvPr/>
-        </p:nvPicPr>
-        <p:blipFill>
-          <a:blip r:embed="rId8"/>
-          <a:stretch>
-            <a:fillRect/>
-          </a:stretch>
-        </p:blipFill>
-        <p:spPr>
-          <a:xfrm>
-            <a:off x="2790672" y="5993902"/>
-            <a:ext cx="253649" cy="221268"/>
-          </a:xfrm>
-          <a:prstGeom prst="rect">
-            <a:avLst/>
-          </a:prstGeom>
-        </p:spPr>
-      </p:pic>
-      <p:pic>
-        <p:nvPicPr>
-          <p:cNvPr id="26" name="Picture 25">
-            <a:extLst>
-              <a:ext uri="{FF2B5EF4-FFF2-40B4-BE49-F238E27FC236}">
-                <a16:creationId xmlns:a16="http://schemas.microsoft.com/office/drawing/2014/main" id="{8667B3F6-0DA2-6E69-EB9C-E8648DDEBBA8}"/>
-              </a:ext>
-            </a:extLst>
-          </p:cNvPr>
-          <p:cNvPicPr>
-            <a:picLocks noChangeAspect="1"/>
-          </p:cNvPicPr>
-          <p:nvPr/>
-        </p:nvPicPr>
-        <p:blipFill>
-          <a:blip r:embed="rId9"/>
-          <a:stretch>
-            <a:fillRect/>
-          </a:stretch>
-        </p:blipFill>
-        <p:spPr>
-          <a:xfrm>
-            <a:off x="2672616" y="7063868"/>
-            <a:ext cx="350791" cy="242855"/>
-          </a:xfrm>
-          <a:prstGeom prst="rect">
-            <a:avLst/>
-          </a:prstGeom>
-        </p:spPr>
-      </p:pic>
-      <p:pic>
-        <p:nvPicPr>
-          <p:cNvPr id="27" name="Picture 26">
-            <a:extLst>
-              <a:ext uri="{FF2B5EF4-FFF2-40B4-BE49-F238E27FC236}">
-                <a16:creationId xmlns:a16="http://schemas.microsoft.com/office/drawing/2014/main" id="{07302FA2-9A9D-6A85-DD03-E6606FF9721D}"/>
-              </a:ext>
-            </a:extLst>
-          </p:cNvPr>
-          <p:cNvPicPr>
-            <a:picLocks noChangeAspect="1"/>
-          </p:cNvPicPr>
-          <p:nvPr/>
-        </p:nvPicPr>
-        <p:blipFill>
-          <a:blip r:embed="rId10"/>
-          <a:stretch>
-            <a:fillRect/>
-          </a:stretch>
-        </p:blipFill>
-        <p:spPr>
-          <a:xfrm>
-            <a:off x="2688133" y="8155421"/>
-            <a:ext cx="356188" cy="178094"/>
-          </a:xfrm>
-          <a:prstGeom prst="rect">
-            <a:avLst/>
-          </a:prstGeom>
-        </p:spPr>
-      </p:pic>
-      <p:pic>
-        <p:nvPicPr>
-          <p:cNvPr id="18" name="Picture 17">
-            <a:extLst>
-              <a:ext uri="{FF2B5EF4-FFF2-40B4-BE49-F238E27FC236}">
-                <a16:creationId xmlns:a16="http://schemas.microsoft.com/office/drawing/2014/main" id="{7B038B35-EC17-2C55-C213-ADE7996DBD0C}"/>
-              </a:ext>
-            </a:extLst>
-          </p:cNvPr>
-          <p:cNvPicPr>
-            <a:picLocks noChangeAspect="1"/>
-          </p:cNvPicPr>
-          <p:nvPr/>
-        </p:nvPicPr>
-        <p:blipFill rotWithShape="1">
-          <a:blip r:embed="rId11"/>
-          <a:srcRect l="9230" r="1569"/>
-          <a:stretch/>
-        </p:blipFill>
-        <p:spPr>
-          <a:xfrm>
-            <a:off x="2466959" y="34730"/>
-            <a:ext cx="4341961" cy="4867567"/>
+            <a:off x="5842044" y="8706280"/>
+            <a:ext cx="364284" cy="242856"/>
           </a:xfrm>
           <a:prstGeom prst="rect">
             <a:avLst/>

</xml_diff>

<commit_message>
update fig 2 pdf and pptx
</commit_message>
<xml_diff>
--- a/plots/Fig2.pptx
+++ b/plots/Fig2.pptx
@@ -1,22 +1,513 @@
 
 <file path=ppt/presentation.xml><?xml version="1.0" encoding="utf-8"?>
-<p:presentation xmlns:a="http://schemas.openxmlformats.org/drawingml/2006/main" xmlns:p="http://schemas.openxmlformats.org/presentationml/2006/main" xmlns:r="http://schemas.openxmlformats.org/officeDocument/2006/relationships" xmlns:p14="http://schemas.microsoft.com/office/powerpoint/2010/main" xmlns:p15="http://schemas.microsoft.com/office/powerpoint/2012/main" xmlns:mc="http://schemas.openxmlformats.org/markup-compatibility/2006">
+<p:presentation xmlns:a="http://schemas.openxmlformats.org/drawingml/2006/main" xmlns:r="http://schemas.openxmlformats.org/officeDocument/2006/relationships" xmlns:p="http://schemas.openxmlformats.org/presentationml/2006/main">
   <p:sldMasterIdLst>
-    <p:sldMasterId id="2147483648" r:id="rId2"/>
+    <p:sldMasterId id="2147483648" r:id="rId1"/>
   </p:sldMasterIdLst>
   <p:notesMasterIdLst>
     <p:notesMasterId r:id="rId3"/>
   </p:notesMasterIdLst>
   <p:sldIdLst>
-    <p:sldId id="256" r:id="rId4"/>
+    <p:sldId id="256" r:id="rId2"/>
   </p:sldIdLst>
-  <p:sldSz cx="6840538" cy="9720263"/>
+  <p:sldSz cx="9720263" cy="6840538"/>
   <p:notesSz cx="6858000" cy="9144000"/>
+  <p:defaultTextStyle>
+    <a:defPPr>
+      <a:defRPr lang="en-FI"/>
+    </a:defPPr>
+    <a:lvl1pPr marL="0" algn="l" defTabSz="914400" rtl="0" eaLnBrk="1" latinLnBrk="0" hangingPunct="1">
+      <a:defRPr sz="1800" kern="1200">
+        <a:solidFill>
+          <a:schemeClr val="tx1"/>
+        </a:solidFill>
+        <a:latin typeface="+mn-lt"/>
+        <a:ea typeface="+mn-ea"/>
+        <a:cs typeface="+mn-cs"/>
+      </a:defRPr>
+    </a:lvl1pPr>
+    <a:lvl2pPr marL="457200" algn="l" defTabSz="914400" rtl="0" eaLnBrk="1" latinLnBrk="0" hangingPunct="1">
+      <a:defRPr sz="1800" kern="1200">
+        <a:solidFill>
+          <a:schemeClr val="tx1"/>
+        </a:solidFill>
+        <a:latin typeface="+mn-lt"/>
+        <a:ea typeface="+mn-ea"/>
+        <a:cs typeface="+mn-cs"/>
+      </a:defRPr>
+    </a:lvl2pPr>
+    <a:lvl3pPr marL="914400" algn="l" defTabSz="914400" rtl="0" eaLnBrk="1" latinLnBrk="0" hangingPunct="1">
+      <a:defRPr sz="1800" kern="1200">
+        <a:solidFill>
+          <a:schemeClr val="tx1"/>
+        </a:solidFill>
+        <a:latin typeface="+mn-lt"/>
+        <a:ea typeface="+mn-ea"/>
+        <a:cs typeface="+mn-cs"/>
+      </a:defRPr>
+    </a:lvl3pPr>
+    <a:lvl4pPr marL="1371600" algn="l" defTabSz="914400" rtl="0" eaLnBrk="1" latinLnBrk="0" hangingPunct="1">
+      <a:defRPr sz="1800" kern="1200">
+        <a:solidFill>
+          <a:schemeClr val="tx1"/>
+        </a:solidFill>
+        <a:latin typeface="+mn-lt"/>
+        <a:ea typeface="+mn-ea"/>
+        <a:cs typeface="+mn-cs"/>
+      </a:defRPr>
+    </a:lvl4pPr>
+    <a:lvl5pPr marL="1828800" algn="l" defTabSz="914400" rtl="0" eaLnBrk="1" latinLnBrk="0" hangingPunct="1">
+      <a:defRPr sz="1800" kern="1200">
+        <a:solidFill>
+          <a:schemeClr val="tx1"/>
+        </a:solidFill>
+        <a:latin typeface="+mn-lt"/>
+        <a:ea typeface="+mn-ea"/>
+        <a:cs typeface="+mn-cs"/>
+      </a:defRPr>
+    </a:lvl5pPr>
+    <a:lvl6pPr marL="2286000" algn="l" defTabSz="914400" rtl="0" eaLnBrk="1" latinLnBrk="0" hangingPunct="1">
+      <a:defRPr sz="1800" kern="1200">
+        <a:solidFill>
+          <a:schemeClr val="tx1"/>
+        </a:solidFill>
+        <a:latin typeface="+mn-lt"/>
+        <a:ea typeface="+mn-ea"/>
+        <a:cs typeface="+mn-cs"/>
+      </a:defRPr>
+    </a:lvl6pPr>
+    <a:lvl7pPr marL="2743200" algn="l" defTabSz="914400" rtl="0" eaLnBrk="1" latinLnBrk="0" hangingPunct="1">
+      <a:defRPr sz="1800" kern="1200">
+        <a:solidFill>
+          <a:schemeClr val="tx1"/>
+        </a:solidFill>
+        <a:latin typeface="+mn-lt"/>
+        <a:ea typeface="+mn-ea"/>
+        <a:cs typeface="+mn-cs"/>
+      </a:defRPr>
+    </a:lvl7pPr>
+    <a:lvl8pPr marL="3200400" algn="l" defTabSz="914400" rtl="0" eaLnBrk="1" latinLnBrk="0" hangingPunct="1">
+      <a:defRPr sz="1800" kern="1200">
+        <a:solidFill>
+          <a:schemeClr val="tx1"/>
+        </a:solidFill>
+        <a:latin typeface="+mn-lt"/>
+        <a:ea typeface="+mn-ea"/>
+        <a:cs typeface="+mn-cs"/>
+      </a:defRPr>
+    </a:lvl8pPr>
+    <a:lvl9pPr marL="3657600" algn="l" defTabSz="914400" rtl="0" eaLnBrk="1" latinLnBrk="0" hangingPunct="1">
+      <a:defRPr sz="1800" kern="1200">
+        <a:solidFill>
+          <a:schemeClr val="tx1"/>
+        </a:solidFill>
+        <a:latin typeface="+mn-lt"/>
+        <a:ea typeface="+mn-ea"/>
+        <a:cs typeface="+mn-cs"/>
+      </a:defRPr>
+    </a:lvl9pPr>
+  </p:defaultTextStyle>
+  <p:extLst>
+    <p:ext uri="{EFAFB233-063F-42B5-8137-9DF3F51BA10A}">
+      <p15:sldGuideLst xmlns:p15="http://schemas.microsoft.com/office/powerpoint/2012/main">
+        <p15:guide id="1" orient="horz" pos="1724" userDrawn="1">
+          <p15:clr>
+            <a:srgbClr val="A4A3A4"/>
+          </p15:clr>
+        </p15:guide>
+        <p15:guide id="2" pos="3039" userDrawn="1">
+          <p15:clr>
+            <a:srgbClr val="A4A3A4"/>
+          </p15:clr>
+        </p15:guide>
+      </p15:sldGuideLst>
+    </p:ext>
+  </p:extLst>
 </p:presentation>
 </file>
 
 <file path=ppt/notesMasters/notesMaster1.xml><?xml version="1.0" encoding="utf-8"?>
-<p:notesMaster xmlns:a="http://schemas.openxmlformats.org/drawingml/2006/main" xmlns:p="http://schemas.openxmlformats.org/presentationml/2006/main" xmlns:r="http://schemas.openxmlformats.org/officeDocument/2006/relationships" xmlns:p14="http://schemas.microsoft.com/office/powerpoint/2010/main" xmlns:p15="http://schemas.microsoft.com/office/powerpoint/2012/main" xmlns:mc="http://schemas.openxmlformats.org/markup-compatibility/2006">
+<p:notesMaster xmlns:a="http://schemas.openxmlformats.org/drawingml/2006/main" xmlns:r="http://schemas.openxmlformats.org/officeDocument/2006/relationships" xmlns:p="http://schemas.openxmlformats.org/presentationml/2006/main">
+  <p:cSld>
+    <p:bg>
+      <p:bgRef idx="1001">
+        <a:schemeClr val="bg1"/>
+      </p:bgRef>
+    </p:bg>
+    <p:spTree>
+      <p:nvGrpSpPr>
+        <p:cNvPr id="1" name=""/>
+        <p:cNvGrpSpPr/>
+        <p:nvPr/>
+      </p:nvGrpSpPr>
+      <p:grpSpPr>
+        <a:xfrm>
+          <a:off x="0" y="0"/>
+          <a:ext cx="0" cy="0"/>
+          <a:chOff x="0" y="0"/>
+          <a:chExt cx="0" cy="0"/>
+        </a:xfrm>
+      </p:grpSpPr>
+      <p:sp>
+        <p:nvSpPr>
+          <p:cNvPr id="40" name="PlaceHolder 1"/>
+          <p:cNvSpPr>
+            <a:spLocks noGrp="1" noRot="1" noChangeAspect="1"/>
+          </p:cNvSpPr>
+          <p:nvPr>
+            <p:ph type="sldImg"/>
+          </p:nvPr>
+        </p:nvSpPr>
+        <p:spPr>
+          <a:xfrm>
+            <a:off x="931863" y="812800"/>
+            <a:ext cx="5695950" cy="4008438"/>
+          </a:xfrm>
+          <a:prstGeom prst="rect">
+            <a:avLst/>
+          </a:prstGeom>
+          <a:noFill/>
+          <a:ln w="0">
+            <a:noFill/>
+          </a:ln>
+        </p:spPr>
+        <p:txBody>
+          <a:bodyPr lIns="0" tIns="0" rIns="0" bIns="0" anchor="ctr">
+            <a:noAutofit/>
+          </a:bodyPr>
+          <a:lstStyle/>
+          <a:p>
+            <a:r>
+              <a:rPr lang="en-US" sz="1800" b="0" strike="noStrike" spc="-1">
+                <a:solidFill>
+                  <a:srgbClr val="000000"/>
+                </a:solidFill>
+                <a:latin typeface="Calibri"/>
+              </a:rPr>
+              <a:t>Click to move the slide</a:t>
+            </a:r>
+          </a:p>
+        </p:txBody>
+      </p:sp>
+      <p:sp>
+        <p:nvSpPr>
+          <p:cNvPr id="41" name="PlaceHolder 2"/>
+          <p:cNvSpPr>
+            <a:spLocks noGrp="1"/>
+          </p:cNvSpPr>
+          <p:nvPr>
+            <p:ph type="body"/>
+          </p:nvPr>
+        </p:nvSpPr>
+        <p:spPr>
+          <a:xfrm>
+            <a:off x="756000" y="5078520"/>
+            <a:ext cx="6047640" cy="4811040"/>
+          </a:xfrm>
+          <a:prstGeom prst="rect">
+            <a:avLst/>
+          </a:prstGeom>
+          <a:noFill/>
+          <a:ln w="0">
+            <a:noFill/>
+          </a:ln>
+        </p:spPr>
+        <p:txBody>
+          <a:bodyPr lIns="0" tIns="0" rIns="0" bIns="0" anchor="t">
+            <a:noAutofit/>
+          </a:bodyPr>
+          <a:lstStyle/>
+          <a:p>
+            <a:r>
+              <a:rPr lang="en-GB" sz="2000" b="0" strike="noStrike" spc="-1">
+                <a:latin typeface="Arial"/>
+              </a:rPr>
+              <a:t>Click to edit the notes' format</a:t>
+            </a:r>
+          </a:p>
+        </p:txBody>
+      </p:sp>
+      <p:sp>
+        <p:nvSpPr>
+          <p:cNvPr id="42" name="PlaceHolder 3"/>
+          <p:cNvSpPr>
+            <a:spLocks noGrp="1"/>
+          </p:cNvSpPr>
+          <p:nvPr>
+            <p:ph type="hdr"/>
+          </p:nvPr>
+        </p:nvSpPr>
+        <p:spPr>
+          <a:xfrm>
+            <a:off x="0" y="0"/>
+            <a:ext cx="3280680" cy="534240"/>
+          </a:xfrm>
+          <a:prstGeom prst="rect">
+            <a:avLst/>
+          </a:prstGeom>
+          <a:noFill/>
+          <a:ln w="0">
+            <a:noFill/>
+          </a:ln>
+        </p:spPr>
+        <p:txBody>
+          <a:bodyPr lIns="0" tIns="0" rIns="0" bIns="0" anchor="t">
+            <a:noAutofit/>
+          </a:bodyPr>
+          <a:lstStyle/>
+          <a:p>
+            <a:r>
+              <a:rPr lang="en-GB" sz="1400" b="0" strike="noStrike" spc="-1">
+                <a:latin typeface="Times New Roman"/>
+              </a:rPr>
+              <a:t>&lt;header&gt;</a:t>
+            </a:r>
+          </a:p>
+        </p:txBody>
+      </p:sp>
+      <p:sp>
+        <p:nvSpPr>
+          <p:cNvPr id="43" name="PlaceHolder 4"/>
+          <p:cNvSpPr>
+            <a:spLocks noGrp="1"/>
+          </p:cNvSpPr>
+          <p:nvPr>
+            <p:ph type="dt" idx="4"/>
+          </p:nvPr>
+        </p:nvSpPr>
+        <p:spPr>
+          <a:xfrm>
+            <a:off x="4278960" y="0"/>
+            <a:ext cx="3280680" cy="534240"/>
+          </a:xfrm>
+          <a:prstGeom prst="rect">
+            <a:avLst/>
+          </a:prstGeom>
+          <a:noFill/>
+          <a:ln w="0">
+            <a:noFill/>
+          </a:ln>
+        </p:spPr>
+        <p:txBody>
+          <a:bodyPr lIns="0" tIns="0" rIns="0" bIns="0" anchor="t">
+            <a:noAutofit/>
+          </a:bodyPr>
+          <a:lstStyle>
+            <a:lvl1pPr algn="r">
+              <a:buNone/>
+              <a:defRPr lang="en-GB" sz="1400" b="0" strike="noStrike" spc="-1">
+                <a:latin typeface="Times New Roman"/>
+              </a:defRPr>
+            </a:lvl1pPr>
+          </a:lstStyle>
+          <a:p>
+            <a:pPr algn="r">
+              <a:buNone/>
+            </a:pPr>
+            <a:r>
+              <a:rPr lang="en-GB" sz="1400" b="0" strike="noStrike" spc="-1">
+                <a:latin typeface="Times New Roman"/>
+              </a:rPr>
+              <a:t>&lt;date/time&gt;</a:t>
+            </a:r>
+          </a:p>
+        </p:txBody>
+      </p:sp>
+      <p:sp>
+        <p:nvSpPr>
+          <p:cNvPr id="44" name="PlaceHolder 5"/>
+          <p:cNvSpPr>
+            <a:spLocks noGrp="1"/>
+          </p:cNvSpPr>
+          <p:nvPr>
+            <p:ph type="ftr" idx="5"/>
+          </p:nvPr>
+        </p:nvSpPr>
+        <p:spPr>
+          <a:xfrm>
+            <a:off x="0" y="10157400"/>
+            <a:ext cx="3280680" cy="534240"/>
+          </a:xfrm>
+          <a:prstGeom prst="rect">
+            <a:avLst/>
+          </a:prstGeom>
+          <a:noFill/>
+          <a:ln w="0">
+            <a:noFill/>
+          </a:ln>
+        </p:spPr>
+        <p:txBody>
+          <a:bodyPr lIns="0" tIns="0" rIns="0" bIns="0" anchor="b">
+            <a:noAutofit/>
+          </a:bodyPr>
+          <a:lstStyle>
+            <a:lvl1pPr>
+              <a:defRPr lang="en-GB" sz="1400" b="0" strike="noStrike" spc="-1">
+                <a:latin typeface="Times New Roman"/>
+              </a:defRPr>
+            </a:lvl1pPr>
+          </a:lstStyle>
+          <a:p>
+            <a:r>
+              <a:rPr lang="en-GB" sz="1400" b="0" strike="noStrike" spc="-1">
+                <a:latin typeface="Times New Roman"/>
+              </a:rPr>
+              <a:t>&lt;footer&gt;</a:t>
+            </a:r>
+          </a:p>
+        </p:txBody>
+      </p:sp>
+      <p:sp>
+        <p:nvSpPr>
+          <p:cNvPr id="45" name="PlaceHolder 6"/>
+          <p:cNvSpPr>
+            <a:spLocks noGrp="1"/>
+          </p:cNvSpPr>
+          <p:nvPr>
+            <p:ph type="sldNum" idx="6"/>
+          </p:nvPr>
+        </p:nvSpPr>
+        <p:spPr>
+          <a:xfrm>
+            <a:off x="4278960" y="10157400"/>
+            <a:ext cx="3280680" cy="534240"/>
+          </a:xfrm>
+          <a:prstGeom prst="rect">
+            <a:avLst/>
+          </a:prstGeom>
+          <a:noFill/>
+          <a:ln w="0">
+            <a:noFill/>
+          </a:ln>
+        </p:spPr>
+        <p:txBody>
+          <a:bodyPr lIns="0" tIns="0" rIns="0" bIns="0" anchor="b">
+            <a:noAutofit/>
+          </a:bodyPr>
+          <a:lstStyle>
+            <a:lvl1pPr algn="r">
+              <a:buNone/>
+              <a:defRPr lang="en-GB" sz="1400" b="0" strike="noStrike" spc="-1">
+                <a:latin typeface="Times New Roman"/>
+              </a:defRPr>
+            </a:lvl1pPr>
+          </a:lstStyle>
+          <a:p>
+            <a:pPr algn="r">
+              <a:buNone/>
+            </a:pPr>
+            <a:fld id="{8C22031F-F6FB-4C15-94BE-41DE82E1C0A3}" type="slidenum">
+              <a:rPr lang="en-GB" sz="1400" b="0" strike="noStrike" spc="-1">
+                <a:latin typeface="Times New Roman"/>
+              </a:rPr>
+              <a:t>‹#›</a:t>
+            </a:fld>
+            <a:endParaRPr lang="en-GB" sz="1400" b="0" strike="noStrike" spc="-1">
+              <a:latin typeface="Times New Roman"/>
+            </a:endParaRPr>
+          </a:p>
+        </p:txBody>
+      </p:sp>
+    </p:spTree>
+  </p:cSld>
+  <p:clrMap bg1="lt1" tx1="dk1" bg2="lt2" tx2="dk2" accent1="accent1" accent2="accent2" accent3="accent3" accent4="accent4" accent5="accent5" accent6="accent6" hlink="hlink" folHlink="folHlink"/>
+  <p:notesStyle>
+    <a:lvl1pPr marL="0" algn="l" defTabSz="914400" rtl="0" eaLnBrk="1" latinLnBrk="0" hangingPunct="1">
+      <a:defRPr sz="1200" kern="1200">
+        <a:solidFill>
+          <a:schemeClr val="tx1"/>
+        </a:solidFill>
+        <a:latin typeface="+mn-lt"/>
+        <a:ea typeface="+mn-ea"/>
+        <a:cs typeface="+mn-cs"/>
+      </a:defRPr>
+    </a:lvl1pPr>
+    <a:lvl2pPr marL="457200" algn="l" defTabSz="914400" rtl="0" eaLnBrk="1" latinLnBrk="0" hangingPunct="1">
+      <a:defRPr sz="1200" kern="1200">
+        <a:solidFill>
+          <a:schemeClr val="tx1"/>
+        </a:solidFill>
+        <a:latin typeface="+mn-lt"/>
+        <a:ea typeface="+mn-ea"/>
+        <a:cs typeface="+mn-cs"/>
+      </a:defRPr>
+    </a:lvl2pPr>
+    <a:lvl3pPr marL="914400" algn="l" defTabSz="914400" rtl="0" eaLnBrk="1" latinLnBrk="0" hangingPunct="1">
+      <a:defRPr sz="1200" kern="1200">
+        <a:solidFill>
+          <a:schemeClr val="tx1"/>
+        </a:solidFill>
+        <a:latin typeface="+mn-lt"/>
+        <a:ea typeface="+mn-ea"/>
+        <a:cs typeface="+mn-cs"/>
+      </a:defRPr>
+    </a:lvl3pPr>
+    <a:lvl4pPr marL="1371600" algn="l" defTabSz="914400" rtl="0" eaLnBrk="1" latinLnBrk="0" hangingPunct="1">
+      <a:defRPr sz="1200" kern="1200">
+        <a:solidFill>
+          <a:schemeClr val="tx1"/>
+        </a:solidFill>
+        <a:latin typeface="+mn-lt"/>
+        <a:ea typeface="+mn-ea"/>
+        <a:cs typeface="+mn-cs"/>
+      </a:defRPr>
+    </a:lvl4pPr>
+    <a:lvl5pPr marL="1828800" algn="l" defTabSz="914400" rtl="0" eaLnBrk="1" latinLnBrk="0" hangingPunct="1">
+      <a:defRPr sz="1200" kern="1200">
+        <a:solidFill>
+          <a:schemeClr val="tx1"/>
+        </a:solidFill>
+        <a:latin typeface="+mn-lt"/>
+        <a:ea typeface="+mn-ea"/>
+        <a:cs typeface="+mn-cs"/>
+      </a:defRPr>
+    </a:lvl5pPr>
+    <a:lvl6pPr marL="2286000" algn="l" defTabSz="914400" rtl="0" eaLnBrk="1" latinLnBrk="0" hangingPunct="1">
+      <a:defRPr sz="1200" kern="1200">
+        <a:solidFill>
+          <a:schemeClr val="tx1"/>
+        </a:solidFill>
+        <a:latin typeface="+mn-lt"/>
+        <a:ea typeface="+mn-ea"/>
+        <a:cs typeface="+mn-cs"/>
+      </a:defRPr>
+    </a:lvl6pPr>
+    <a:lvl7pPr marL="2743200" algn="l" defTabSz="914400" rtl="0" eaLnBrk="1" latinLnBrk="0" hangingPunct="1">
+      <a:defRPr sz="1200" kern="1200">
+        <a:solidFill>
+          <a:schemeClr val="tx1"/>
+        </a:solidFill>
+        <a:latin typeface="+mn-lt"/>
+        <a:ea typeface="+mn-ea"/>
+        <a:cs typeface="+mn-cs"/>
+      </a:defRPr>
+    </a:lvl7pPr>
+    <a:lvl8pPr marL="3200400" algn="l" defTabSz="914400" rtl="0" eaLnBrk="1" latinLnBrk="0" hangingPunct="1">
+      <a:defRPr sz="1200" kern="1200">
+        <a:solidFill>
+          <a:schemeClr val="tx1"/>
+        </a:solidFill>
+        <a:latin typeface="+mn-lt"/>
+        <a:ea typeface="+mn-ea"/>
+        <a:cs typeface="+mn-cs"/>
+      </a:defRPr>
+    </a:lvl8pPr>
+    <a:lvl9pPr marL="3657600" algn="l" defTabSz="914400" rtl="0" eaLnBrk="1" latinLnBrk="0" hangingPunct="1">
+      <a:defRPr sz="1200" kern="1200">
+        <a:solidFill>
+          <a:schemeClr val="tx1"/>
+        </a:solidFill>
+        <a:latin typeface="+mn-lt"/>
+        <a:ea typeface="+mn-ea"/>
+        <a:cs typeface="+mn-cs"/>
+      </a:defRPr>
+    </a:lvl9pPr>
+  </p:notesStyle>
+</p:notesMaster>
+</file>
+
+<file path=ppt/notesSlides/notesSlide1.xml><?xml version="1.0" encoding="utf-8"?>
+<p:notes xmlns:a="http://schemas.openxmlformats.org/drawingml/2006/main" xmlns:r="http://schemas.openxmlformats.org/officeDocument/2006/relationships" xmlns:p="http://schemas.openxmlformats.org/presentationml/2006/main">
   <p:cSld>
     <p:spTree>
       <p:nvGrpSpPr>
@@ -34,9 +525,9 @@
       </p:grpSpPr>
       <p:sp>
         <p:nvSpPr>
-          <p:cNvPr id="40" name="PlaceHolder 1"/>
-          <p:cNvSpPr>
-            <a:spLocks noGrp="1"/>
+          <p:cNvPr id="64" name="PlaceHolder 1"/>
+          <p:cNvSpPr>
+            <a:spLocks noGrp="1" noRot="1" noChangeAspect="1"/>
           </p:cNvSpPr>
           <p:nvPr>
             <p:ph type="sldImg"/>
@@ -44,75 +535,47 @@
         </p:nvSpPr>
         <p:spPr>
           <a:xfrm>
-            <a:off x="216000" y="812520"/>
-            <a:ext cx="7127280" cy="4008960"/>
-          </a:xfrm>
-          <a:prstGeom prst="rect">
-            <a:avLst/>
-          </a:prstGeom>
-          <a:noFill/>
-          <a:ln w="0">
-            <a:noFill/>
-          </a:ln>
-        </p:spPr>
-        <p:txBody>
-          <a:bodyPr lIns="0" rIns="0" tIns="0" bIns="0" anchor="ctr">
+            <a:off x="1236663" y="1143000"/>
+            <a:ext cx="4384675" cy="3086100"/>
+          </a:xfrm>
+          <a:prstGeom prst="rect">
+            <a:avLst/>
+          </a:prstGeom>
+          <a:ln w="0">
+            <a:noFill/>
+          </a:ln>
+        </p:spPr>
+      </p:sp>
+      <p:sp>
+        <p:nvSpPr>
+          <p:cNvPr id="65" name="PlaceHolder 2"/>
+          <p:cNvSpPr>
+            <a:spLocks noGrp="1"/>
+          </p:cNvSpPr>
+          <p:nvPr>
+            <p:ph type="body"/>
+          </p:nvPr>
+        </p:nvSpPr>
+        <p:spPr>
+          <a:xfrm>
+            <a:off x="685800" y="4400640"/>
+            <a:ext cx="5486040" cy="3600000"/>
+          </a:xfrm>
+          <a:prstGeom prst="rect">
+            <a:avLst/>
+          </a:prstGeom>
+          <a:noFill/>
+          <a:ln w="0">
+            <a:noFill/>
+          </a:ln>
+        </p:spPr>
+        <p:txBody>
+          <a:bodyPr anchor="t">
             <a:noAutofit/>
           </a:bodyPr>
-          <a:p>
-            <a:r>
-              <a:rPr b="0" lang="en-US" sz="1800" spc="-1" strike="noStrike">
-                <a:solidFill>
-                  <a:srgbClr val="000000"/>
-                </a:solidFill>
-                <a:latin typeface="Calibri"/>
-              </a:rPr>
-              <a:t>Click to move the slide</a:t>
-            </a:r>
-            <a:endParaRPr b="0" lang="en-US" sz="1800" spc="-1" strike="noStrike">
-              <a:solidFill>
-                <a:srgbClr val="000000"/>
-              </a:solidFill>
-              <a:latin typeface="Calibri"/>
-            </a:endParaRPr>
-          </a:p>
-        </p:txBody>
-      </p:sp>
-      <p:sp>
-        <p:nvSpPr>
-          <p:cNvPr id="41" name="PlaceHolder 2"/>
-          <p:cNvSpPr>
-            <a:spLocks noGrp="1"/>
-          </p:cNvSpPr>
-          <p:nvPr>
-            <p:ph type="body"/>
-          </p:nvPr>
-        </p:nvSpPr>
-        <p:spPr>
-          <a:xfrm>
-            <a:off x="756000" y="5078520"/>
-            <a:ext cx="6047640" cy="4811040"/>
-          </a:xfrm>
-          <a:prstGeom prst="rect">
-            <a:avLst/>
-          </a:prstGeom>
-          <a:noFill/>
-          <a:ln w="0">
-            <a:noFill/>
-          </a:ln>
-        </p:spPr>
-        <p:txBody>
-          <a:bodyPr lIns="0" rIns="0" tIns="0" bIns="0" anchor="t">
-            <a:noAutofit/>
-          </a:bodyPr>
-          <a:p>
-            <a:r>
-              <a:rPr b="0" lang="en-GB" sz="2000" spc="-1" strike="noStrike">
-                <a:latin typeface="Arial"/>
-              </a:rPr>
-              <a:t>Click to edit the notes' format</a:t>
-            </a:r>
-            <a:endParaRPr b="0" lang="en-GB" sz="2000" spc="-1" strike="noStrike">
+          <a:lstStyle/>
+          <a:p>
+            <a:endParaRPr lang="en-GB" sz="2000" b="0" strike="noStrike" spc="-1">
               <a:latin typeface="Arial"/>
             </a:endParaRPr>
           </a:p>
@@ -120,337 +583,71 @@
       </p:sp>
       <p:sp>
         <p:nvSpPr>
-          <p:cNvPr id="42" name="PlaceHolder 3"/>
-          <p:cNvSpPr>
-            <a:spLocks noGrp="1"/>
-          </p:cNvSpPr>
-          <p:nvPr>
-            <p:ph type="hdr"/>
-          </p:nvPr>
-        </p:nvSpPr>
-        <p:spPr>
-          <a:xfrm>
-            <a:off x="0" y="0"/>
-            <a:ext cx="3280680" cy="534240"/>
-          </a:xfrm>
-          <a:prstGeom prst="rect">
-            <a:avLst/>
-          </a:prstGeom>
-          <a:noFill/>
-          <a:ln w="0">
-            <a:noFill/>
-          </a:ln>
-        </p:spPr>
-        <p:txBody>
-          <a:bodyPr lIns="0" rIns="0" tIns="0" bIns="0" anchor="t">
-            <a:noAutofit/>
-          </a:bodyPr>
-          <a:p>
-            <a:r>
-              <a:rPr b="0" lang="en-GB" sz="1400" spc="-1" strike="noStrike">
-                <a:latin typeface="Times New Roman"/>
-              </a:rPr>
-              <a:t>&lt;header&gt;</a:t>
-            </a:r>
-            <a:endParaRPr b="0" lang="en-GB" sz="1400" spc="-1" strike="noStrike">
-              <a:latin typeface="Times New Roman"/>
-            </a:endParaRPr>
-          </a:p>
-        </p:txBody>
-      </p:sp>
-      <p:sp>
-        <p:nvSpPr>
-          <p:cNvPr id="43" name="PlaceHolder 4"/>
-          <p:cNvSpPr>
-            <a:spLocks noGrp="1"/>
-          </p:cNvSpPr>
-          <p:nvPr>
-            <p:ph type="dt" idx="4"/>
-          </p:nvPr>
-        </p:nvSpPr>
-        <p:spPr>
-          <a:xfrm>
-            <a:off x="4278960" y="0"/>
-            <a:ext cx="3280680" cy="534240"/>
-          </a:xfrm>
-          <a:prstGeom prst="rect">
-            <a:avLst/>
-          </a:prstGeom>
-          <a:noFill/>
-          <a:ln w="0">
-            <a:noFill/>
-          </a:ln>
-        </p:spPr>
-        <p:txBody>
-          <a:bodyPr lIns="0" rIns="0" tIns="0" bIns="0" anchor="t">
+          <p:cNvPr id="66" name="PlaceHolder 3"/>
+          <p:cNvSpPr>
+            <a:spLocks noGrp="1"/>
+          </p:cNvSpPr>
+          <p:nvPr>
+            <p:ph type="sldNum" idx="7"/>
+          </p:nvPr>
+        </p:nvSpPr>
+        <p:spPr>
+          <a:xfrm>
+            <a:off x="3884760" y="8685360"/>
+            <a:ext cx="2971440" cy="458280"/>
+          </a:xfrm>
+          <a:prstGeom prst="rect">
+            <a:avLst/>
+          </a:prstGeom>
+          <a:noFill/>
+          <a:ln w="0">
+            <a:noFill/>
+          </a:ln>
+        </p:spPr>
+        <p:txBody>
+          <a:bodyPr anchor="b">
             <a:noAutofit/>
           </a:bodyPr>
           <a:lstStyle>
             <a:lvl1pPr algn="r">
-              <a:buNone/>
-              <a:defRPr b="0" lang="en-GB" sz="1400" spc="-1" strike="noStrike">
+              <a:lnSpc>
+                <a:spcPct val="100000"/>
+              </a:lnSpc>
+              <a:buNone/>
+              <a:defRPr lang="en-GB" sz="1200" b="0" strike="noStrike" spc="-1">
                 <a:latin typeface="Times New Roman"/>
               </a:defRPr>
             </a:lvl1pPr>
           </a:lstStyle>
           <a:p>
             <a:pPr algn="r">
+              <a:lnSpc>
+                <a:spcPct val="100000"/>
+              </a:lnSpc>
               <a:buNone/>
             </a:pPr>
-            <a:r>
-              <a:rPr b="0" lang="en-GB" sz="1400" spc="-1" strike="noStrike">
+            <a:fld id="{7FCA4C6C-D3F6-4288-BC3A-43658D732DC5}" type="slidenum">
+              <a:rPr lang="en-GB" sz="1200" b="0" strike="noStrike" spc="-1">
                 <a:latin typeface="Times New Roman"/>
               </a:rPr>
-              <a:t>&lt;date/time&gt;</a:t>
-            </a:r>
-            <a:endParaRPr b="0" lang="en-GB" sz="1400" spc="-1" strike="noStrike">
+              <a:t>1</a:t>
+            </a:fld>
+            <a:endParaRPr lang="en-GB" sz="1200" b="0" strike="noStrike" spc="-1">
               <a:latin typeface="Times New Roman"/>
             </a:endParaRPr>
           </a:p>
         </p:txBody>
       </p:sp>
-      <p:sp>
-        <p:nvSpPr>
-          <p:cNvPr id="44" name="PlaceHolder 5"/>
-          <p:cNvSpPr>
-            <a:spLocks noGrp="1"/>
-          </p:cNvSpPr>
-          <p:nvPr>
-            <p:ph type="ftr" idx="5"/>
-          </p:nvPr>
-        </p:nvSpPr>
-        <p:spPr>
-          <a:xfrm>
-            <a:off x="0" y="10157400"/>
-            <a:ext cx="3280680" cy="534240"/>
-          </a:xfrm>
-          <a:prstGeom prst="rect">
-            <a:avLst/>
-          </a:prstGeom>
-          <a:noFill/>
-          <a:ln w="0">
-            <a:noFill/>
-          </a:ln>
-        </p:spPr>
-        <p:txBody>
-          <a:bodyPr lIns="0" rIns="0" tIns="0" bIns="0" anchor="b">
-            <a:noAutofit/>
-          </a:bodyPr>
-          <a:lstStyle>
-            <a:lvl1pPr>
-              <a:defRPr b="0" lang="en-GB" sz="1400" spc="-1" strike="noStrike">
-                <a:latin typeface="Times New Roman"/>
-              </a:defRPr>
-            </a:lvl1pPr>
-          </a:lstStyle>
-          <a:p>
-            <a:r>
-              <a:rPr b="0" lang="en-GB" sz="1400" spc="-1" strike="noStrike">
-                <a:latin typeface="Times New Roman"/>
-              </a:rPr>
-              <a:t>&lt;footer&gt;</a:t>
-            </a:r>
-            <a:endParaRPr b="0" lang="en-GB" sz="1400" spc="-1" strike="noStrike">
-              <a:latin typeface="Times New Roman"/>
-            </a:endParaRPr>
-          </a:p>
-        </p:txBody>
-      </p:sp>
-      <p:sp>
-        <p:nvSpPr>
-          <p:cNvPr id="45" name="PlaceHolder 6"/>
-          <p:cNvSpPr>
-            <a:spLocks noGrp="1"/>
-          </p:cNvSpPr>
-          <p:nvPr>
-            <p:ph type="sldNum" idx="6"/>
-          </p:nvPr>
-        </p:nvSpPr>
-        <p:spPr>
-          <a:xfrm>
-            <a:off x="4278960" y="10157400"/>
-            <a:ext cx="3280680" cy="534240"/>
-          </a:xfrm>
-          <a:prstGeom prst="rect">
-            <a:avLst/>
-          </a:prstGeom>
-          <a:noFill/>
-          <a:ln w="0">
-            <a:noFill/>
-          </a:ln>
-        </p:spPr>
-        <p:txBody>
-          <a:bodyPr lIns="0" rIns="0" tIns="0" bIns="0" anchor="b">
-            <a:noAutofit/>
-          </a:bodyPr>
-          <a:lstStyle>
-            <a:lvl1pPr algn="r">
-              <a:buNone/>
-              <a:defRPr b="0" lang="en-GB" sz="1400" spc="-1" strike="noStrike">
-                <a:latin typeface="Times New Roman"/>
-              </a:defRPr>
-            </a:lvl1pPr>
-          </a:lstStyle>
-          <a:p>
-            <a:pPr algn="r">
-              <a:buNone/>
-            </a:pPr>
-            <a:fld id="{8C22031F-F6FB-4C15-94BE-41DE82E1C0A3}" type="slidenum">
-              <a:rPr b="0" lang="en-GB" sz="1400" spc="-1" strike="noStrike">
-                <a:latin typeface="Times New Roman"/>
-              </a:rPr>
-              <a:t>&lt;number&gt;</a:t>
-            </a:fld>
-            <a:endParaRPr b="0" lang="en-GB" sz="1400" spc="-1" strike="noStrike">
-              <a:latin typeface="Times New Roman"/>
-            </a:endParaRPr>
-          </a:p>
-        </p:txBody>
-      </p:sp>
     </p:spTree>
   </p:cSld>
-  <p:clrMap bg1="lt1" bg2="lt2" tx1="dk1" tx2="dk2" accent1="accent1" accent2="accent2" accent3="accent3" accent4="accent4" accent5="accent5" accent6="accent6" hlink="hlink" folHlink="folHlink"/>
-</p:notesMaster>
-</file>
-
-<file path=ppt/notesSlides/notesSlide1.xml><?xml version="1.0" encoding="utf-8"?>
-<p:notes xmlns:a="http://schemas.openxmlformats.org/drawingml/2006/main" xmlns:p="http://schemas.openxmlformats.org/presentationml/2006/main" xmlns:r="http://schemas.openxmlformats.org/officeDocument/2006/relationships" xmlns:p14="http://schemas.microsoft.com/office/powerpoint/2010/main" xmlns:p15="http://schemas.microsoft.com/office/powerpoint/2012/main" xmlns:mc="http://schemas.openxmlformats.org/markup-compatibility/2006">
-  <p:cSld>
-    <p:spTree>
-      <p:nvGrpSpPr>
-        <p:cNvPr id="1" name=""/>
-        <p:cNvGrpSpPr/>
-        <p:nvPr/>
-      </p:nvGrpSpPr>
-      <p:grpSpPr>
-        <a:xfrm>
-          <a:off x="0" y="0"/>
-          <a:ext cx="0" cy="0"/>
-          <a:chOff x="0" y="0"/>
-          <a:chExt cx="0" cy="0"/>
-        </a:xfrm>
-      </p:grpSpPr>
-      <p:sp>
-        <p:nvSpPr>
-          <p:cNvPr id="64" name="PlaceHolder 1"/>
-          <p:cNvSpPr>
-            <a:spLocks noGrp="1"/>
-          </p:cNvSpPr>
-          <p:nvPr>
-            <p:ph type="sldImg"/>
-          </p:nvPr>
-        </p:nvSpPr>
-        <p:spPr>
-          <a:xfrm>
-            <a:off x="2343240" y="1143000"/>
-            <a:ext cx="2171520" cy="3085920"/>
-          </a:xfrm>
-          <a:prstGeom prst="rect">
-            <a:avLst/>
-          </a:prstGeom>
-          <a:ln w="0">
-            <a:noFill/>
-          </a:ln>
-        </p:spPr>
-      </p:sp>
-      <p:sp>
-        <p:nvSpPr>
-          <p:cNvPr id="65" name="PlaceHolder 2"/>
-          <p:cNvSpPr>
-            <a:spLocks noGrp="1"/>
-          </p:cNvSpPr>
-          <p:nvPr>
-            <p:ph type="body"/>
-          </p:nvPr>
-        </p:nvSpPr>
-        <p:spPr>
-          <a:xfrm>
-            <a:off x="685800" y="4400640"/>
-            <a:ext cx="5486040" cy="3600000"/>
-          </a:xfrm>
-          <a:prstGeom prst="rect">
-            <a:avLst/>
-          </a:prstGeom>
-          <a:noFill/>
-          <a:ln w="0">
-            <a:noFill/>
-          </a:ln>
-        </p:spPr>
-        <p:txBody>
-          <a:bodyPr anchor="t">
-            <a:noAutofit/>
-          </a:bodyPr>
-          <a:p>
-            <a:endParaRPr b="0" lang="en-GB" sz="2000" spc="-1" strike="noStrike">
-              <a:latin typeface="Arial"/>
-            </a:endParaRPr>
-          </a:p>
-        </p:txBody>
-      </p:sp>
-      <p:sp>
-        <p:nvSpPr>
-          <p:cNvPr id="66" name="PlaceHolder 3"/>
-          <p:cNvSpPr>
-            <a:spLocks noGrp="1"/>
-          </p:cNvSpPr>
-          <p:nvPr>
-            <p:ph type="sldNum" idx="7"/>
-          </p:nvPr>
-        </p:nvSpPr>
-        <p:spPr>
-          <a:xfrm>
-            <a:off x="3884760" y="8685360"/>
-            <a:ext cx="2971440" cy="458280"/>
-          </a:xfrm>
-          <a:prstGeom prst="rect">
-            <a:avLst/>
-          </a:prstGeom>
-          <a:noFill/>
-          <a:ln w="0">
-            <a:noFill/>
-          </a:ln>
-        </p:spPr>
-        <p:txBody>
-          <a:bodyPr anchor="b">
-            <a:noAutofit/>
-          </a:bodyPr>
-          <a:lstStyle>
-            <a:lvl1pPr algn="r">
-              <a:lnSpc>
-                <a:spcPct val="100000"/>
-              </a:lnSpc>
-              <a:buNone/>
-              <a:defRPr b="0" lang="en-GB" sz="1200" spc="-1" strike="noStrike">
-                <a:latin typeface="Times New Roman"/>
-              </a:defRPr>
-            </a:lvl1pPr>
-          </a:lstStyle>
-          <a:p>
-            <a:pPr algn="r">
-              <a:lnSpc>
-                <a:spcPct val="100000"/>
-              </a:lnSpc>
-              <a:buNone/>
-            </a:pPr>
-            <a:fld id="{7FCA4C6C-D3F6-4288-BC3A-43658D732DC5}" type="slidenum">
-              <a:rPr b="0" lang="en-GB" sz="1200" spc="-1" strike="noStrike">
-                <a:latin typeface="Times New Roman"/>
-              </a:rPr>
-              <a:t>&lt;number&gt;</a:t>
-            </a:fld>
-            <a:endParaRPr b="0" lang="en-GB" sz="1200" spc="-1" strike="noStrike">
-              <a:latin typeface="Times New Roman"/>
-            </a:endParaRPr>
-          </a:p>
-        </p:txBody>
-      </p:sp>
-    </p:spTree>
-  </p:cSld>
+  <p:clrMapOvr>
+    <a:masterClrMapping/>
+  </p:clrMapOvr>
 </p:notes>
 </file>
 
 <file path=ppt/slideLayouts/slideLayout1.xml><?xml version="1.0" encoding="utf-8"?>
-<p:sldLayout xmlns:a="http://schemas.openxmlformats.org/drawingml/2006/main" xmlns:p="http://schemas.openxmlformats.org/presentationml/2006/main" xmlns:r="http://schemas.openxmlformats.org/officeDocument/2006/relationships" xmlns:p14="http://schemas.microsoft.com/office/powerpoint/2010/main" xmlns:p15="http://schemas.microsoft.com/office/powerpoint/2012/main" xmlns:mc="http://schemas.openxmlformats.org/markup-compatibility/2006" type="blank" preserve="1">
+<p:sldLayout xmlns:a="http://schemas.openxmlformats.org/drawingml/2006/main" xmlns:r="http://schemas.openxmlformats.org/officeDocument/2006/relationships" xmlns:p="http://schemas.openxmlformats.org/presentationml/2006/main" type="blank" preserve="1">
   <p:cSld name="Blank Slide">
     <p:spTree>
       <p:nvGrpSpPr>
@@ -479,6 +676,7 @@
         <p:spPr/>
         <p:txBody>
           <a:bodyPr/>
+          <a:lstStyle/>
           <a:p>
             <a:r>
               <a:t>Footer</a:t>
@@ -499,10 +697,12 @@
         <p:spPr/>
         <p:txBody>
           <a:bodyPr/>
+          <a:lstStyle/>
           <a:p>
             <a:fld id="{F2D37079-84A2-43D6-8002-84800B550DE0}" type="slidenum">
-              <a:t>&lt;#&gt;</a:t>
+              <a:t>‹#›</a:t>
             </a:fld>
+            <a:endParaRPr/>
           </a:p>
         </p:txBody>
       </p:sp>
@@ -519,21 +719,22 @@
         <p:spPr/>
         <p:txBody>
           <a:bodyPr/>
-          <a:p>
-            <a:r>
-              <a:rPr lang="en-GB"/>
-              <a:t/>
-            </a:r>
+          <a:lstStyle/>
+          <a:p>
+            <a:endParaRPr/>
           </a:p>
         </p:txBody>
       </p:sp>
     </p:spTree>
   </p:cSld>
+  <p:clrMapOvr>
+    <a:masterClrMapping/>
+  </p:clrMapOvr>
 </p:sldLayout>
 </file>
 
 <file path=ppt/slideLayouts/slideLayout10.xml><?xml version="1.0" encoding="utf-8"?>
-<p:sldLayout xmlns:a="http://schemas.openxmlformats.org/drawingml/2006/main" xmlns:p="http://schemas.openxmlformats.org/presentationml/2006/main" xmlns:r="http://schemas.openxmlformats.org/officeDocument/2006/relationships" xmlns:p14="http://schemas.microsoft.com/office/powerpoint/2010/main" xmlns:p15="http://schemas.microsoft.com/office/powerpoint/2012/main" xmlns:mc="http://schemas.openxmlformats.org/markup-compatibility/2006" type="objOverTx" preserve="1">
+<p:sldLayout xmlns:a="http://schemas.openxmlformats.org/drawingml/2006/main" xmlns:r="http://schemas.openxmlformats.org/officeDocument/2006/relationships" xmlns:p="http://schemas.openxmlformats.org/presentationml/2006/main" type="objOverTx" preserve="1">
   <p:cSld name="Title, Content over Content">
     <p:spTree>
       <p:nvGrpSpPr>
@@ -561,23 +762,24 @@
         </p:nvSpPr>
         <p:spPr>
           <a:xfrm>
-            <a:off x="513000" y="1590840"/>
-            <a:ext cx="5814000" cy="3383640"/>
-          </a:xfrm>
-          <a:prstGeom prst="rect">
-            <a:avLst/>
-          </a:prstGeom>
-          <a:noFill/>
-          <a:ln w="0">
-            <a:noFill/>
-          </a:ln>
-        </p:spPr>
-        <p:txBody>
-          <a:bodyPr lIns="0" rIns="0" tIns="0" bIns="0" anchor="ctr">
+            <a:off x="728962" y="1119538"/>
+            <a:ext cx="8261574" cy="2381203"/>
+          </a:xfrm>
+          <a:prstGeom prst="rect">
+            <a:avLst/>
+          </a:prstGeom>
+          <a:noFill/>
+          <a:ln w="0">
+            <a:noFill/>
+          </a:ln>
+        </p:spPr>
+        <p:txBody>
+          <a:bodyPr lIns="0" tIns="0" rIns="0" bIns="0" anchor="ctr">
             <a:noAutofit/>
           </a:bodyPr>
-          <a:p>
-            <a:endParaRPr b="0" lang="en-US" sz="1800" spc="-1" strike="noStrike">
+          <a:lstStyle/>
+          <a:p>
+            <a:endParaRPr lang="en-US" sz="1267" b="0" strike="noStrike" spc="-1">
               <a:solidFill>
                 <a:srgbClr val="000000"/>
               </a:solidFill>
@@ -598,21 +800,33 @@
         </p:nvSpPr>
         <p:spPr>
           <a:xfrm>
-            <a:off x="342000" y="2274480"/>
-            <a:ext cx="6155640" cy="2688840"/>
-          </a:xfrm>
-          <a:prstGeom prst="rect">
-            <a:avLst/>
-          </a:prstGeom>
-          <a:noFill/>
-          <a:ln w="0">
-            <a:noFill/>
-          </a:ln>
-        </p:spPr>
-        <p:txBody>
-          <a:bodyPr lIns="0" rIns="0" tIns="0" bIns="0" anchor="t">
+            <a:off x="485975" y="1600643"/>
+            <a:ext cx="8747037" cy="1892244"/>
+          </a:xfrm>
+          <a:prstGeom prst="rect">
+            <a:avLst/>
+          </a:prstGeom>
+          <a:noFill/>
+          <a:ln w="0">
+            <a:noFill/>
+          </a:ln>
+        </p:spPr>
+        <p:txBody>
+          <a:bodyPr lIns="0" tIns="0" rIns="0" bIns="0" anchor="t">
             <a:normAutofit/>
           </a:bodyPr>
+          <a:lstStyle>
+            <a:lvl1pPr>
+              <a:lnSpc>
+                <a:spcPct val="90000"/>
+              </a:lnSpc>
+              <a:spcBef>
+                <a:spcPts val="997"/>
+              </a:spcBef>
+              <a:buNone/>
+              <a:defRPr/>
+            </a:lvl1pPr>
+          </a:lstStyle>
           <a:p>
             <a:pPr>
               <a:lnSpc>
@@ -623,7 +837,7 @@
               </a:spcBef>
               <a:buNone/>
             </a:pPr>
-            <a:endParaRPr b="0" lang="en-US" sz="2090" spc="-1" strike="noStrike">
+            <a:endParaRPr lang="en-US" sz="1471" b="0" strike="noStrike" spc="-1">
               <a:solidFill>
                 <a:srgbClr val="000000"/>
               </a:solidFill>
@@ -644,21 +858,33 @@
         </p:nvSpPr>
         <p:spPr>
           <a:xfrm>
-            <a:off x="342000" y="5219280"/>
-            <a:ext cx="6155640" cy="2688840"/>
-          </a:xfrm>
-          <a:prstGeom prst="rect">
-            <a:avLst/>
-          </a:prstGeom>
-          <a:noFill/>
-          <a:ln w="0">
-            <a:noFill/>
-          </a:ln>
-        </p:spPr>
-        <p:txBody>
-          <a:bodyPr lIns="0" rIns="0" tIns="0" bIns="0" anchor="t">
+            <a:off x="485975" y="3673016"/>
+            <a:ext cx="8747037" cy="1892244"/>
+          </a:xfrm>
+          <a:prstGeom prst="rect">
+            <a:avLst/>
+          </a:prstGeom>
+          <a:noFill/>
+          <a:ln w="0">
+            <a:noFill/>
+          </a:ln>
+        </p:spPr>
+        <p:txBody>
+          <a:bodyPr lIns="0" tIns="0" rIns="0" bIns="0" anchor="t">
             <a:normAutofit/>
           </a:bodyPr>
+          <a:lstStyle>
+            <a:lvl1pPr>
+              <a:lnSpc>
+                <a:spcPct val="90000"/>
+              </a:lnSpc>
+              <a:spcBef>
+                <a:spcPts val="997"/>
+              </a:spcBef>
+              <a:buNone/>
+              <a:defRPr/>
+            </a:lvl1pPr>
+          </a:lstStyle>
           <a:p>
             <a:pPr>
               <a:lnSpc>
@@ -669,7 +895,7 @@
               </a:spcBef>
               <a:buNone/>
             </a:pPr>
-            <a:endParaRPr b="0" lang="en-US" sz="2090" spc="-1" strike="noStrike">
+            <a:endParaRPr lang="en-US" sz="1471" b="0" strike="noStrike" spc="-1">
               <a:solidFill>
                 <a:srgbClr val="000000"/>
               </a:solidFill>
@@ -691,6 +917,7 @@
         <p:spPr/>
         <p:txBody>
           <a:bodyPr/>
+          <a:lstStyle/>
           <a:p>
             <a:r>
               <a:t>Footer</a:t>
@@ -711,10 +938,12 @@
         <p:spPr/>
         <p:txBody>
           <a:bodyPr/>
+          <a:lstStyle/>
           <a:p>
             <a:fld id="{B444CD11-3700-4A6E-BBAE-BEFA946C2211}" type="slidenum">
-              <a:t>&lt;#&gt;</a:t>
+              <a:t>‹#›</a:t>
             </a:fld>
+            <a:endParaRPr/>
           </a:p>
         </p:txBody>
       </p:sp>
@@ -731,21 +960,22 @@
         <p:spPr/>
         <p:txBody>
           <a:bodyPr/>
-          <a:p>
-            <a:r>
-              <a:rPr lang="en-GB"/>
-              <a:t/>
-            </a:r>
+          <a:lstStyle/>
+          <a:p>
+            <a:endParaRPr/>
           </a:p>
         </p:txBody>
       </p:sp>
     </p:spTree>
   </p:cSld>
+  <p:clrMapOvr>
+    <a:masterClrMapping/>
+  </p:clrMapOvr>
 </p:sldLayout>
 </file>
 
 <file path=ppt/slideLayouts/slideLayout11.xml><?xml version="1.0" encoding="utf-8"?>
-<p:sldLayout xmlns:a="http://schemas.openxmlformats.org/drawingml/2006/main" xmlns:p="http://schemas.openxmlformats.org/presentationml/2006/main" xmlns:r="http://schemas.openxmlformats.org/officeDocument/2006/relationships" xmlns:p14="http://schemas.microsoft.com/office/powerpoint/2010/main" xmlns:p15="http://schemas.microsoft.com/office/powerpoint/2012/main" xmlns:mc="http://schemas.openxmlformats.org/markup-compatibility/2006" type="fourObj" preserve="1">
+<p:sldLayout xmlns:a="http://schemas.openxmlformats.org/drawingml/2006/main" xmlns:r="http://schemas.openxmlformats.org/officeDocument/2006/relationships" xmlns:p="http://schemas.openxmlformats.org/presentationml/2006/main" type="fourObj" preserve="1">
   <p:cSld name="Title, 4 Content">
     <p:spTree>
       <p:nvGrpSpPr>
@@ -773,23 +1003,24 @@
         </p:nvSpPr>
         <p:spPr>
           <a:xfrm>
-            <a:off x="513000" y="1590840"/>
-            <a:ext cx="5814000" cy="3383640"/>
-          </a:xfrm>
-          <a:prstGeom prst="rect">
-            <a:avLst/>
-          </a:prstGeom>
-          <a:noFill/>
-          <a:ln w="0">
-            <a:noFill/>
-          </a:ln>
-        </p:spPr>
-        <p:txBody>
-          <a:bodyPr lIns="0" rIns="0" tIns="0" bIns="0" anchor="ctr">
+            <a:off x="728962" y="1119538"/>
+            <a:ext cx="8261574" cy="2381203"/>
+          </a:xfrm>
+          <a:prstGeom prst="rect">
+            <a:avLst/>
+          </a:prstGeom>
+          <a:noFill/>
+          <a:ln w="0">
+            <a:noFill/>
+          </a:ln>
+        </p:spPr>
+        <p:txBody>
+          <a:bodyPr lIns="0" tIns="0" rIns="0" bIns="0" anchor="ctr">
             <a:noAutofit/>
           </a:bodyPr>
-          <a:p>
-            <a:endParaRPr b="0" lang="en-US" sz="1800" spc="-1" strike="noStrike">
+          <a:lstStyle/>
+          <a:p>
+            <a:endParaRPr lang="en-US" sz="1267" b="0" strike="noStrike" spc="-1">
               <a:solidFill>
                 <a:srgbClr val="000000"/>
               </a:solidFill>
@@ -810,21 +1041,33 @@
         </p:nvSpPr>
         <p:spPr>
           <a:xfrm>
-            <a:off x="342000" y="2274480"/>
-            <a:ext cx="3003840" cy="2688840"/>
-          </a:xfrm>
-          <a:prstGeom prst="rect">
-            <a:avLst/>
-          </a:prstGeom>
-          <a:noFill/>
-          <a:ln w="0">
-            <a:noFill/>
-          </a:ln>
-        </p:spPr>
-        <p:txBody>
-          <a:bodyPr lIns="0" rIns="0" tIns="0" bIns="0" anchor="t">
+            <a:off x="485975" y="1600643"/>
+            <a:ext cx="4268395" cy="1892244"/>
+          </a:xfrm>
+          <a:prstGeom prst="rect">
+            <a:avLst/>
+          </a:prstGeom>
+          <a:noFill/>
+          <a:ln w="0">
+            <a:noFill/>
+          </a:ln>
+        </p:spPr>
+        <p:txBody>
+          <a:bodyPr lIns="0" tIns="0" rIns="0" bIns="0" anchor="t">
             <a:normAutofit/>
           </a:bodyPr>
+          <a:lstStyle>
+            <a:lvl1pPr>
+              <a:lnSpc>
+                <a:spcPct val="90000"/>
+              </a:lnSpc>
+              <a:spcBef>
+                <a:spcPts val="997"/>
+              </a:spcBef>
+              <a:buNone/>
+              <a:defRPr/>
+            </a:lvl1pPr>
+          </a:lstStyle>
           <a:p>
             <a:pPr>
               <a:lnSpc>
@@ -835,7 +1078,7 @@
               </a:spcBef>
               <a:buNone/>
             </a:pPr>
-            <a:endParaRPr b="0" lang="en-US" sz="2090" spc="-1" strike="noStrike">
+            <a:endParaRPr lang="en-US" sz="1471" b="0" strike="noStrike" spc="-1">
               <a:solidFill>
                 <a:srgbClr val="000000"/>
               </a:solidFill>
@@ -856,21 +1099,33 @@
         </p:nvSpPr>
         <p:spPr>
           <a:xfrm>
-            <a:off x="3496320" y="2274480"/>
-            <a:ext cx="3003840" cy="2688840"/>
-          </a:xfrm>
-          <a:prstGeom prst="rect">
-            <a:avLst/>
-          </a:prstGeom>
-          <a:noFill/>
-          <a:ln w="0">
-            <a:noFill/>
-          </a:ln>
-        </p:spPr>
-        <p:txBody>
-          <a:bodyPr lIns="0" rIns="0" tIns="0" bIns="0" anchor="t">
+            <a:off x="4968198" y="1600643"/>
+            <a:ext cx="4268395" cy="1892244"/>
+          </a:xfrm>
+          <a:prstGeom prst="rect">
+            <a:avLst/>
+          </a:prstGeom>
+          <a:noFill/>
+          <a:ln w="0">
+            <a:noFill/>
+          </a:ln>
+        </p:spPr>
+        <p:txBody>
+          <a:bodyPr lIns="0" tIns="0" rIns="0" bIns="0" anchor="t">
             <a:normAutofit/>
           </a:bodyPr>
+          <a:lstStyle>
+            <a:lvl1pPr>
+              <a:lnSpc>
+                <a:spcPct val="90000"/>
+              </a:lnSpc>
+              <a:spcBef>
+                <a:spcPts val="997"/>
+              </a:spcBef>
+              <a:buNone/>
+              <a:defRPr/>
+            </a:lvl1pPr>
+          </a:lstStyle>
           <a:p>
             <a:pPr>
               <a:lnSpc>
@@ -881,7 +1136,7 @@
               </a:spcBef>
               <a:buNone/>
             </a:pPr>
-            <a:endParaRPr b="0" lang="en-US" sz="2090" spc="-1" strike="noStrike">
+            <a:endParaRPr lang="en-US" sz="1471" b="0" strike="noStrike" spc="-1">
               <a:solidFill>
                 <a:srgbClr val="000000"/>
               </a:solidFill>
@@ -902,21 +1157,33 @@
         </p:nvSpPr>
         <p:spPr>
           <a:xfrm>
-            <a:off x="342000" y="5219280"/>
-            <a:ext cx="3003840" cy="2688840"/>
-          </a:xfrm>
-          <a:prstGeom prst="rect">
-            <a:avLst/>
-          </a:prstGeom>
-          <a:noFill/>
-          <a:ln w="0">
-            <a:noFill/>
-          </a:ln>
-        </p:spPr>
-        <p:txBody>
-          <a:bodyPr lIns="0" rIns="0" tIns="0" bIns="0" anchor="t">
+            <a:off x="485975" y="3673016"/>
+            <a:ext cx="4268395" cy="1892244"/>
+          </a:xfrm>
+          <a:prstGeom prst="rect">
+            <a:avLst/>
+          </a:prstGeom>
+          <a:noFill/>
+          <a:ln w="0">
+            <a:noFill/>
+          </a:ln>
+        </p:spPr>
+        <p:txBody>
+          <a:bodyPr lIns="0" tIns="0" rIns="0" bIns="0" anchor="t">
             <a:normAutofit/>
           </a:bodyPr>
+          <a:lstStyle>
+            <a:lvl1pPr>
+              <a:lnSpc>
+                <a:spcPct val="90000"/>
+              </a:lnSpc>
+              <a:spcBef>
+                <a:spcPts val="997"/>
+              </a:spcBef>
+              <a:buNone/>
+              <a:defRPr/>
+            </a:lvl1pPr>
+          </a:lstStyle>
           <a:p>
             <a:pPr>
               <a:lnSpc>
@@ -927,7 +1194,7 @@
               </a:spcBef>
               <a:buNone/>
             </a:pPr>
-            <a:endParaRPr b="0" lang="en-US" sz="2090" spc="-1" strike="noStrike">
+            <a:endParaRPr lang="en-US" sz="1471" b="0" strike="noStrike" spc="-1">
               <a:solidFill>
                 <a:srgbClr val="000000"/>
               </a:solidFill>
@@ -948,21 +1215,33 @@
         </p:nvSpPr>
         <p:spPr>
           <a:xfrm>
-            <a:off x="3496320" y="5219280"/>
-            <a:ext cx="3003840" cy="2688840"/>
-          </a:xfrm>
-          <a:prstGeom prst="rect">
-            <a:avLst/>
-          </a:prstGeom>
-          <a:noFill/>
-          <a:ln w="0">
-            <a:noFill/>
-          </a:ln>
-        </p:spPr>
-        <p:txBody>
-          <a:bodyPr lIns="0" rIns="0" tIns="0" bIns="0" anchor="t">
+            <a:off x="4968198" y="3673016"/>
+            <a:ext cx="4268395" cy="1892244"/>
+          </a:xfrm>
+          <a:prstGeom prst="rect">
+            <a:avLst/>
+          </a:prstGeom>
+          <a:noFill/>
+          <a:ln w="0">
+            <a:noFill/>
+          </a:ln>
+        </p:spPr>
+        <p:txBody>
+          <a:bodyPr lIns="0" tIns="0" rIns="0" bIns="0" anchor="t">
             <a:normAutofit/>
           </a:bodyPr>
+          <a:lstStyle>
+            <a:lvl1pPr>
+              <a:lnSpc>
+                <a:spcPct val="90000"/>
+              </a:lnSpc>
+              <a:spcBef>
+                <a:spcPts val="997"/>
+              </a:spcBef>
+              <a:buNone/>
+              <a:defRPr/>
+            </a:lvl1pPr>
+          </a:lstStyle>
           <a:p>
             <a:pPr>
               <a:lnSpc>
@@ -973,7 +1252,7 @@
               </a:spcBef>
               <a:buNone/>
             </a:pPr>
-            <a:endParaRPr b="0" lang="en-US" sz="2090" spc="-1" strike="noStrike">
+            <a:endParaRPr lang="en-US" sz="1471" b="0" strike="noStrike" spc="-1">
               <a:solidFill>
                 <a:srgbClr val="000000"/>
               </a:solidFill>
@@ -995,6 +1274,7 @@
         <p:spPr/>
         <p:txBody>
           <a:bodyPr/>
+          <a:lstStyle/>
           <a:p>
             <a:r>
               <a:t>Footer</a:t>
@@ -1015,10 +1295,12 @@
         <p:spPr/>
         <p:txBody>
           <a:bodyPr/>
+          <a:lstStyle/>
           <a:p>
             <a:fld id="{79623F03-B34F-497C-80D8-22D6036AC87D}" type="slidenum">
-              <a:t>&lt;#&gt;</a:t>
+              <a:t>‹#›</a:t>
             </a:fld>
+            <a:endParaRPr/>
           </a:p>
         </p:txBody>
       </p:sp>
@@ -1035,21 +1317,22 @@
         <p:spPr/>
         <p:txBody>
           <a:bodyPr/>
-          <a:p>
-            <a:r>
-              <a:rPr lang="en-GB"/>
-              <a:t/>
-            </a:r>
+          <a:lstStyle/>
+          <a:p>
+            <a:endParaRPr/>
           </a:p>
         </p:txBody>
       </p:sp>
     </p:spTree>
   </p:cSld>
+  <p:clrMapOvr>
+    <a:masterClrMapping/>
+  </p:clrMapOvr>
 </p:sldLayout>
 </file>
 
 <file path=ppt/slideLayouts/slideLayout12.xml><?xml version="1.0" encoding="utf-8"?>
-<p:sldLayout xmlns:a="http://schemas.openxmlformats.org/drawingml/2006/main" xmlns:p="http://schemas.openxmlformats.org/presentationml/2006/main" xmlns:r="http://schemas.openxmlformats.org/officeDocument/2006/relationships" xmlns:p14="http://schemas.microsoft.com/office/powerpoint/2010/main" xmlns:p15="http://schemas.microsoft.com/office/powerpoint/2012/main" xmlns:mc="http://schemas.openxmlformats.org/markup-compatibility/2006" type="blank" preserve="1">
+<p:sldLayout xmlns:a="http://schemas.openxmlformats.org/drawingml/2006/main" xmlns:r="http://schemas.openxmlformats.org/officeDocument/2006/relationships" xmlns:p="http://schemas.openxmlformats.org/presentationml/2006/main" type="blank" preserve="1">
   <p:cSld name="Title, 6 Content">
     <p:spTree>
       <p:nvGrpSpPr>
@@ -1077,23 +1360,24 @@
         </p:nvSpPr>
         <p:spPr>
           <a:xfrm>
-            <a:off x="513000" y="1590840"/>
-            <a:ext cx="5814000" cy="3383640"/>
-          </a:xfrm>
-          <a:prstGeom prst="rect">
-            <a:avLst/>
-          </a:prstGeom>
-          <a:noFill/>
-          <a:ln w="0">
-            <a:noFill/>
-          </a:ln>
-        </p:spPr>
-        <p:txBody>
-          <a:bodyPr lIns="0" rIns="0" tIns="0" bIns="0" anchor="ctr">
+            <a:off x="728962" y="1119538"/>
+            <a:ext cx="8261574" cy="2381203"/>
+          </a:xfrm>
+          <a:prstGeom prst="rect">
+            <a:avLst/>
+          </a:prstGeom>
+          <a:noFill/>
+          <a:ln w="0">
+            <a:noFill/>
+          </a:ln>
+        </p:spPr>
+        <p:txBody>
+          <a:bodyPr lIns="0" tIns="0" rIns="0" bIns="0" anchor="ctr">
             <a:noAutofit/>
           </a:bodyPr>
-          <a:p>
-            <a:endParaRPr b="0" lang="en-US" sz="1800" spc="-1" strike="noStrike">
+          <a:lstStyle/>
+          <a:p>
+            <a:endParaRPr lang="en-US" sz="1267" b="0" strike="noStrike" spc="-1">
               <a:solidFill>
                 <a:srgbClr val="000000"/>
               </a:solidFill>
@@ -1114,21 +1398,33 @@
         </p:nvSpPr>
         <p:spPr>
           <a:xfrm>
-            <a:off x="342000" y="2274480"/>
-            <a:ext cx="1981800" cy="2688840"/>
-          </a:xfrm>
-          <a:prstGeom prst="rect">
-            <a:avLst/>
-          </a:prstGeom>
-          <a:noFill/>
-          <a:ln w="0">
-            <a:noFill/>
-          </a:ln>
-        </p:spPr>
-        <p:txBody>
-          <a:bodyPr lIns="0" rIns="0" tIns="0" bIns="0" anchor="t">
+            <a:off x="485975" y="1600643"/>
+            <a:ext cx="2816097" cy="1892244"/>
+          </a:xfrm>
+          <a:prstGeom prst="rect">
+            <a:avLst/>
+          </a:prstGeom>
+          <a:noFill/>
+          <a:ln w="0">
+            <a:noFill/>
+          </a:ln>
+        </p:spPr>
+        <p:txBody>
+          <a:bodyPr lIns="0" tIns="0" rIns="0" bIns="0" anchor="t">
             <a:normAutofit/>
           </a:bodyPr>
+          <a:lstStyle>
+            <a:lvl1pPr>
+              <a:lnSpc>
+                <a:spcPct val="90000"/>
+              </a:lnSpc>
+              <a:spcBef>
+                <a:spcPts val="997"/>
+              </a:spcBef>
+              <a:buNone/>
+              <a:defRPr/>
+            </a:lvl1pPr>
+          </a:lstStyle>
           <a:p>
             <a:pPr>
               <a:lnSpc>
@@ -1139,7 +1435,7 @@
               </a:spcBef>
               <a:buNone/>
             </a:pPr>
-            <a:endParaRPr b="0" lang="en-US" sz="2090" spc="-1" strike="noStrike">
+            <a:endParaRPr lang="en-US" sz="1471" b="0" strike="noStrike" spc="-1">
               <a:solidFill>
                 <a:srgbClr val="000000"/>
               </a:solidFill>
@@ -1160,21 +1456,33 @@
         </p:nvSpPr>
         <p:spPr>
           <a:xfrm>
-            <a:off x="2423160" y="2274480"/>
-            <a:ext cx="1981800" cy="2688840"/>
-          </a:xfrm>
-          <a:prstGeom prst="rect">
-            <a:avLst/>
-          </a:prstGeom>
-          <a:noFill/>
-          <a:ln w="0">
-            <a:noFill/>
-          </a:ln>
-        </p:spPr>
-        <p:txBody>
-          <a:bodyPr lIns="0" rIns="0" tIns="0" bIns="0" anchor="t">
+            <a:off x="3443260" y="1600643"/>
+            <a:ext cx="2816097" cy="1892244"/>
+          </a:xfrm>
+          <a:prstGeom prst="rect">
+            <a:avLst/>
+          </a:prstGeom>
+          <a:noFill/>
+          <a:ln w="0">
+            <a:noFill/>
+          </a:ln>
+        </p:spPr>
+        <p:txBody>
+          <a:bodyPr lIns="0" tIns="0" rIns="0" bIns="0" anchor="t">
             <a:normAutofit/>
           </a:bodyPr>
+          <a:lstStyle>
+            <a:lvl1pPr>
+              <a:lnSpc>
+                <a:spcPct val="90000"/>
+              </a:lnSpc>
+              <a:spcBef>
+                <a:spcPts val="997"/>
+              </a:spcBef>
+              <a:buNone/>
+              <a:defRPr/>
+            </a:lvl1pPr>
+          </a:lstStyle>
           <a:p>
             <a:pPr>
               <a:lnSpc>
@@ -1185,7 +1493,7 @@
               </a:spcBef>
               <a:buNone/>
             </a:pPr>
-            <a:endParaRPr b="0" lang="en-US" sz="2090" spc="-1" strike="noStrike">
+            <a:endParaRPr lang="en-US" sz="1471" b="0" strike="noStrike" spc="-1">
               <a:solidFill>
                 <a:srgbClr val="000000"/>
               </a:solidFill>
@@ -1206,21 +1514,33 @@
         </p:nvSpPr>
         <p:spPr>
           <a:xfrm>
-            <a:off x="4504680" y="2274480"/>
-            <a:ext cx="1981800" cy="2688840"/>
-          </a:xfrm>
-          <a:prstGeom prst="rect">
-            <a:avLst/>
-          </a:prstGeom>
-          <a:noFill/>
-          <a:ln w="0">
-            <a:noFill/>
-          </a:ln>
-        </p:spPr>
-        <p:txBody>
-          <a:bodyPr lIns="0" rIns="0" tIns="0" bIns="0" anchor="t">
+            <a:off x="6401057" y="1600643"/>
+            <a:ext cx="2816097" cy="1892244"/>
+          </a:xfrm>
+          <a:prstGeom prst="rect">
+            <a:avLst/>
+          </a:prstGeom>
+          <a:noFill/>
+          <a:ln w="0">
+            <a:noFill/>
+          </a:ln>
+        </p:spPr>
+        <p:txBody>
+          <a:bodyPr lIns="0" tIns="0" rIns="0" bIns="0" anchor="t">
             <a:normAutofit/>
           </a:bodyPr>
+          <a:lstStyle>
+            <a:lvl1pPr>
+              <a:lnSpc>
+                <a:spcPct val="90000"/>
+              </a:lnSpc>
+              <a:spcBef>
+                <a:spcPts val="997"/>
+              </a:spcBef>
+              <a:buNone/>
+              <a:defRPr/>
+            </a:lvl1pPr>
+          </a:lstStyle>
           <a:p>
             <a:pPr>
               <a:lnSpc>
@@ -1231,7 +1551,7 @@
               </a:spcBef>
               <a:buNone/>
             </a:pPr>
-            <a:endParaRPr b="0" lang="en-US" sz="2090" spc="-1" strike="noStrike">
+            <a:endParaRPr lang="en-US" sz="1471" b="0" strike="noStrike" spc="-1">
               <a:solidFill>
                 <a:srgbClr val="000000"/>
               </a:solidFill>
@@ -1252,21 +1572,33 @@
         </p:nvSpPr>
         <p:spPr>
           <a:xfrm>
-            <a:off x="342000" y="5219280"/>
-            <a:ext cx="1981800" cy="2688840"/>
-          </a:xfrm>
-          <a:prstGeom prst="rect">
-            <a:avLst/>
-          </a:prstGeom>
-          <a:noFill/>
-          <a:ln w="0">
-            <a:noFill/>
-          </a:ln>
-        </p:spPr>
-        <p:txBody>
-          <a:bodyPr lIns="0" rIns="0" tIns="0" bIns="0" anchor="t">
+            <a:off x="485975" y="3673016"/>
+            <a:ext cx="2816097" cy="1892244"/>
+          </a:xfrm>
+          <a:prstGeom prst="rect">
+            <a:avLst/>
+          </a:prstGeom>
+          <a:noFill/>
+          <a:ln w="0">
+            <a:noFill/>
+          </a:ln>
+        </p:spPr>
+        <p:txBody>
+          <a:bodyPr lIns="0" tIns="0" rIns="0" bIns="0" anchor="t">
             <a:normAutofit/>
           </a:bodyPr>
+          <a:lstStyle>
+            <a:lvl1pPr>
+              <a:lnSpc>
+                <a:spcPct val="90000"/>
+              </a:lnSpc>
+              <a:spcBef>
+                <a:spcPts val="997"/>
+              </a:spcBef>
+              <a:buNone/>
+              <a:defRPr/>
+            </a:lvl1pPr>
+          </a:lstStyle>
           <a:p>
             <a:pPr>
               <a:lnSpc>
@@ -1277,7 +1609,7 @@
               </a:spcBef>
               <a:buNone/>
             </a:pPr>
-            <a:endParaRPr b="0" lang="en-US" sz="2090" spc="-1" strike="noStrike">
+            <a:endParaRPr lang="en-US" sz="1471" b="0" strike="noStrike" spc="-1">
               <a:solidFill>
                 <a:srgbClr val="000000"/>
               </a:solidFill>
@@ -1298,21 +1630,33 @@
         </p:nvSpPr>
         <p:spPr>
           <a:xfrm>
-            <a:off x="2423160" y="5219280"/>
-            <a:ext cx="1981800" cy="2688840"/>
-          </a:xfrm>
-          <a:prstGeom prst="rect">
-            <a:avLst/>
-          </a:prstGeom>
-          <a:noFill/>
-          <a:ln w="0">
-            <a:noFill/>
-          </a:ln>
-        </p:spPr>
-        <p:txBody>
-          <a:bodyPr lIns="0" rIns="0" tIns="0" bIns="0" anchor="t">
+            <a:off x="3443260" y="3673016"/>
+            <a:ext cx="2816097" cy="1892244"/>
+          </a:xfrm>
+          <a:prstGeom prst="rect">
+            <a:avLst/>
+          </a:prstGeom>
+          <a:noFill/>
+          <a:ln w="0">
+            <a:noFill/>
+          </a:ln>
+        </p:spPr>
+        <p:txBody>
+          <a:bodyPr lIns="0" tIns="0" rIns="0" bIns="0" anchor="t">
             <a:normAutofit/>
           </a:bodyPr>
+          <a:lstStyle>
+            <a:lvl1pPr>
+              <a:lnSpc>
+                <a:spcPct val="90000"/>
+              </a:lnSpc>
+              <a:spcBef>
+                <a:spcPts val="997"/>
+              </a:spcBef>
+              <a:buNone/>
+              <a:defRPr/>
+            </a:lvl1pPr>
+          </a:lstStyle>
           <a:p>
             <a:pPr>
               <a:lnSpc>
@@ -1323,7 +1667,7 @@
               </a:spcBef>
               <a:buNone/>
             </a:pPr>
-            <a:endParaRPr b="0" lang="en-US" sz="2090" spc="-1" strike="noStrike">
+            <a:endParaRPr lang="en-US" sz="1471" b="0" strike="noStrike" spc="-1">
               <a:solidFill>
                 <a:srgbClr val="000000"/>
               </a:solidFill>
@@ -1344,21 +1688,33 @@
         </p:nvSpPr>
         <p:spPr>
           <a:xfrm>
-            <a:off x="4504680" y="5219280"/>
-            <a:ext cx="1981800" cy="2688840"/>
-          </a:xfrm>
-          <a:prstGeom prst="rect">
-            <a:avLst/>
-          </a:prstGeom>
-          <a:noFill/>
-          <a:ln w="0">
-            <a:noFill/>
-          </a:ln>
-        </p:spPr>
-        <p:txBody>
-          <a:bodyPr lIns="0" rIns="0" tIns="0" bIns="0" anchor="t">
+            <a:off x="6401057" y="3673016"/>
+            <a:ext cx="2816097" cy="1892244"/>
+          </a:xfrm>
+          <a:prstGeom prst="rect">
+            <a:avLst/>
+          </a:prstGeom>
+          <a:noFill/>
+          <a:ln w="0">
+            <a:noFill/>
+          </a:ln>
+        </p:spPr>
+        <p:txBody>
+          <a:bodyPr lIns="0" tIns="0" rIns="0" bIns="0" anchor="t">
             <a:normAutofit/>
           </a:bodyPr>
+          <a:lstStyle>
+            <a:lvl1pPr>
+              <a:lnSpc>
+                <a:spcPct val="90000"/>
+              </a:lnSpc>
+              <a:spcBef>
+                <a:spcPts val="997"/>
+              </a:spcBef>
+              <a:buNone/>
+              <a:defRPr/>
+            </a:lvl1pPr>
+          </a:lstStyle>
           <a:p>
             <a:pPr>
               <a:lnSpc>
@@ -1369,7 +1725,7 @@
               </a:spcBef>
               <a:buNone/>
             </a:pPr>
-            <a:endParaRPr b="0" lang="en-US" sz="2090" spc="-1" strike="noStrike">
+            <a:endParaRPr lang="en-US" sz="1471" b="0" strike="noStrike" spc="-1">
               <a:solidFill>
                 <a:srgbClr val="000000"/>
               </a:solidFill>
@@ -1391,6 +1747,7 @@
         <p:spPr/>
         <p:txBody>
           <a:bodyPr/>
+          <a:lstStyle/>
           <a:p>
             <a:r>
               <a:t>Footer</a:t>
@@ -1411,10 +1768,12 @@
         <p:spPr/>
         <p:txBody>
           <a:bodyPr/>
+          <a:lstStyle/>
           <a:p>
             <a:fld id="{83616132-8904-4B88-B8ED-63449AC86BE2}" type="slidenum">
-              <a:t>&lt;#&gt;</a:t>
+              <a:t>‹#›</a:t>
             </a:fld>
+            <a:endParaRPr/>
           </a:p>
         </p:txBody>
       </p:sp>
@@ -1431,21 +1790,22 @@
         <p:spPr/>
         <p:txBody>
           <a:bodyPr/>
-          <a:p>
-            <a:r>
-              <a:rPr lang="en-GB"/>
-              <a:t/>
-            </a:r>
+          <a:lstStyle/>
+          <a:p>
+            <a:endParaRPr/>
           </a:p>
         </p:txBody>
       </p:sp>
     </p:spTree>
   </p:cSld>
+  <p:clrMapOvr>
+    <a:masterClrMapping/>
+  </p:clrMapOvr>
 </p:sldLayout>
 </file>
 
 <file path=ppt/slideLayouts/slideLayout2.xml><?xml version="1.0" encoding="utf-8"?>
-<p:sldLayout xmlns:a="http://schemas.openxmlformats.org/drawingml/2006/main" xmlns:p="http://schemas.openxmlformats.org/presentationml/2006/main" xmlns:r="http://schemas.openxmlformats.org/officeDocument/2006/relationships" xmlns:p14="http://schemas.microsoft.com/office/powerpoint/2010/main" xmlns:p15="http://schemas.microsoft.com/office/powerpoint/2012/main" xmlns:mc="http://schemas.openxmlformats.org/markup-compatibility/2006" type="tx" preserve="1">
+<p:sldLayout xmlns:a="http://schemas.openxmlformats.org/drawingml/2006/main" xmlns:r="http://schemas.openxmlformats.org/officeDocument/2006/relationships" xmlns:p="http://schemas.openxmlformats.org/presentationml/2006/main" type="tx" preserve="1">
   <p:cSld name="Title Slide">
     <p:spTree>
       <p:nvGrpSpPr>
@@ -1473,23 +1833,24 @@
         </p:nvSpPr>
         <p:spPr>
           <a:xfrm>
-            <a:off x="513000" y="1590840"/>
-            <a:ext cx="5814000" cy="3383640"/>
-          </a:xfrm>
-          <a:prstGeom prst="rect">
-            <a:avLst/>
-          </a:prstGeom>
-          <a:noFill/>
-          <a:ln w="0">
-            <a:noFill/>
-          </a:ln>
-        </p:spPr>
-        <p:txBody>
-          <a:bodyPr lIns="0" rIns="0" tIns="0" bIns="0" anchor="ctr">
+            <a:off x="728962" y="1119538"/>
+            <a:ext cx="8261574" cy="2381203"/>
+          </a:xfrm>
+          <a:prstGeom prst="rect">
+            <a:avLst/>
+          </a:prstGeom>
+          <a:noFill/>
+          <a:ln w="0">
+            <a:noFill/>
+          </a:ln>
+        </p:spPr>
+        <p:txBody>
+          <a:bodyPr lIns="0" tIns="0" rIns="0" bIns="0" anchor="ctr">
             <a:noAutofit/>
           </a:bodyPr>
-          <a:p>
-            <a:endParaRPr b="0" lang="en-US" sz="1800" spc="-1" strike="noStrike">
+          <a:lstStyle/>
+          <a:p>
+            <a:endParaRPr lang="en-US" sz="1267" b="0" strike="noStrike" spc="-1">
               <a:solidFill>
                 <a:srgbClr val="000000"/>
               </a:solidFill>
@@ -1510,26 +1871,27 @@
         </p:nvSpPr>
         <p:spPr>
           <a:xfrm>
-            <a:off x="342000" y="2274480"/>
-            <a:ext cx="6155640" cy="5637240"/>
-          </a:xfrm>
-          <a:prstGeom prst="rect">
-            <a:avLst/>
-          </a:prstGeom>
-          <a:noFill/>
-          <a:ln w="0">
-            <a:noFill/>
-          </a:ln>
-        </p:spPr>
-        <p:txBody>
-          <a:bodyPr lIns="0" rIns="0" tIns="0" bIns="0" anchor="ctr">
+            <a:off x="485975" y="1600643"/>
+            <a:ext cx="8747037" cy="3967151"/>
+          </a:xfrm>
+          <a:prstGeom prst="rect">
+            <a:avLst/>
+          </a:prstGeom>
+          <a:noFill/>
+          <a:ln w="0">
+            <a:noFill/>
+          </a:ln>
+        </p:spPr>
+        <p:txBody>
+          <a:bodyPr lIns="0" tIns="0" rIns="0" bIns="0" anchor="ctr">
             <a:noAutofit/>
           </a:bodyPr>
+          <a:lstStyle/>
           <a:p>
             <a:pPr algn="ctr">
               <a:buNone/>
             </a:pPr>
-            <a:endParaRPr b="0" lang="en-GB" sz="3200" spc="-1" strike="noStrike">
+            <a:endParaRPr lang="en-GB" sz="2252" b="0" strike="noStrike" spc="-1">
               <a:latin typeface="Arial"/>
             </a:endParaRPr>
           </a:p>
@@ -1537,7 +1899,7 @@
       </p:sp>
       <p:sp>
         <p:nvSpPr>
-          <p:cNvPr id="4" name="PlaceHolder 3"/>
+          <p:cNvPr id="2" name="PlaceHolder 3"/>
           <p:cNvSpPr>
             <a:spLocks noGrp="1"/>
           </p:cNvSpPr>
@@ -1548,6 +1910,7 @@
         <p:spPr/>
         <p:txBody>
           <a:bodyPr/>
+          <a:lstStyle/>
           <a:p>
             <a:r>
               <a:t>Footer</a:t>
@@ -1557,7 +1920,7 @@
       </p:sp>
       <p:sp>
         <p:nvSpPr>
-          <p:cNvPr id="5" name="PlaceHolder 4"/>
+          <p:cNvPr id="3" name="PlaceHolder 4"/>
           <p:cNvSpPr>
             <a:spLocks noGrp="1"/>
           </p:cNvSpPr>
@@ -1568,10 +1931,12 @@
         <p:spPr/>
         <p:txBody>
           <a:bodyPr/>
+          <a:lstStyle/>
           <a:p>
             <a:fld id="{C2D710CA-4957-4069-95FD-FEDA79212745}" type="slidenum">
-              <a:t>&lt;#&gt;</a:t>
+              <a:t>‹#›</a:t>
             </a:fld>
+            <a:endParaRPr/>
           </a:p>
         </p:txBody>
       </p:sp>
@@ -1588,21 +1953,22 @@
         <p:spPr/>
         <p:txBody>
           <a:bodyPr/>
-          <a:p>
-            <a:r>
-              <a:rPr lang="en-GB"/>
-              <a:t/>
-            </a:r>
+          <a:lstStyle/>
+          <a:p>
+            <a:endParaRPr/>
           </a:p>
         </p:txBody>
       </p:sp>
     </p:spTree>
   </p:cSld>
+  <p:clrMapOvr>
+    <a:masterClrMapping/>
+  </p:clrMapOvr>
 </p:sldLayout>
 </file>
 
 <file path=ppt/slideLayouts/slideLayout3.xml><?xml version="1.0" encoding="utf-8"?>
-<p:sldLayout xmlns:a="http://schemas.openxmlformats.org/drawingml/2006/main" xmlns:p="http://schemas.openxmlformats.org/presentationml/2006/main" xmlns:r="http://schemas.openxmlformats.org/officeDocument/2006/relationships" xmlns:p14="http://schemas.microsoft.com/office/powerpoint/2010/main" xmlns:p15="http://schemas.microsoft.com/office/powerpoint/2012/main" xmlns:mc="http://schemas.openxmlformats.org/markup-compatibility/2006" type="obj" preserve="1">
+<p:sldLayout xmlns:a="http://schemas.openxmlformats.org/drawingml/2006/main" xmlns:r="http://schemas.openxmlformats.org/officeDocument/2006/relationships" xmlns:p="http://schemas.openxmlformats.org/presentationml/2006/main" type="obj" preserve="1">
   <p:cSld name="Title, Content">
     <p:spTree>
       <p:nvGrpSpPr>
@@ -1630,23 +1996,24 @@
         </p:nvSpPr>
         <p:spPr>
           <a:xfrm>
-            <a:off x="513000" y="1590840"/>
-            <a:ext cx="5814000" cy="3383640"/>
-          </a:xfrm>
-          <a:prstGeom prst="rect">
-            <a:avLst/>
-          </a:prstGeom>
-          <a:noFill/>
-          <a:ln w="0">
-            <a:noFill/>
-          </a:ln>
-        </p:spPr>
-        <p:txBody>
-          <a:bodyPr lIns="0" rIns="0" tIns="0" bIns="0" anchor="ctr">
+            <a:off x="728962" y="1119538"/>
+            <a:ext cx="8261574" cy="2381203"/>
+          </a:xfrm>
+          <a:prstGeom prst="rect">
+            <a:avLst/>
+          </a:prstGeom>
+          <a:noFill/>
+          <a:ln w="0">
+            <a:noFill/>
+          </a:ln>
+        </p:spPr>
+        <p:txBody>
+          <a:bodyPr lIns="0" tIns="0" rIns="0" bIns="0" anchor="ctr">
             <a:noAutofit/>
           </a:bodyPr>
-          <a:p>
-            <a:endParaRPr b="0" lang="en-US" sz="1800" spc="-1" strike="noStrike">
+          <a:lstStyle/>
+          <a:p>
+            <a:endParaRPr lang="en-US" sz="1267" b="0" strike="noStrike" spc="-1">
               <a:solidFill>
                 <a:srgbClr val="000000"/>
               </a:solidFill>
@@ -1667,21 +2034,33 @@
         </p:nvSpPr>
         <p:spPr>
           <a:xfrm>
-            <a:off x="342000" y="2274480"/>
-            <a:ext cx="6155640" cy="5637240"/>
-          </a:xfrm>
-          <a:prstGeom prst="rect">
-            <a:avLst/>
-          </a:prstGeom>
-          <a:noFill/>
-          <a:ln w="0">
-            <a:noFill/>
-          </a:ln>
-        </p:spPr>
-        <p:txBody>
-          <a:bodyPr lIns="0" rIns="0" tIns="0" bIns="0" anchor="t">
+            <a:off x="485975" y="1600643"/>
+            <a:ext cx="8747037" cy="3967151"/>
+          </a:xfrm>
+          <a:prstGeom prst="rect">
+            <a:avLst/>
+          </a:prstGeom>
+          <a:noFill/>
+          <a:ln w="0">
+            <a:noFill/>
+          </a:ln>
+        </p:spPr>
+        <p:txBody>
+          <a:bodyPr lIns="0" tIns="0" rIns="0" bIns="0" anchor="t">
             <a:normAutofit/>
           </a:bodyPr>
+          <a:lstStyle>
+            <a:lvl1pPr>
+              <a:lnSpc>
+                <a:spcPct val="90000"/>
+              </a:lnSpc>
+              <a:spcBef>
+                <a:spcPts val="997"/>
+              </a:spcBef>
+              <a:buNone/>
+              <a:defRPr/>
+            </a:lvl1pPr>
+          </a:lstStyle>
           <a:p>
             <a:pPr>
               <a:lnSpc>
@@ -1692,7 +2071,7 @@
               </a:spcBef>
               <a:buNone/>
             </a:pPr>
-            <a:endParaRPr b="0" lang="en-US" sz="2090" spc="-1" strike="noStrike">
+            <a:endParaRPr lang="en-US" sz="1471" b="0" strike="noStrike" spc="-1">
               <a:solidFill>
                 <a:srgbClr val="000000"/>
               </a:solidFill>
@@ -1714,6 +2093,7 @@
         <p:spPr/>
         <p:txBody>
           <a:bodyPr/>
+          <a:lstStyle/>
           <a:p>
             <a:r>
               <a:t>Footer</a:t>
@@ -1734,16 +2114,18 @@
         <p:spPr/>
         <p:txBody>
           <a:bodyPr/>
+          <a:lstStyle/>
           <a:p>
             <a:fld id="{A07B79B9-67C6-4F10-9B50-48B4C6E2E2F1}" type="slidenum">
-              <a:t>&lt;#&gt;</a:t>
+              <a:t>‹#›</a:t>
             </a:fld>
-          </a:p>
-        </p:txBody>
-      </p:sp>
-      <p:sp>
-        <p:nvSpPr>
-          <p:cNvPr id="6" name="PlaceHolder 5"/>
+            <a:endParaRPr/>
+          </a:p>
+        </p:txBody>
+      </p:sp>
+      <p:sp>
+        <p:nvSpPr>
+          <p:cNvPr id="2" name="PlaceHolder 5"/>
           <p:cNvSpPr>
             <a:spLocks noGrp="1"/>
           </p:cNvSpPr>
@@ -1754,21 +2136,22 @@
         <p:spPr/>
         <p:txBody>
           <a:bodyPr/>
-          <a:p>
-            <a:r>
-              <a:rPr lang="en-GB"/>
-              <a:t/>
-            </a:r>
+          <a:lstStyle/>
+          <a:p>
+            <a:endParaRPr/>
           </a:p>
         </p:txBody>
       </p:sp>
     </p:spTree>
   </p:cSld>
+  <p:clrMapOvr>
+    <a:masterClrMapping/>
+  </p:clrMapOvr>
 </p:sldLayout>
 </file>
 
 <file path=ppt/slideLayouts/slideLayout4.xml><?xml version="1.0" encoding="utf-8"?>
-<p:sldLayout xmlns:a="http://schemas.openxmlformats.org/drawingml/2006/main" xmlns:p="http://schemas.openxmlformats.org/presentationml/2006/main" xmlns:r="http://schemas.openxmlformats.org/officeDocument/2006/relationships" xmlns:p14="http://schemas.microsoft.com/office/powerpoint/2010/main" xmlns:p15="http://schemas.microsoft.com/office/powerpoint/2012/main" xmlns:mc="http://schemas.openxmlformats.org/markup-compatibility/2006" type="twoObj" preserve="1">
+<p:sldLayout xmlns:a="http://schemas.openxmlformats.org/drawingml/2006/main" xmlns:r="http://schemas.openxmlformats.org/officeDocument/2006/relationships" xmlns:p="http://schemas.openxmlformats.org/presentationml/2006/main" type="twoObj" preserve="1">
   <p:cSld name="Title, 2 Content">
     <p:spTree>
       <p:nvGrpSpPr>
@@ -1796,23 +2179,24 @@
         </p:nvSpPr>
         <p:spPr>
           <a:xfrm>
-            <a:off x="513000" y="1590840"/>
-            <a:ext cx="5814000" cy="3383640"/>
-          </a:xfrm>
-          <a:prstGeom prst="rect">
-            <a:avLst/>
-          </a:prstGeom>
-          <a:noFill/>
-          <a:ln w="0">
-            <a:noFill/>
-          </a:ln>
-        </p:spPr>
-        <p:txBody>
-          <a:bodyPr lIns="0" rIns="0" tIns="0" bIns="0" anchor="ctr">
+            <a:off x="728962" y="1119538"/>
+            <a:ext cx="8261574" cy="2381203"/>
+          </a:xfrm>
+          <a:prstGeom prst="rect">
+            <a:avLst/>
+          </a:prstGeom>
+          <a:noFill/>
+          <a:ln w="0">
+            <a:noFill/>
+          </a:ln>
+        </p:spPr>
+        <p:txBody>
+          <a:bodyPr lIns="0" tIns="0" rIns="0" bIns="0" anchor="ctr">
             <a:noAutofit/>
           </a:bodyPr>
-          <a:p>
-            <a:endParaRPr b="0" lang="en-US" sz="1800" spc="-1" strike="noStrike">
+          <a:lstStyle/>
+          <a:p>
+            <a:endParaRPr lang="en-US" sz="1267" b="0" strike="noStrike" spc="-1">
               <a:solidFill>
                 <a:srgbClr val="000000"/>
               </a:solidFill>
@@ -1833,21 +2217,33 @@
         </p:nvSpPr>
         <p:spPr>
           <a:xfrm>
-            <a:off x="342000" y="2274480"/>
-            <a:ext cx="3003840" cy="5637240"/>
-          </a:xfrm>
-          <a:prstGeom prst="rect">
-            <a:avLst/>
-          </a:prstGeom>
-          <a:noFill/>
-          <a:ln w="0">
-            <a:noFill/>
-          </a:ln>
-        </p:spPr>
-        <p:txBody>
-          <a:bodyPr lIns="0" rIns="0" tIns="0" bIns="0" anchor="t">
+            <a:off x="485975" y="1600643"/>
+            <a:ext cx="4268395" cy="3967151"/>
+          </a:xfrm>
+          <a:prstGeom prst="rect">
+            <a:avLst/>
+          </a:prstGeom>
+          <a:noFill/>
+          <a:ln w="0">
+            <a:noFill/>
+          </a:ln>
+        </p:spPr>
+        <p:txBody>
+          <a:bodyPr lIns="0" tIns="0" rIns="0" bIns="0" anchor="t">
             <a:normAutofit/>
           </a:bodyPr>
+          <a:lstStyle>
+            <a:lvl1pPr>
+              <a:lnSpc>
+                <a:spcPct val="90000"/>
+              </a:lnSpc>
+              <a:spcBef>
+                <a:spcPts val="997"/>
+              </a:spcBef>
+              <a:buNone/>
+              <a:defRPr/>
+            </a:lvl1pPr>
+          </a:lstStyle>
           <a:p>
             <a:pPr>
               <a:lnSpc>
@@ -1858,7 +2254,7 @@
               </a:spcBef>
               <a:buNone/>
             </a:pPr>
-            <a:endParaRPr b="0" lang="en-US" sz="2090" spc="-1" strike="noStrike">
+            <a:endParaRPr lang="en-US" sz="1471" b="0" strike="noStrike" spc="-1">
               <a:solidFill>
                 <a:srgbClr val="000000"/>
               </a:solidFill>
@@ -1879,21 +2275,33 @@
         </p:nvSpPr>
         <p:spPr>
           <a:xfrm>
-            <a:off x="3496320" y="2274480"/>
-            <a:ext cx="3003840" cy="5637240"/>
-          </a:xfrm>
-          <a:prstGeom prst="rect">
-            <a:avLst/>
-          </a:prstGeom>
-          <a:noFill/>
-          <a:ln w="0">
-            <a:noFill/>
-          </a:ln>
-        </p:spPr>
-        <p:txBody>
-          <a:bodyPr lIns="0" rIns="0" tIns="0" bIns="0" anchor="t">
+            <a:off x="4968198" y="1600643"/>
+            <a:ext cx="4268395" cy="3967151"/>
+          </a:xfrm>
+          <a:prstGeom prst="rect">
+            <a:avLst/>
+          </a:prstGeom>
+          <a:noFill/>
+          <a:ln w="0">
+            <a:noFill/>
+          </a:ln>
+        </p:spPr>
+        <p:txBody>
+          <a:bodyPr lIns="0" tIns="0" rIns="0" bIns="0" anchor="t">
             <a:normAutofit/>
           </a:bodyPr>
+          <a:lstStyle>
+            <a:lvl1pPr>
+              <a:lnSpc>
+                <a:spcPct val="90000"/>
+              </a:lnSpc>
+              <a:spcBef>
+                <a:spcPts val="997"/>
+              </a:spcBef>
+              <a:buNone/>
+              <a:defRPr/>
+            </a:lvl1pPr>
+          </a:lstStyle>
           <a:p>
             <a:pPr>
               <a:lnSpc>
@@ -1904,7 +2312,7 @@
               </a:spcBef>
               <a:buNone/>
             </a:pPr>
-            <a:endParaRPr b="0" lang="en-US" sz="2090" spc="-1" strike="noStrike">
+            <a:endParaRPr lang="en-US" sz="1471" b="0" strike="noStrike" spc="-1">
               <a:solidFill>
                 <a:srgbClr val="000000"/>
               </a:solidFill>
@@ -1926,6 +2334,7 @@
         <p:spPr/>
         <p:txBody>
           <a:bodyPr/>
+          <a:lstStyle/>
           <a:p>
             <a:r>
               <a:t>Footer</a:t>
@@ -1946,10 +2355,12 @@
         <p:spPr/>
         <p:txBody>
           <a:bodyPr/>
+          <a:lstStyle/>
           <a:p>
             <a:fld id="{EA7DAEB9-F276-4E30-8AED-0DCCB7504E5B}" type="slidenum">
-              <a:t>&lt;#&gt;</a:t>
+              <a:t>‹#›</a:t>
             </a:fld>
+            <a:endParaRPr/>
           </a:p>
         </p:txBody>
       </p:sp>
@@ -1966,21 +2377,22 @@
         <p:spPr/>
         <p:txBody>
           <a:bodyPr/>
-          <a:p>
-            <a:r>
-              <a:rPr lang="en-GB"/>
-              <a:t/>
-            </a:r>
+          <a:lstStyle/>
+          <a:p>
+            <a:endParaRPr/>
           </a:p>
         </p:txBody>
       </p:sp>
     </p:spTree>
   </p:cSld>
+  <p:clrMapOvr>
+    <a:masterClrMapping/>
+  </p:clrMapOvr>
 </p:sldLayout>
 </file>
 
 <file path=ppt/slideLayouts/slideLayout5.xml><?xml version="1.0" encoding="utf-8"?>
-<p:sldLayout xmlns:a="http://schemas.openxmlformats.org/drawingml/2006/main" xmlns:p="http://schemas.openxmlformats.org/presentationml/2006/main" xmlns:r="http://schemas.openxmlformats.org/officeDocument/2006/relationships" xmlns:p14="http://schemas.microsoft.com/office/powerpoint/2010/main" xmlns:p15="http://schemas.microsoft.com/office/powerpoint/2012/main" xmlns:mc="http://schemas.openxmlformats.org/markup-compatibility/2006" type="titleOnly" preserve="1">
+<p:sldLayout xmlns:a="http://schemas.openxmlformats.org/drawingml/2006/main" xmlns:r="http://schemas.openxmlformats.org/officeDocument/2006/relationships" xmlns:p="http://schemas.openxmlformats.org/presentationml/2006/main" type="titleOnly" preserve="1">
   <p:cSld name="Title Only">
     <p:spTree>
       <p:nvGrpSpPr>
@@ -2008,23 +2420,24 @@
         </p:nvSpPr>
         <p:spPr>
           <a:xfrm>
-            <a:off x="513000" y="1590840"/>
-            <a:ext cx="5814000" cy="3383640"/>
-          </a:xfrm>
-          <a:prstGeom prst="rect">
-            <a:avLst/>
-          </a:prstGeom>
-          <a:noFill/>
-          <a:ln w="0">
-            <a:noFill/>
-          </a:ln>
-        </p:spPr>
-        <p:txBody>
-          <a:bodyPr lIns="0" rIns="0" tIns="0" bIns="0" anchor="ctr">
+            <a:off x="728962" y="1119538"/>
+            <a:ext cx="8261574" cy="2381203"/>
+          </a:xfrm>
+          <a:prstGeom prst="rect">
+            <a:avLst/>
+          </a:prstGeom>
+          <a:noFill/>
+          <a:ln w="0">
+            <a:noFill/>
+          </a:ln>
+        </p:spPr>
+        <p:txBody>
+          <a:bodyPr lIns="0" tIns="0" rIns="0" bIns="0" anchor="ctr">
             <a:noAutofit/>
           </a:bodyPr>
-          <a:p>
-            <a:endParaRPr b="0" lang="en-US" sz="1800" spc="-1" strike="noStrike">
+          <a:lstStyle/>
+          <a:p>
+            <a:endParaRPr lang="en-US" sz="1267" b="0" strike="noStrike" spc="-1">
               <a:solidFill>
                 <a:srgbClr val="000000"/>
               </a:solidFill>
@@ -2046,6 +2459,7 @@
         <p:spPr/>
         <p:txBody>
           <a:bodyPr/>
+          <a:lstStyle/>
           <a:p>
             <a:r>
               <a:t>Footer</a:t>
@@ -2066,10 +2480,12 @@
         <p:spPr/>
         <p:txBody>
           <a:bodyPr/>
+          <a:lstStyle/>
           <a:p>
             <a:fld id="{9CFB61E9-0916-4F37-90CA-B9B3BE450B50}" type="slidenum">
-              <a:t>&lt;#&gt;</a:t>
+              <a:t>‹#›</a:t>
             </a:fld>
+            <a:endParaRPr/>
           </a:p>
         </p:txBody>
       </p:sp>
@@ -2086,21 +2502,22 @@
         <p:spPr/>
         <p:txBody>
           <a:bodyPr/>
-          <a:p>
-            <a:r>
-              <a:rPr lang="en-GB"/>
-              <a:t/>
-            </a:r>
+          <a:lstStyle/>
+          <a:p>
+            <a:endParaRPr/>
           </a:p>
         </p:txBody>
       </p:sp>
     </p:spTree>
   </p:cSld>
+  <p:clrMapOvr>
+    <a:masterClrMapping/>
+  </p:clrMapOvr>
 </p:sldLayout>
 </file>
 
 <file path=ppt/slideLayouts/slideLayout6.xml><?xml version="1.0" encoding="utf-8"?>
-<p:sldLayout xmlns:a="http://schemas.openxmlformats.org/drawingml/2006/main" xmlns:p="http://schemas.openxmlformats.org/presentationml/2006/main" xmlns:r="http://schemas.openxmlformats.org/officeDocument/2006/relationships" xmlns:p14="http://schemas.microsoft.com/office/powerpoint/2010/main" xmlns:p15="http://schemas.microsoft.com/office/powerpoint/2012/main" xmlns:mc="http://schemas.openxmlformats.org/markup-compatibility/2006" type="objOnly" preserve="1">
+<p:sldLayout xmlns:a="http://schemas.openxmlformats.org/drawingml/2006/main" xmlns:r="http://schemas.openxmlformats.org/officeDocument/2006/relationships" xmlns:p="http://schemas.openxmlformats.org/presentationml/2006/main" type="objOnly" preserve="1">
   <p:cSld name="Centered Text">
     <p:spTree>
       <p:nvGrpSpPr>
@@ -2128,26 +2545,27 @@
         </p:nvSpPr>
         <p:spPr>
           <a:xfrm>
-            <a:off x="513000" y="1590840"/>
-            <a:ext cx="5814000" cy="15685920"/>
-          </a:xfrm>
-          <a:prstGeom prst="rect">
-            <a:avLst/>
-          </a:prstGeom>
-          <a:noFill/>
-          <a:ln w="0">
-            <a:noFill/>
-          </a:ln>
-        </p:spPr>
-        <p:txBody>
-          <a:bodyPr lIns="0" rIns="0" tIns="0" bIns="0" anchor="ctr">
+            <a:off x="728962" y="1119538"/>
+            <a:ext cx="8261574" cy="11038810"/>
+          </a:xfrm>
+          <a:prstGeom prst="rect">
+            <a:avLst/>
+          </a:prstGeom>
+          <a:noFill/>
+          <a:ln w="0">
+            <a:noFill/>
+          </a:ln>
+        </p:spPr>
+        <p:txBody>
+          <a:bodyPr lIns="0" tIns="0" rIns="0" bIns="0" anchor="ctr">
             <a:noAutofit/>
           </a:bodyPr>
+          <a:lstStyle/>
           <a:p>
             <a:pPr algn="ctr">
               <a:buNone/>
             </a:pPr>
-            <a:endParaRPr b="0" lang="en-GB" sz="3200" spc="-1" strike="noStrike">
+            <a:endParaRPr lang="en-GB" sz="2252" b="0" strike="noStrike" spc="-1">
               <a:latin typeface="Arial"/>
             </a:endParaRPr>
           </a:p>
@@ -2166,6 +2584,7 @@
         <p:spPr/>
         <p:txBody>
           <a:bodyPr/>
+          <a:lstStyle/>
           <a:p>
             <a:r>
               <a:t>Footer</a:t>
@@ -2186,10 +2605,12 @@
         <p:spPr/>
         <p:txBody>
           <a:bodyPr/>
+          <a:lstStyle/>
           <a:p>
             <a:fld id="{62A06C54-D8B1-4570-8B9C-36A3130770B4}" type="slidenum">
-              <a:t>&lt;#&gt;</a:t>
+              <a:t>‹#›</a:t>
             </a:fld>
+            <a:endParaRPr/>
           </a:p>
         </p:txBody>
       </p:sp>
@@ -2206,21 +2627,22 @@
         <p:spPr/>
         <p:txBody>
           <a:bodyPr/>
-          <a:p>
-            <a:r>
-              <a:rPr lang="en-GB"/>
-              <a:t/>
-            </a:r>
+          <a:lstStyle/>
+          <a:p>
+            <a:endParaRPr/>
           </a:p>
         </p:txBody>
       </p:sp>
     </p:spTree>
   </p:cSld>
+  <p:clrMapOvr>
+    <a:masterClrMapping/>
+  </p:clrMapOvr>
 </p:sldLayout>
 </file>
 
 <file path=ppt/slideLayouts/slideLayout7.xml><?xml version="1.0" encoding="utf-8"?>
-<p:sldLayout xmlns:a="http://schemas.openxmlformats.org/drawingml/2006/main" xmlns:p="http://schemas.openxmlformats.org/presentationml/2006/main" xmlns:r="http://schemas.openxmlformats.org/officeDocument/2006/relationships" xmlns:p14="http://schemas.microsoft.com/office/powerpoint/2010/main" xmlns:p15="http://schemas.microsoft.com/office/powerpoint/2012/main" xmlns:mc="http://schemas.openxmlformats.org/markup-compatibility/2006" type="twoObjAndObj" preserve="1">
+<p:sldLayout xmlns:a="http://schemas.openxmlformats.org/drawingml/2006/main" xmlns:r="http://schemas.openxmlformats.org/officeDocument/2006/relationships" xmlns:p="http://schemas.openxmlformats.org/presentationml/2006/main" type="twoObjAndObj" preserve="1">
   <p:cSld name="Title, 2 Content and Content">
     <p:spTree>
       <p:nvGrpSpPr>
@@ -2248,23 +2670,24 @@
         </p:nvSpPr>
         <p:spPr>
           <a:xfrm>
-            <a:off x="513000" y="1590840"/>
-            <a:ext cx="5814000" cy="3383640"/>
-          </a:xfrm>
-          <a:prstGeom prst="rect">
-            <a:avLst/>
-          </a:prstGeom>
-          <a:noFill/>
-          <a:ln w="0">
-            <a:noFill/>
-          </a:ln>
-        </p:spPr>
-        <p:txBody>
-          <a:bodyPr lIns="0" rIns="0" tIns="0" bIns="0" anchor="ctr">
+            <a:off x="728962" y="1119538"/>
+            <a:ext cx="8261574" cy="2381203"/>
+          </a:xfrm>
+          <a:prstGeom prst="rect">
+            <a:avLst/>
+          </a:prstGeom>
+          <a:noFill/>
+          <a:ln w="0">
+            <a:noFill/>
+          </a:ln>
+        </p:spPr>
+        <p:txBody>
+          <a:bodyPr lIns="0" tIns="0" rIns="0" bIns="0" anchor="ctr">
             <a:noAutofit/>
           </a:bodyPr>
-          <a:p>
-            <a:endParaRPr b="0" lang="en-US" sz="1800" spc="-1" strike="noStrike">
+          <a:lstStyle/>
+          <a:p>
+            <a:endParaRPr lang="en-US" sz="1267" b="0" strike="noStrike" spc="-1">
               <a:solidFill>
                 <a:srgbClr val="000000"/>
               </a:solidFill>
@@ -2285,21 +2708,33 @@
         </p:nvSpPr>
         <p:spPr>
           <a:xfrm>
-            <a:off x="342000" y="2274480"/>
-            <a:ext cx="3003840" cy="2688840"/>
-          </a:xfrm>
-          <a:prstGeom prst="rect">
-            <a:avLst/>
-          </a:prstGeom>
-          <a:noFill/>
-          <a:ln w="0">
-            <a:noFill/>
-          </a:ln>
-        </p:spPr>
-        <p:txBody>
-          <a:bodyPr lIns="0" rIns="0" tIns="0" bIns="0" anchor="t">
+            <a:off x="485975" y="1600643"/>
+            <a:ext cx="4268395" cy="1892244"/>
+          </a:xfrm>
+          <a:prstGeom prst="rect">
+            <a:avLst/>
+          </a:prstGeom>
+          <a:noFill/>
+          <a:ln w="0">
+            <a:noFill/>
+          </a:ln>
+        </p:spPr>
+        <p:txBody>
+          <a:bodyPr lIns="0" tIns="0" rIns="0" bIns="0" anchor="t">
             <a:normAutofit/>
           </a:bodyPr>
+          <a:lstStyle>
+            <a:lvl1pPr>
+              <a:lnSpc>
+                <a:spcPct val="90000"/>
+              </a:lnSpc>
+              <a:spcBef>
+                <a:spcPts val="997"/>
+              </a:spcBef>
+              <a:buNone/>
+              <a:defRPr/>
+            </a:lvl1pPr>
+          </a:lstStyle>
           <a:p>
             <a:pPr>
               <a:lnSpc>
@@ -2310,7 +2745,7 @@
               </a:spcBef>
               <a:buNone/>
             </a:pPr>
-            <a:endParaRPr b="0" lang="en-US" sz="2090" spc="-1" strike="noStrike">
+            <a:endParaRPr lang="en-US" sz="1471" b="0" strike="noStrike" spc="-1">
               <a:solidFill>
                 <a:srgbClr val="000000"/>
               </a:solidFill>
@@ -2331,21 +2766,33 @@
         </p:nvSpPr>
         <p:spPr>
           <a:xfrm>
-            <a:off x="3496320" y="2274480"/>
-            <a:ext cx="3003840" cy="5637240"/>
-          </a:xfrm>
-          <a:prstGeom prst="rect">
-            <a:avLst/>
-          </a:prstGeom>
-          <a:noFill/>
-          <a:ln w="0">
-            <a:noFill/>
-          </a:ln>
-        </p:spPr>
-        <p:txBody>
-          <a:bodyPr lIns="0" rIns="0" tIns="0" bIns="0" anchor="t">
+            <a:off x="4968198" y="1600643"/>
+            <a:ext cx="4268395" cy="3967151"/>
+          </a:xfrm>
+          <a:prstGeom prst="rect">
+            <a:avLst/>
+          </a:prstGeom>
+          <a:noFill/>
+          <a:ln w="0">
+            <a:noFill/>
+          </a:ln>
+        </p:spPr>
+        <p:txBody>
+          <a:bodyPr lIns="0" tIns="0" rIns="0" bIns="0" anchor="t">
             <a:normAutofit/>
           </a:bodyPr>
+          <a:lstStyle>
+            <a:lvl1pPr>
+              <a:lnSpc>
+                <a:spcPct val="90000"/>
+              </a:lnSpc>
+              <a:spcBef>
+                <a:spcPts val="997"/>
+              </a:spcBef>
+              <a:buNone/>
+              <a:defRPr/>
+            </a:lvl1pPr>
+          </a:lstStyle>
           <a:p>
             <a:pPr>
               <a:lnSpc>
@@ -2356,7 +2803,7 @@
               </a:spcBef>
               <a:buNone/>
             </a:pPr>
-            <a:endParaRPr b="0" lang="en-US" sz="2090" spc="-1" strike="noStrike">
+            <a:endParaRPr lang="en-US" sz="1471" b="0" strike="noStrike" spc="-1">
               <a:solidFill>
                 <a:srgbClr val="000000"/>
               </a:solidFill>
@@ -2377,21 +2824,33 @@
         </p:nvSpPr>
         <p:spPr>
           <a:xfrm>
-            <a:off x="342000" y="5219280"/>
-            <a:ext cx="3003840" cy="2688840"/>
-          </a:xfrm>
-          <a:prstGeom prst="rect">
-            <a:avLst/>
-          </a:prstGeom>
-          <a:noFill/>
-          <a:ln w="0">
-            <a:noFill/>
-          </a:ln>
-        </p:spPr>
-        <p:txBody>
-          <a:bodyPr lIns="0" rIns="0" tIns="0" bIns="0" anchor="t">
+            <a:off x="485975" y="3673016"/>
+            <a:ext cx="4268395" cy="1892244"/>
+          </a:xfrm>
+          <a:prstGeom prst="rect">
+            <a:avLst/>
+          </a:prstGeom>
+          <a:noFill/>
+          <a:ln w="0">
+            <a:noFill/>
+          </a:ln>
+        </p:spPr>
+        <p:txBody>
+          <a:bodyPr lIns="0" tIns="0" rIns="0" bIns="0" anchor="t">
             <a:normAutofit/>
           </a:bodyPr>
+          <a:lstStyle>
+            <a:lvl1pPr>
+              <a:lnSpc>
+                <a:spcPct val="90000"/>
+              </a:lnSpc>
+              <a:spcBef>
+                <a:spcPts val="997"/>
+              </a:spcBef>
+              <a:buNone/>
+              <a:defRPr/>
+            </a:lvl1pPr>
+          </a:lstStyle>
           <a:p>
             <a:pPr>
               <a:lnSpc>
@@ -2402,7 +2861,7 @@
               </a:spcBef>
               <a:buNone/>
             </a:pPr>
-            <a:endParaRPr b="0" lang="en-US" sz="2090" spc="-1" strike="noStrike">
+            <a:endParaRPr lang="en-US" sz="1471" b="0" strike="noStrike" spc="-1">
               <a:solidFill>
                 <a:srgbClr val="000000"/>
               </a:solidFill>
@@ -2424,6 +2883,7 @@
         <p:spPr/>
         <p:txBody>
           <a:bodyPr/>
+          <a:lstStyle/>
           <a:p>
             <a:r>
               <a:t>Footer</a:t>
@@ -2444,10 +2904,12 @@
         <p:spPr/>
         <p:txBody>
           <a:bodyPr/>
+          <a:lstStyle/>
           <a:p>
             <a:fld id="{F42EB0DB-8AF6-412A-A62E-1D70D2996CA2}" type="slidenum">
-              <a:t>&lt;#&gt;</a:t>
+              <a:t>‹#›</a:t>
             </a:fld>
+            <a:endParaRPr/>
           </a:p>
         </p:txBody>
       </p:sp>
@@ -2464,21 +2926,22 @@
         <p:spPr/>
         <p:txBody>
           <a:bodyPr/>
-          <a:p>
-            <a:r>
-              <a:rPr lang="en-GB"/>
-              <a:t/>
-            </a:r>
+          <a:lstStyle/>
+          <a:p>
+            <a:endParaRPr/>
           </a:p>
         </p:txBody>
       </p:sp>
     </p:spTree>
   </p:cSld>
+  <p:clrMapOvr>
+    <a:masterClrMapping/>
+  </p:clrMapOvr>
 </p:sldLayout>
 </file>
 
 <file path=ppt/slideLayouts/slideLayout8.xml><?xml version="1.0" encoding="utf-8"?>
-<p:sldLayout xmlns:a="http://schemas.openxmlformats.org/drawingml/2006/main" xmlns:p="http://schemas.openxmlformats.org/presentationml/2006/main" xmlns:r="http://schemas.openxmlformats.org/officeDocument/2006/relationships" xmlns:p14="http://schemas.microsoft.com/office/powerpoint/2010/main" xmlns:p15="http://schemas.microsoft.com/office/powerpoint/2012/main" xmlns:mc="http://schemas.openxmlformats.org/markup-compatibility/2006" type="objAndTwoObj" preserve="1">
+<p:sldLayout xmlns:a="http://schemas.openxmlformats.org/drawingml/2006/main" xmlns:r="http://schemas.openxmlformats.org/officeDocument/2006/relationships" xmlns:p="http://schemas.openxmlformats.org/presentationml/2006/main" type="objAndTwoObj" preserve="1">
   <p:cSld name="Title Content and 2 Content">
     <p:spTree>
       <p:nvGrpSpPr>
@@ -2506,23 +2969,24 @@
         </p:nvSpPr>
         <p:spPr>
           <a:xfrm>
-            <a:off x="513000" y="1590840"/>
-            <a:ext cx="5814000" cy="3383640"/>
-          </a:xfrm>
-          <a:prstGeom prst="rect">
-            <a:avLst/>
-          </a:prstGeom>
-          <a:noFill/>
-          <a:ln w="0">
-            <a:noFill/>
-          </a:ln>
-        </p:spPr>
-        <p:txBody>
-          <a:bodyPr lIns="0" rIns="0" tIns="0" bIns="0" anchor="ctr">
+            <a:off x="728962" y="1119538"/>
+            <a:ext cx="8261574" cy="2381203"/>
+          </a:xfrm>
+          <a:prstGeom prst="rect">
+            <a:avLst/>
+          </a:prstGeom>
+          <a:noFill/>
+          <a:ln w="0">
+            <a:noFill/>
+          </a:ln>
+        </p:spPr>
+        <p:txBody>
+          <a:bodyPr lIns="0" tIns="0" rIns="0" bIns="0" anchor="ctr">
             <a:noAutofit/>
           </a:bodyPr>
-          <a:p>
-            <a:endParaRPr b="0" lang="en-US" sz="1800" spc="-1" strike="noStrike">
+          <a:lstStyle/>
+          <a:p>
+            <a:endParaRPr lang="en-US" sz="1267" b="0" strike="noStrike" spc="-1">
               <a:solidFill>
                 <a:srgbClr val="000000"/>
               </a:solidFill>
@@ -2543,21 +3007,33 @@
         </p:nvSpPr>
         <p:spPr>
           <a:xfrm>
-            <a:off x="342000" y="2274480"/>
-            <a:ext cx="3003840" cy="5637240"/>
-          </a:xfrm>
-          <a:prstGeom prst="rect">
-            <a:avLst/>
-          </a:prstGeom>
-          <a:noFill/>
-          <a:ln w="0">
-            <a:noFill/>
-          </a:ln>
-        </p:spPr>
-        <p:txBody>
-          <a:bodyPr lIns="0" rIns="0" tIns="0" bIns="0" anchor="t">
+            <a:off x="485975" y="1600643"/>
+            <a:ext cx="4268395" cy="3967151"/>
+          </a:xfrm>
+          <a:prstGeom prst="rect">
+            <a:avLst/>
+          </a:prstGeom>
+          <a:noFill/>
+          <a:ln w="0">
+            <a:noFill/>
+          </a:ln>
+        </p:spPr>
+        <p:txBody>
+          <a:bodyPr lIns="0" tIns="0" rIns="0" bIns="0" anchor="t">
             <a:normAutofit/>
           </a:bodyPr>
+          <a:lstStyle>
+            <a:lvl1pPr>
+              <a:lnSpc>
+                <a:spcPct val="90000"/>
+              </a:lnSpc>
+              <a:spcBef>
+                <a:spcPts val="997"/>
+              </a:spcBef>
+              <a:buNone/>
+              <a:defRPr/>
+            </a:lvl1pPr>
+          </a:lstStyle>
           <a:p>
             <a:pPr>
               <a:lnSpc>
@@ -2568,7 +3044,7 @@
               </a:spcBef>
               <a:buNone/>
             </a:pPr>
-            <a:endParaRPr b="0" lang="en-US" sz="2090" spc="-1" strike="noStrike">
+            <a:endParaRPr lang="en-US" sz="1471" b="0" strike="noStrike" spc="-1">
               <a:solidFill>
                 <a:srgbClr val="000000"/>
               </a:solidFill>
@@ -2589,21 +3065,33 @@
         </p:nvSpPr>
         <p:spPr>
           <a:xfrm>
-            <a:off x="3496320" y="2274480"/>
-            <a:ext cx="3003840" cy="2688840"/>
-          </a:xfrm>
-          <a:prstGeom prst="rect">
-            <a:avLst/>
-          </a:prstGeom>
-          <a:noFill/>
-          <a:ln w="0">
-            <a:noFill/>
-          </a:ln>
-        </p:spPr>
-        <p:txBody>
-          <a:bodyPr lIns="0" rIns="0" tIns="0" bIns="0" anchor="t">
+            <a:off x="4968198" y="1600643"/>
+            <a:ext cx="4268395" cy="1892244"/>
+          </a:xfrm>
+          <a:prstGeom prst="rect">
+            <a:avLst/>
+          </a:prstGeom>
+          <a:noFill/>
+          <a:ln w="0">
+            <a:noFill/>
+          </a:ln>
+        </p:spPr>
+        <p:txBody>
+          <a:bodyPr lIns="0" tIns="0" rIns="0" bIns="0" anchor="t">
             <a:normAutofit/>
           </a:bodyPr>
+          <a:lstStyle>
+            <a:lvl1pPr>
+              <a:lnSpc>
+                <a:spcPct val="90000"/>
+              </a:lnSpc>
+              <a:spcBef>
+                <a:spcPts val="997"/>
+              </a:spcBef>
+              <a:buNone/>
+              <a:defRPr/>
+            </a:lvl1pPr>
+          </a:lstStyle>
           <a:p>
             <a:pPr>
               <a:lnSpc>
@@ -2614,7 +3102,7 @@
               </a:spcBef>
               <a:buNone/>
             </a:pPr>
-            <a:endParaRPr b="0" lang="en-US" sz="2090" spc="-1" strike="noStrike">
+            <a:endParaRPr lang="en-US" sz="1471" b="0" strike="noStrike" spc="-1">
               <a:solidFill>
                 <a:srgbClr val="000000"/>
               </a:solidFill>
@@ -2635,21 +3123,33 @@
         </p:nvSpPr>
         <p:spPr>
           <a:xfrm>
-            <a:off x="3496320" y="5219280"/>
-            <a:ext cx="3003840" cy="2688840"/>
-          </a:xfrm>
-          <a:prstGeom prst="rect">
-            <a:avLst/>
-          </a:prstGeom>
-          <a:noFill/>
-          <a:ln w="0">
-            <a:noFill/>
-          </a:ln>
-        </p:spPr>
-        <p:txBody>
-          <a:bodyPr lIns="0" rIns="0" tIns="0" bIns="0" anchor="t">
+            <a:off x="4968198" y="3673016"/>
+            <a:ext cx="4268395" cy="1892244"/>
+          </a:xfrm>
+          <a:prstGeom prst="rect">
+            <a:avLst/>
+          </a:prstGeom>
+          <a:noFill/>
+          <a:ln w="0">
+            <a:noFill/>
+          </a:ln>
+        </p:spPr>
+        <p:txBody>
+          <a:bodyPr lIns="0" tIns="0" rIns="0" bIns="0" anchor="t">
             <a:normAutofit/>
           </a:bodyPr>
+          <a:lstStyle>
+            <a:lvl1pPr>
+              <a:lnSpc>
+                <a:spcPct val="90000"/>
+              </a:lnSpc>
+              <a:spcBef>
+                <a:spcPts val="997"/>
+              </a:spcBef>
+              <a:buNone/>
+              <a:defRPr/>
+            </a:lvl1pPr>
+          </a:lstStyle>
           <a:p>
             <a:pPr>
               <a:lnSpc>
@@ -2660,7 +3160,7 @@
               </a:spcBef>
               <a:buNone/>
             </a:pPr>
-            <a:endParaRPr b="0" lang="en-US" sz="2090" spc="-1" strike="noStrike">
+            <a:endParaRPr lang="en-US" sz="1471" b="0" strike="noStrike" spc="-1">
               <a:solidFill>
                 <a:srgbClr val="000000"/>
               </a:solidFill>
@@ -2682,6 +3182,7 @@
         <p:spPr/>
         <p:txBody>
           <a:bodyPr/>
+          <a:lstStyle/>
           <a:p>
             <a:r>
               <a:t>Footer</a:t>
@@ -2702,10 +3203,12 @@
         <p:spPr/>
         <p:txBody>
           <a:bodyPr/>
+          <a:lstStyle/>
           <a:p>
             <a:fld id="{E71E70DA-5063-4481-9305-118D1B2B6A5F}" type="slidenum">
-              <a:t>&lt;#&gt;</a:t>
+              <a:t>‹#›</a:t>
             </a:fld>
+            <a:endParaRPr/>
           </a:p>
         </p:txBody>
       </p:sp>
@@ -2722,21 +3225,22 @@
         <p:spPr/>
         <p:txBody>
           <a:bodyPr/>
-          <a:p>
-            <a:r>
-              <a:rPr lang="en-GB"/>
-              <a:t/>
-            </a:r>
+          <a:lstStyle/>
+          <a:p>
+            <a:endParaRPr/>
           </a:p>
         </p:txBody>
       </p:sp>
     </p:spTree>
   </p:cSld>
+  <p:clrMapOvr>
+    <a:masterClrMapping/>
+  </p:clrMapOvr>
 </p:sldLayout>
 </file>
 
 <file path=ppt/slideLayouts/slideLayout9.xml><?xml version="1.0" encoding="utf-8"?>
-<p:sldLayout xmlns:a="http://schemas.openxmlformats.org/drawingml/2006/main" xmlns:p="http://schemas.openxmlformats.org/presentationml/2006/main" xmlns:r="http://schemas.openxmlformats.org/officeDocument/2006/relationships" xmlns:p14="http://schemas.microsoft.com/office/powerpoint/2010/main" xmlns:p15="http://schemas.microsoft.com/office/powerpoint/2012/main" xmlns:mc="http://schemas.openxmlformats.org/markup-compatibility/2006" type="twoObjOverTx" preserve="1">
+<p:sldLayout xmlns:a="http://schemas.openxmlformats.org/drawingml/2006/main" xmlns:r="http://schemas.openxmlformats.org/officeDocument/2006/relationships" xmlns:p="http://schemas.openxmlformats.org/presentationml/2006/main" type="twoObjOverTx" preserve="1">
   <p:cSld name="Title, 2 Content over Content">
     <p:spTree>
       <p:nvGrpSpPr>
@@ -2764,23 +3268,24 @@
         </p:nvSpPr>
         <p:spPr>
           <a:xfrm>
-            <a:off x="513000" y="1590840"/>
-            <a:ext cx="5814000" cy="3383640"/>
-          </a:xfrm>
-          <a:prstGeom prst="rect">
-            <a:avLst/>
-          </a:prstGeom>
-          <a:noFill/>
-          <a:ln w="0">
-            <a:noFill/>
-          </a:ln>
-        </p:spPr>
-        <p:txBody>
-          <a:bodyPr lIns="0" rIns="0" tIns="0" bIns="0" anchor="ctr">
+            <a:off x="728962" y="1119538"/>
+            <a:ext cx="8261574" cy="2381203"/>
+          </a:xfrm>
+          <a:prstGeom prst="rect">
+            <a:avLst/>
+          </a:prstGeom>
+          <a:noFill/>
+          <a:ln w="0">
+            <a:noFill/>
+          </a:ln>
+        </p:spPr>
+        <p:txBody>
+          <a:bodyPr lIns="0" tIns="0" rIns="0" bIns="0" anchor="ctr">
             <a:noAutofit/>
           </a:bodyPr>
-          <a:p>
-            <a:endParaRPr b="0" lang="en-US" sz="1800" spc="-1" strike="noStrike">
+          <a:lstStyle/>
+          <a:p>
+            <a:endParaRPr lang="en-US" sz="1267" b="0" strike="noStrike" spc="-1">
               <a:solidFill>
                 <a:srgbClr val="000000"/>
               </a:solidFill>
@@ -2801,21 +3306,33 @@
         </p:nvSpPr>
         <p:spPr>
           <a:xfrm>
-            <a:off x="342000" y="2274480"/>
-            <a:ext cx="3003840" cy="2688840"/>
-          </a:xfrm>
-          <a:prstGeom prst="rect">
-            <a:avLst/>
-          </a:prstGeom>
-          <a:noFill/>
-          <a:ln w="0">
-            <a:noFill/>
-          </a:ln>
-        </p:spPr>
-        <p:txBody>
-          <a:bodyPr lIns="0" rIns="0" tIns="0" bIns="0" anchor="t">
+            <a:off x="485975" y="1600643"/>
+            <a:ext cx="4268395" cy="1892244"/>
+          </a:xfrm>
+          <a:prstGeom prst="rect">
+            <a:avLst/>
+          </a:prstGeom>
+          <a:noFill/>
+          <a:ln w="0">
+            <a:noFill/>
+          </a:ln>
+        </p:spPr>
+        <p:txBody>
+          <a:bodyPr lIns="0" tIns="0" rIns="0" bIns="0" anchor="t">
             <a:normAutofit/>
           </a:bodyPr>
+          <a:lstStyle>
+            <a:lvl1pPr>
+              <a:lnSpc>
+                <a:spcPct val="90000"/>
+              </a:lnSpc>
+              <a:spcBef>
+                <a:spcPts val="997"/>
+              </a:spcBef>
+              <a:buNone/>
+              <a:defRPr/>
+            </a:lvl1pPr>
+          </a:lstStyle>
           <a:p>
             <a:pPr>
               <a:lnSpc>
@@ -2826,7 +3343,7 @@
               </a:spcBef>
               <a:buNone/>
             </a:pPr>
-            <a:endParaRPr b="0" lang="en-US" sz="2090" spc="-1" strike="noStrike">
+            <a:endParaRPr lang="en-US" sz="1471" b="0" strike="noStrike" spc="-1">
               <a:solidFill>
                 <a:srgbClr val="000000"/>
               </a:solidFill>
@@ -2847,21 +3364,33 @@
         </p:nvSpPr>
         <p:spPr>
           <a:xfrm>
-            <a:off x="3496320" y="2274480"/>
-            <a:ext cx="3003840" cy="2688840"/>
-          </a:xfrm>
-          <a:prstGeom prst="rect">
-            <a:avLst/>
-          </a:prstGeom>
-          <a:noFill/>
-          <a:ln w="0">
-            <a:noFill/>
-          </a:ln>
-        </p:spPr>
-        <p:txBody>
-          <a:bodyPr lIns="0" rIns="0" tIns="0" bIns="0" anchor="t">
+            <a:off x="4968198" y="1600643"/>
+            <a:ext cx="4268395" cy="1892244"/>
+          </a:xfrm>
+          <a:prstGeom prst="rect">
+            <a:avLst/>
+          </a:prstGeom>
+          <a:noFill/>
+          <a:ln w="0">
+            <a:noFill/>
+          </a:ln>
+        </p:spPr>
+        <p:txBody>
+          <a:bodyPr lIns="0" tIns="0" rIns="0" bIns="0" anchor="t">
             <a:normAutofit/>
           </a:bodyPr>
+          <a:lstStyle>
+            <a:lvl1pPr>
+              <a:lnSpc>
+                <a:spcPct val="90000"/>
+              </a:lnSpc>
+              <a:spcBef>
+                <a:spcPts val="997"/>
+              </a:spcBef>
+              <a:buNone/>
+              <a:defRPr/>
+            </a:lvl1pPr>
+          </a:lstStyle>
           <a:p>
             <a:pPr>
               <a:lnSpc>
@@ -2872,7 +3401,7 @@
               </a:spcBef>
               <a:buNone/>
             </a:pPr>
-            <a:endParaRPr b="0" lang="en-US" sz="2090" spc="-1" strike="noStrike">
+            <a:endParaRPr lang="en-US" sz="1471" b="0" strike="noStrike" spc="-1">
               <a:solidFill>
                 <a:srgbClr val="000000"/>
               </a:solidFill>
@@ -2893,21 +3422,33 @@
         </p:nvSpPr>
         <p:spPr>
           <a:xfrm>
-            <a:off x="342000" y="5219280"/>
-            <a:ext cx="6155640" cy="2688840"/>
-          </a:xfrm>
-          <a:prstGeom prst="rect">
-            <a:avLst/>
-          </a:prstGeom>
-          <a:noFill/>
-          <a:ln w="0">
-            <a:noFill/>
-          </a:ln>
-        </p:spPr>
-        <p:txBody>
-          <a:bodyPr lIns="0" rIns="0" tIns="0" bIns="0" anchor="t">
+            <a:off x="485975" y="3673016"/>
+            <a:ext cx="8747037" cy="1892244"/>
+          </a:xfrm>
+          <a:prstGeom prst="rect">
+            <a:avLst/>
+          </a:prstGeom>
+          <a:noFill/>
+          <a:ln w="0">
+            <a:noFill/>
+          </a:ln>
+        </p:spPr>
+        <p:txBody>
+          <a:bodyPr lIns="0" tIns="0" rIns="0" bIns="0" anchor="t">
             <a:normAutofit/>
           </a:bodyPr>
+          <a:lstStyle>
+            <a:lvl1pPr>
+              <a:lnSpc>
+                <a:spcPct val="90000"/>
+              </a:lnSpc>
+              <a:spcBef>
+                <a:spcPts val="997"/>
+              </a:spcBef>
+              <a:buNone/>
+              <a:defRPr/>
+            </a:lvl1pPr>
+          </a:lstStyle>
           <a:p>
             <a:pPr>
               <a:lnSpc>
@@ -2918,7 +3459,7 @@
               </a:spcBef>
               <a:buNone/>
             </a:pPr>
-            <a:endParaRPr b="0" lang="en-US" sz="2090" spc="-1" strike="noStrike">
+            <a:endParaRPr lang="en-US" sz="1471" b="0" strike="noStrike" spc="-1">
               <a:solidFill>
                 <a:srgbClr val="000000"/>
               </a:solidFill>
@@ -2940,6 +3481,7 @@
         <p:spPr/>
         <p:txBody>
           <a:bodyPr/>
+          <a:lstStyle/>
           <a:p>
             <a:r>
               <a:t>Footer</a:t>
@@ -2960,10 +3502,12 @@
         <p:spPr/>
         <p:txBody>
           <a:bodyPr/>
+          <a:lstStyle/>
           <a:p>
             <a:fld id="{755C1830-D5AD-41C8-904B-15D65A7C5A69}" type="slidenum">
-              <a:t>&lt;#&gt;</a:t>
+              <a:t>‹#›</a:t>
             </a:fld>
+            <a:endParaRPr/>
           </a:p>
         </p:txBody>
       </p:sp>
@@ -2980,27 +3524,29 @@
         <p:spPr/>
         <p:txBody>
           <a:bodyPr/>
-          <a:p>
-            <a:r>
-              <a:rPr lang="en-GB"/>
-              <a:t/>
-            </a:r>
+          <a:lstStyle/>
+          <a:p>
+            <a:endParaRPr/>
           </a:p>
         </p:txBody>
       </p:sp>
     </p:spTree>
   </p:cSld>
+  <p:clrMapOvr>
+    <a:masterClrMapping/>
+  </p:clrMapOvr>
 </p:sldLayout>
 </file>
 
 <file path=ppt/slideMasters/slideMaster1.xml><?xml version="1.0" encoding="utf-8"?>
-<p:sldMaster xmlns:a="http://schemas.openxmlformats.org/drawingml/2006/main" xmlns:p="http://schemas.openxmlformats.org/presentationml/2006/main" xmlns:r="http://schemas.openxmlformats.org/officeDocument/2006/relationships" xmlns:p14="http://schemas.microsoft.com/office/powerpoint/2010/main" xmlns:p15="http://schemas.microsoft.com/office/powerpoint/2012/main" xmlns:mc="http://schemas.openxmlformats.org/markup-compatibility/2006">
+<p:sldMaster xmlns:a="http://schemas.openxmlformats.org/drawingml/2006/main" xmlns:r="http://schemas.openxmlformats.org/officeDocument/2006/relationships" xmlns:p="http://schemas.openxmlformats.org/presentationml/2006/main">
   <p:cSld>
     <p:bg>
       <p:bgPr>
         <a:solidFill>
-          <a:srgbClr val="ffffff"/>
+          <a:srgbClr val="FFFFFF"/>
         </a:solidFill>
+        <a:effectLst/>
       </p:bgPr>
     </p:bg>
     <p:spTree>
@@ -3019,7 +3565,7 @@
       </p:grpSpPr>
       <p:sp>
         <p:nvSpPr>
-          <p:cNvPr id="0" name="PlaceHolder 1"/>
+          <p:cNvPr id="4" name="PlaceHolder 1"/>
           <p:cNvSpPr>
             <a:spLocks noGrp="1"/>
           </p:cNvSpPr>
@@ -3029,8 +3575,8 @@
         </p:nvSpPr>
         <p:spPr>
           <a:xfrm>
-            <a:off x="513000" y="1590840"/>
-            <a:ext cx="5814000" cy="3383640"/>
+            <a:off x="728962" y="1119538"/>
+            <a:ext cx="8261574" cy="2381203"/>
           </a:xfrm>
           <a:prstGeom prst="rect">
             <a:avLst/>
@@ -3044,6 +3590,7 @@
           <a:bodyPr anchor="b">
             <a:noAutofit/>
           </a:bodyPr>
+          <a:lstStyle/>
           <a:p>
             <a:pPr algn="ctr">
               <a:lnSpc>
@@ -3052,7 +3599,7 @@
               <a:buNone/>
             </a:pPr>
             <a:r>
-              <a:rPr b="0" lang="en-GB" sz="4490" spc="-1" strike="noStrike">
+              <a:rPr lang="en-GB" sz="3160" b="0" strike="noStrike" spc="-1">
                 <a:solidFill>
                   <a:srgbClr val="000000"/>
                 </a:solidFill>
@@ -3060,7 +3607,7 @@
               </a:rPr>
               <a:t>Click to edit Master title style</a:t>
             </a:r>
-            <a:endParaRPr b="0" lang="en-US" sz="4490" spc="-1" strike="noStrike">
+            <a:endParaRPr lang="en-US" sz="3160" b="0" strike="noStrike" spc="-1">
               <a:solidFill>
                 <a:srgbClr val="000000"/>
               </a:solidFill>
@@ -3071,7 +3618,7 @@
       </p:sp>
       <p:sp>
         <p:nvSpPr>
-          <p:cNvPr id="1" name="PlaceHolder 2"/>
+          <p:cNvPr id="5" name="PlaceHolder 2"/>
           <p:cNvSpPr>
             <a:spLocks noGrp="1"/>
           </p:cNvSpPr>
@@ -3081,8 +3628,8 @@
         </p:nvSpPr>
         <p:spPr>
           <a:xfrm>
-            <a:off x="470160" y="9009360"/>
-            <a:ext cx="1538640" cy="517320"/>
+            <a:off x="668087" y="6340247"/>
+            <a:ext cx="2186376" cy="364059"/>
           </a:xfrm>
           <a:prstGeom prst="rect">
             <a:avLst/>
@@ -3102,9 +3649,9 @@
                 <a:spcPct val="100000"/>
               </a:lnSpc>
               <a:buNone/>
-              <a:defRPr b="0" lang="en-GB" sz="900" spc="-1" strike="noStrike">
+              <a:defRPr lang="en-GB" sz="633" b="0" strike="noStrike" spc="-1">
                 <a:solidFill>
-                  <a:srgbClr val="8b8b8b"/>
+                  <a:srgbClr val="8B8B8B"/>
                 </a:solidFill>
                 <a:latin typeface="Calibri"/>
               </a:defRPr>
@@ -3118,15 +3665,15 @@
               <a:buNone/>
             </a:pPr>
             <a:r>
-              <a:rPr b="0" lang="en-GB" sz="900" spc="-1" strike="noStrike">
+              <a:rPr lang="en-GB" sz="633" b="0" strike="noStrike" spc="-1">
                 <a:solidFill>
-                  <a:srgbClr val="8b8b8b"/>
+                  <a:srgbClr val="8B8B8B"/>
                 </a:solidFill>
                 <a:latin typeface="Calibri"/>
               </a:rPr>
               <a:t>&lt;date/time&gt;</a:t>
             </a:r>
-            <a:endParaRPr b="0" lang="en-GB" sz="900" spc="-1" strike="noStrike">
+            <a:endParaRPr lang="en-GB" sz="633" b="0" strike="noStrike" spc="-1">
               <a:latin typeface="Times New Roman"/>
             </a:endParaRPr>
           </a:p>
@@ -3144,8 +3691,8 @@
         </p:nvSpPr>
         <p:spPr>
           <a:xfrm>
-            <a:off x="2265840" y="9009360"/>
-            <a:ext cx="2308320" cy="517320"/>
+            <a:off x="3219712" y="6340247"/>
+            <a:ext cx="3280075" cy="364059"/>
           </a:xfrm>
           <a:prstGeom prst="rect">
             <a:avLst/>
@@ -3162,7 +3709,7 @@
           <a:lstStyle>
             <a:lvl1pPr algn="ctr">
               <a:buNone/>
-              <a:defRPr b="0" lang="en-GB" sz="1400" spc="-1" strike="noStrike">
+              <a:defRPr lang="en-GB" sz="985" b="0" strike="noStrike" spc="-1">
                 <a:latin typeface="Times New Roman"/>
               </a:defRPr>
             </a:lvl1pPr>
@@ -3172,14 +3719,11 @@
               <a:buNone/>
             </a:pPr>
             <a:r>
-              <a:rPr b="0" lang="en-GB" sz="1400" spc="-1" strike="noStrike">
+              <a:rPr lang="en-GB" sz="985" b="0" strike="noStrike" spc="-1">
                 <a:latin typeface="Times New Roman"/>
               </a:rPr>
               <a:t>&lt;footer&gt;</a:t>
             </a:r>
-            <a:endParaRPr b="0" lang="en-GB" sz="1400" spc="-1" strike="noStrike">
-              <a:latin typeface="Times New Roman"/>
-            </a:endParaRPr>
           </a:p>
         </p:txBody>
       </p:sp>
@@ -3195,8 +3739,8 @@
         </p:nvSpPr>
         <p:spPr>
           <a:xfrm>
-            <a:off x="4831200" y="9009360"/>
-            <a:ext cx="1538640" cy="517320"/>
+            <a:off x="6865035" y="6340247"/>
+            <a:ext cx="2186376" cy="364059"/>
           </a:xfrm>
           <a:prstGeom prst="rect">
             <a:avLst/>
@@ -3216,9 +3760,9 @@
                 <a:spcPct val="100000"/>
               </a:lnSpc>
               <a:buNone/>
-              <a:defRPr b="0" lang="en-GB" sz="900" spc="-1" strike="noStrike">
+              <a:defRPr lang="en-GB" sz="633" b="0" strike="noStrike" spc="-1">
                 <a:solidFill>
-                  <a:srgbClr val="8b8b8b"/>
+                  <a:srgbClr val="8B8B8B"/>
                 </a:solidFill>
                 <a:latin typeface="Calibri"/>
               </a:defRPr>
@@ -3232,15 +3776,15 @@
               <a:buNone/>
             </a:pPr>
             <a:fld id="{CC7119C9-843E-4CFC-9F2C-CC550EAD7F7B}" type="slidenum">
-              <a:rPr b="0" lang="en-GB" sz="900" spc="-1" strike="noStrike">
+              <a:rPr lang="en-GB" sz="633" b="0" strike="noStrike" spc="-1">
                 <a:solidFill>
-                  <a:srgbClr val="8b8b8b"/>
+                  <a:srgbClr val="8B8B8B"/>
                 </a:solidFill>
                 <a:latin typeface="Calibri"/>
               </a:rPr>
-              <a:t>&lt;number&gt;</a:t>
+              <a:t>‹#›</a:t>
             </a:fld>
-            <a:endParaRPr b="0" lang="en-GB" sz="900" spc="-1" strike="noStrike">
+            <a:endParaRPr lang="en-GB" sz="633" b="0" strike="noStrike" spc="-1">
               <a:latin typeface="Times New Roman"/>
             </a:endParaRPr>
           </a:p>
@@ -3248,26 +3792,306 @@
       </p:sp>
     </p:spTree>
   </p:cSld>
-  <p:clrMap bg1="lt1" bg2="lt2" tx1="dk1" tx2="dk2" accent1="accent1" accent2="accent2" accent3="accent3" accent4="accent4" accent5="accent5" accent6="accent6" hlink="hlink" folHlink="folHlink"/>
+  <p:clrMap bg1="lt1" tx1="dk1" bg2="lt2" tx2="dk2" accent1="accent1" accent2="accent2" accent3="accent3" accent4="accent4" accent5="accent5" accent6="accent6" hlink="hlink" folHlink="folHlink"/>
   <p:sldLayoutIdLst>
-    <p:sldLayoutId id="2147483649" r:id="rId2"/>
-    <p:sldLayoutId id="2147483650" r:id="rId3"/>
-    <p:sldLayoutId id="2147483651" r:id="rId4"/>
-    <p:sldLayoutId id="2147483652" r:id="rId5"/>
-    <p:sldLayoutId id="2147483653" r:id="rId6"/>
-    <p:sldLayoutId id="2147483654" r:id="rId7"/>
-    <p:sldLayoutId id="2147483655" r:id="rId8"/>
-    <p:sldLayoutId id="2147483656" r:id="rId9"/>
-    <p:sldLayoutId id="2147483657" r:id="rId10"/>
-    <p:sldLayoutId id="2147483658" r:id="rId11"/>
-    <p:sldLayoutId id="2147483659" r:id="rId12"/>
-    <p:sldLayoutId id="2147483660" r:id="rId13"/>
+    <p:sldLayoutId id="2147483649" r:id="rId1"/>
+    <p:sldLayoutId id="2147483650" r:id="rId2"/>
+    <p:sldLayoutId id="2147483651" r:id="rId3"/>
+    <p:sldLayoutId id="2147483652" r:id="rId4"/>
+    <p:sldLayoutId id="2147483653" r:id="rId5"/>
+    <p:sldLayoutId id="2147483654" r:id="rId6"/>
+    <p:sldLayoutId id="2147483655" r:id="rId7"/>
+    <p:sldLayoutId id="2147483656" r:id="rId8"/>
+    <p:sldLayoutId id="2147483657" r:id="rId9"/>
+    <p:sldLayoutId id="2147483658" r:id="rId10"/>
+    <p:sldLayoutId id="2147483659" r:id="rId11"/>
+    <p:sldLayoutId id="2147483660" r:id="rId12"/>
   </p:sldLayoutIdLst>
+  <p:txStyles>
+    <p:titleStyle>
+      <a:lvl1pPr algn="l" defTabSz="643463" rtl="0" eaLnBrk="1" latinLnBrk="0" hangingPunct="1">
+        <a:lnSpc>
+          <a:spcPct val="90000"/>
+        </a:lnSpc>
+        <a:spcBef>
+          <a:spcPct val="0"/>
+        </a:spcBef>
+        <a:buNone/>
+        <a:defRPr sz="3096" kern="1200">
+          <a:solidFill>
+            <a:schemeClr val="tx1"/>
+          </a:solidFill>
+          <a:latin typeface="+mj-lt"/>
+          <a:ea typeface="+mj-ea"/>
+          <a:cs typeface="+mj-cs"/>
+        </a:defRPr>
+      </a:lvl1pPr>
+    </p:titleStyle>
+    <p:bodyStyle>
+      <a:lvl1pPr marL="160866" indent="-160866" algn="l" defTabSz="643463" rtl="0" eaLnBrk="1" latinLnBrk="0" hangingPunct="1">
+        <a:lnSpc>
+          <a:spcPct val="90000"/>
+        </a:lnSpc>
+        <a:spcBef>
+          <a:spcPts val="704"/>
+        </a:spcBef>
+        <a:buFont typeface="Arial" panose="020B0604020202020204" pitchFamily="34" charset="0"/>
+        <a:buChar char="•"/>
+        <a:defRPr sz="1970" kern="1200">
+          <a:solidFill>
+            <a:schemeClr val="tx1"/>
+          </a:solidFill>
+          <a:latin typeface="+mn-lt"/>
+          <a:ea typeface="+mn-ea"/>
+          <a:cs typeface="+mn-cs"/>
+        </a:defRPr>
+      </a:lvl1pPr>
+      <a:lvl2pPr marL="482597" indent="-160866" algn="l" defTabSz="643463" rtl="0" eaLnBrk="1" latinLnBrk="0" hangingPunct="1">
+        <a:lnSpc>
+          <a:spcPct val="90000"/>
+        </a:lnSpc>
+        <a:spcBef>
+          <a:spcPts val="352"/>
+        </a:spcBef>
+        <a:buFont typeface="Arial" panose="020B0604020202020204" pitchFamily="34" charset="0"/>
+        <a:buChar char="•"/>
+        <a:defRPr sz="1689" kern="1200">
+          <a:solidFill>
+            <a:schemeClr val="tx1"/>
+          </a:solidFill>
+          <a:latin typeface="+mn-lt"/>
+          <a:ea typeface="+mn-ea"/>
+          <a:cs typeface="+mn-cs"/>
+        </a:defRPr>
+      </a:lvl2pPr>
+      <a:lvl3pPr marL="804329" indent="-160866" algn="l" defTabSz="643463" rtl="0" eaLnBrk="1" latinLnBrk="0" hangingPunct="1">
+        <a:lnSpc>
+          <a:spcPct val="90000"/>
+        </a:lnSpc>
+        <a:spcBef>
+          <a:spcPts val="352"/>
+        </a:spcBef>
+        <a:buFont typeface="Arial" panose="020B0604020202020204" pitchFamily="34" charset="0"/>
+        <a:buChar char="•"/>
+        <a:defRPr sz="1407" kern="1200">
+          <a:solidFill>
+            <a:schemeClr val="tx1"/>
+          </a:solidFill>
+          <a:latin typeface="+mn-lt"/>
+          <a:ea typeface="+mn-ea"/>
+          <a:cs typeface="+mn-cs"/>
+        </a:defRPr>
+      </a:lvl3pPr>
+      <a:lvl4pPr marL="1126061" indent="-160866" algn="l" defTabSz="643463" rtl="0" eaLnBrk="1" latinLnBrk="0" hangingPunct="1">
+        <a:lnSpc>
+          <a:spcPct val="90000"/>
+        </a:lnSpc>
+        <a:spcBef>
+          <a:spcPts val="352"/>
+        </a:spcBef>
+        <a:buFont typeface="Arial" panose="020B0604020202020204" pitchFamily="34" charset="0"/>
+        <a:buChar char="•"/>
+        <a:defRPr sz="1267" kern="1200">
+          <a:solidFill>
+            <a:schemeClr val="tx1"/>
+          </a:solidFill>
+          <a:latin typeface="+mn-lt"/>
+          <a:ea typeface="+mn-ea"/>
+          <a:cs typeface="+mn-cs"/>
+        </a:defRPr>
+      </a:lvl4pPr>
+      <a:lvl5pPr marL="1447792" indent="-160866" algn="l" defTabSz="643463" rtl="0" eaLnBrk="1" latinLnBrk="0" hangingPunct="1">
+        <a:lnSpc>
+          <a:spcPct val="90000"/>
+        </a:lnSpc>
+        <a:spcBef>
+          <a:spcPts val="352"/>
+        </a:spcBef>
+        <a:buFont typeface="Arial" panose="020B0604020202020204" pitchFamily="34" charset="0"/>
+        <a:buChar char="•"/>
+        <a:defRPr sz="1267" kern="1200">
+          <a:solidFill>
+            <a:schemeClr val="tx1"/>
+          </a:solidFill>
+          <a:latin typeface="+mn-lt"/>
+          <a:ea typeface="+mn-ea"/>
+          <a:cs typeface="+mn-cs"/>
+        </a:defRPr>
+      </a:lvl5pPr>
+      <a:lvl6pPr marL="1769524" indent="-160866" algn="l" defTabSz="643463" rtl="0" eaLnBrk="1" latinLnBrk="0" hangingPunct="1">
+        <a:lnSpc>
+          <a:spcPct val="90000"/>
+        </a:lnSpc>
+        <a:spcBef>
+          <a:spcPts val="352"/>
+        </a:spcBef>
+        <a:buFont typeface="Arial" panose="020B0604020202020204" pitchFamily="34" charset="0"/>
+        <a:buChar char="•"/>
+        <a:defRPr sz="1267" kern="1200">
+          <a:solidFill>
+            <a:schemeClr val="tx1"/>
+          </a:solidFill>
+          <a:latin typeface="+mn-lt"/>
+          <a:ea typeface="+mn-ea"/>
+          <a:cs typeface="+mn-cs"/>
+        </a:defRPr>
+      </a:lvl6pPr>
+      <a:lvl7pPr marL="2091256" indent="-160866" algn="l" defTabSz="643463" rtl="0" eaLnBrk="1" latinLnBrk="0" hangingPunct="1">
+        <a:lnSpc>
+          <a:spcPct val="90000"/>
+        </a:lnSpc>
+        <a:spcBef>
+          <a:spcPts val="352"/>
+        </a:spcBef>
+        <a:buFont typeface="Arial" panose="020B0604020202020204" pitchFamily="34" charset="0"/>
+        <a:buChar char="•"/>
+        <a:defRPr sz="1267" kern="1200">
+          <a:solidFill>
+            <a:schemeClr val="tx1"/>
+          </a:solidFill>
+          <a:latin typeface="+mn-lt"/>
+          <a:ea typeface="+mn-ea"/>
+          <a:cs typeface="+mn-cs"/>
+        </a:defRPr>
+      </a:lvl7pPr>
+      <a:lvl8pPr marL="2412987" indent="-160866" algn="l" defTabSz="643463" rtl="0" eaLnBrk="1" latinLnBrk="0" hangingPunct="1">
+        <a:lnSpc>
+          <a:spcPct val="90000"/>
+        </a:lnSpc>
+        <a:spcBef>
+          <a:spcPts val="352"/>
+        </a:spcBef>
+        <a:buFont typeface="Arial" panose="020B0604020202020204" pitchFamily="34" charset="0"/>
+        <a:buChar char="•"/>
+        <a:defRPr sz="1267" kern="1200">
+          <a:solidFill>
+            <a:schemeClr val="tx1"/>
+          </a:solidFill>
+          <a:latin typeface="+mn-lt"/>
+          <a:ea typeface="+mn-ea"/>
+          <a:cs typeface="+mn-cs"/>
+        </a:defRPr>
+      </a:lvl8pPr>
+      <a:lvl9pPr marL="2734719" indent="-160866" algn="l" defTabSz="643463" rtl="0" eaLnBrk="1" latinLnBrk="0" hangingPunct="1">
+        <a:lnSpc>
+          <a:spcPct val="90000"/>
+        </a:lnSpc>
+        <a:spcBef>
+          <a:spcPts val="352"/>
+        </a:spcBef>
+        <a:buFont typeface="Arial" panose="020B0604020202020204" pitchFamily="34" charset="0"/>
+        <a:buChar char="•"/>
+        <a:defRPr sz="1267" kern="1200">
+          <a:solidFill>
+            <a:schemeClr val="tx1"/>
+          </a:solidFill>
+          <a:latin typeface="+mn-lt"/>
+          <a:ea typeface="+mn-ea"/>
+          <a:cs typeface="+mn-cs"/>
+        </a:defRPr>
+      </a:lvl9pPr>
+    </p:bodyStyle>
+    <p:otherStyle>
+      <a:defPPr>
+        <a:defRPr lang="en-FI"/>
+      </a:defPPr>
+      <a:lvl1pPr marL="0" algn="l" defTabSz="643463" rtl="0" eaLnBrk="1" latinLnBrk="0" hangingPunct="1">
+        <a:defRPr sz="1267" kern="1200">
+          <a:solidFill>
+            <a:schemeClr val="tx1"/>
+          </a:solidFill>
+          <a:latin typeface="+mn-lt"/>
+          <a:ea typeface="+mn-ea"/>
+          <a:cs typeface="+mn-cs"/>
+        </a:defRPr>
+      </a:lvl1pPr>
+      <a:lvl2pPr marL="321732" algn="l" defTabSz="643463" rtl="0" eaLnBrk="1" latinLnBrk="0" hangingPunct="1">
+        <a:defRPr sz="1267" kern="1200">
+          <a:solidFill>
+            <a:schemeClr val="tx1"/>
+          </a:solidFill>
+          <a:latin typeface="+mn-lt"/>
+          <a:ea typeface="+mn-ea"/>
+          <a:cs typeface="+mn-cs"/>
+        </a:defRPr>
+      </a:lvl2pPr>
+      <a:lvl3pPr marL="643463" algn="l" defTabSz="643463" rtl="0" eaLnBrk="1" latinLnBrk="0" hangingPunct="1">
+        <a:defRPr sz="1267" kern="1200">
+          <a:solidFill>
+            <a:schemeClr val="tx1"/>
+          </a:solidFill>
+          <a:latin typeface="+mn-lt"/>
+          <a:ea typeface="+mn-ea"/>
+          <a:cs typeface="+mn-cs"/>
+        </a:defRPr>
+      </a:lvl3pPr>
+      <a:lvl4pPr marL="965195" algn="l" defTabSz="643463" rtl="0" eaLnBrk="1" latinLnBrk="0" hangingPunct="1">
+        <a:defRPr sz="1267" kern="1200">
+          <a:solidFill>
+            <a:schemeClr val="tx1"/>
+          </a:solidFill>
+          <a:latin typeface="+mn-lt"/>
+          <a:ea typeface="+mn-ea"/>
+          <a:cs typeface="+mn-cs"/>
+        </a:defRPr>
+      </a:lvl4pPr>
+      <a:lvl5pPr marL="1286927" algn="l" defTabSz="643463" rtl="0" eaLnBrk="1" latinLnBrk="0" hangingPunct="1">
+        <a:defRPr sz="1267" kern="1200">
+          <a:solidFill>
+            <a:schemeClr val="tx1"/>
+          </a:solidFill>
+          <a:latin typeface="+mn-lt"/>
+          <a:ea typeface="+mn-ea"/>
+          <a:cs typeface="+mn-cs"/>
+        </a:defRPr>
+      </a:lvl5pPr>
+      <a:lvl6pPr marL="1608658" algn="l" defTabSz="643463" rtl="0" eaLnBrk="1" latinLnBrk="0" hangingPunct="1">
+        <a:defRPr sz="1267" kern="1200">
+          <a:solidFill>
+            <a:schemeClr val="tx1"/>
+          </a:solidFill>
+          <a:latin typeface="+mn-lt"/>
+          <a:ea typeface="+mn-ea"/>
+          <a:cs typeface="+mn-cs"/>
+        </a:defRPr>
+      </a:lvl6pPr>
+      <a:lvl7pPr marL="1930390" algn="l" defTabSz="643463" rtl="0" eaLnBrk="1" latinLnBrk="0" hangingPunct="1">
+        <a:defRPr sz="1267" kern="1200">
+          <a:solidFill>
+            <a:schemeClr val="tx1"/>
+          </a:solidFill>
+          <a:latin typeface="+mn-lt"/>
+          <a:ea typeface="+mn-ea"/>
+          <a:cs typeface="+mn-cs"/>
+        </a:defRPr>
+      </a:lvl7pPr>
+      <a:lvl8pPr marL="2252121" algn="l" defTabSz="643463" rtl="0" eaLnBrk="1" latinLnBrk="0" hangingPunct="1">
+        <a:defRPr sz="1267" kern="1200">
+          <a:solidFill>
+            <a:schemeClr val="tx1"/>
+          </a:solidFill>
+          <a:latin typeface="+mn-lt"/>
+          <a:ea typeface="+mn-ea"/>
+          <a:cs typeface="+mn-cs"/>
+        </a:defRPr>
+      </a:lvl8pPr>
+      <a:lvl9pPr marL="2573853" algn="l" defTabSz="643463" rtl="0" eaLnBrk="1" latinLnBrk="0" hangingPunct="1">
+        <a:defRPr sz="1267" kern="1200">
+          <a:solidFill>
+            <a:schemeClr val="tx1"/>
+          </a:solidFill>
+          <a:latin typeface="+mn-lt"/>
+          <a:ea typeface="+mn-ea"/>
+          <a:cs typeface="+mn-cs"/>
+        </a:defRPr>
+      </a:lvl9pPr>
+    </p:otherStyle>
+  </p:txStyles>
 </p:sldMaster>
 </file>
 
 <file path=ppt/slides/slide1.xml><?xml version="1.0" encoding="utf-8"?>
-<p:sld xmlns:a="http://schemas.openxmlformats.org/drawingml/2006/main" xmlns:p="http://schemas.openxmlformats.org/presentationml/2006/main" xmlns:r="http://schemas.openxmlformats.org/officeDocument/2006/relationships" xmlns:p14="http://schemas.microsoft.com/office/powerpoint/2010/main" xmlns:p15="http://schemas.microsoft.com/office/powerpoint/2012/main" xmlns:mc="http://schemas.openxmlformats.org/markup-compatibility/2006">
+<p:sld xmlns:a="http://schemas.openxmlformats.org/drawingml/2006/main" xmlns:r="http://schemas.openxmlformats.org/officeDocument/2006/relationships" xmlns:p="http://schemas.openxmlformats.org/presentationml/2006/main">
   <p:cSld>
     <p:spTree>
       <p:nvGrpSpPr>
@@ -3291,14 +4115,14 @@
         </p:nvSpPr>
         <p:spPr>
           <a:xfrm>
-            <a:off x="1183320" y="2366640"/>
-            <a:ext cx="537480" cy="396000"/>
+            <a:off x="3285901" y="1665500"/>
+            <a:ext cx="378246" cy="278681"/>
           </a:xfrm>
           <a:prstGeom prst="rect">
             <a:avLst/>
           </a:prstGeom>
           <a:solidFill>
-            <a:srgbClr val="ffffff"/>
+            <a:srgbClr val="FFFFFF"/>
           </a:solidFill>
           <a:ln>
             <a:noFill/>
@@ -3319,122 +4143,20 @@
       </p:sp>
       <p:sp>
         <p:nvSpPr>
-          <p:cNvPr id="47" name="TextBox 10"/>
-          <p:cNvSpPr/>
-          <p:nvPr/>
-        </p:nvSpPr>
-        <p:spPr>
-          <a:xfrm>
-            <a:off x="1643040" y="1947600"/>
-            <a:ext cx="350280" cy="455400"/>
-          </a:xfrm>
-          <a:prstGeom prst="rect">
-            <a:avLst/>
-          </a:prstGeom>
-          <a:noFill/>
-          <a:ln w="0">
-            <a:noFill/>
-          </a:ln>
-        </p:spPr>
-        <p:style>
-          <a:lnRef idx="0"/>
-          <a:fillRef idx="0"/>
-          <a:effectRef idx="0"/>
-          <a:fontRef idx="minor"/>
-        </p:style>
-        <p:txBody>
-          <a:bodyPr wrap="none" lIns="90000" rIns="90000" tIns="45000" bIns="45000" anchor="t">
-            <a:spAutoFit/>
-          </a:bodyPr>
-          <a:p>
-            <a:pPr>
-              <a:lnSpc>
-                <a:spcPct val="100000"/>
-              </a:lnSpc>
-              <a:buNone/>
-            </a:pPr>
-            <a:r>
-              <a:rPr b="1" lang="en-GB" sz="2400" spc="-1" strike="noStrike">
-                <a:solidFill>
-                  <a:srgbClr val="000000"/>
-                </a:solidFill>
-                <a:latin typeface="Arial"/>
-              </a:rPr>
-              <a:t>a</a:t>
-            </a:r>
-            <a:endParaRPr b="0" lang="en-GB" sz="2400" spc="-1" strike="noStrike">
-              <a:latin typeface="Arial"/>
-            </a:endParaRPr>
-          </a:p>
-        </p:txBody>
-      </p:sp>
-      <p:sp>
-        <p:nvSpPr>
-          <p:cNvPr id="48" name="TextBox 11"/>
-          <p:cNvSpPr/>
-          <p:nvPr/>
-        </p:nvSpPr>
-        <p:spPr>
-          <a:xfrm>
-            <a:off x="1635120" y="4683600"/>
-            <a:ext cx="365400" cy="455400"/>
-          </a:xfrm>
-          <a:prstGeom prst="rect">
-            <a:avLst/>
-          </a:prstGeom>
-          <a:noFill/>
-          <a:ln w="0">
-            <a:noFill/>
-          </a:ln>
-        </p:spPr>
-        <p:style>
-          <a:lnRef idx="0"/>
-          <a:fillRef idx="0"/>
-          <a:effectRef idx="0"/>
-          <a:fontRef idx="minor"/>
-        </p:style>
-        <p:txBody>
-          <a:bodyPr wrap="none" lIns="90000" rIns="90000" tIns="45000" bIns="45000" anchor="t">
-            <a:spAutoFit/>
-          </a:bodyPr>
-          <a:p>
-            <a:pPr>
-              <a:lnSpc>
-                <a:spcPct val="100000"/>
-              </a:lnSpc>
-              <a:buNone/>
-            </a:pPr>
-            <a:r>
-              <a:rPr b="1" lang="en-GB" sz="2400" spc="-1" strike="noStrike">
-                <a:solidFill>
-                  <a:srgbClr val="000000"/>
-                </a:solidFill>
-                <a:latin typeface="Arial"/>
-              </a:rPr>
-              <a:t>b</a:t>
-            </a:r>
-            <a:endParaRPr b="0" lang="en-GB" sz="2400" spc="-1" strike="noStrike">
-              <a:latin typeface="Arial"/>
-            </a:endParaRPr>
-          </a:p>
-        </p:txBody>
-      </p:sp>
-      <p:sp>
-        <p:nvSpPr>
           <p:cNvPr id="49" name="Rectangle 8"/>
           <p:cNvSpPr/>
           <p:nvPr/>
         </p:nvSpPr>
         <p:spPr>
           <a:xfrm>
-            <a:off x="2067840" y="2366640"/>
-            <a:ext cx="238680" cy="1199880"/>
+            <a:off x="3908372" y="1665499"/>
+            <a:ext cx="167969" cy="844404"/>
           </a:xfrm>
           <a:prstGeom prst="rect">
             <a:avLst/>
           </a:prstGeom>
           <a:solidFill>
-            <a:srgbClr val="ffffff"/>
+            <a:srgbClr val="FFFFFF"/>
           </a:solidFill>
           <a:ln>
             <a:noFill/>
@@ -3453,30 +4175,6 @@
           <a:fontRef idx="minor"/>
         </p:style>
       </p:sp>
-      <p:pic>
-        <p:nvPicPr>
-          <p:cNvPr id="50" name="Picture 4" descr="A picture containing text, clipart&#10;&#10;Description automatically generated"/>
-          <p:cNvPicPr/>
-          <p:nvPr/>
-        </p:nvPicPr>
-        <p:blipFill>
-          <a:blip r:embed="rId1"/>
-          <a:srcRect l="0" t="0" r="17264" b="0"/>
-          <a:stretch/>
-        </p:blipFill>
-        <p:spPr>
-          <a:xfrm>
-            <a:off x="2164680" y="2352600"/>
-            <a:ext cx="226440" cy="1128240"/>
-          </a:xfrm>
-          <a:prstGeom prst="rect">
-            <a:avLst/>
-          </a:prstGeom>
-          <a:ln w="0">
-            <a:noFill/>
-          </a:ln>
-        </p:spPr>
-      </p:pic>
       <p:sp>
         <p:nvSpPr>
           <p:cNvPr id="51" name="Rectangle 1"/>
@@ -3485,8 +4183,8 @@
         </p:nvSpPr>
         <p:spPr>
           <a:xfrm>
-            <a:off x="2164680" y="446400"/>
-            <a:ext cx="238680" cy="1071720"/>
+            <a:off x="3976523" y="314150"/>
+            <a:ext cx="167969" cy="754212"/>
           </a:xfrm>
           <a:prstGeom prst="rect">
             <a:avLst/>
@@ -3515,292 +4213,303 @@
       </p:sp>
       <p:pic>
         <p:nvPicPr>
-          <p:cNvPr id="52" name="Picture 17" descr=""/>
-          <p:cNvPicPr/>
+          <p:cNvPr id="5" name="Picture 4" descr="Chart&#10;&#10;Description automatically generated with medium confidence">
+            <a:extLst>
+              <a:ext uri="{FF2B5EF4-FFF2-40B4-BE49-F238E27FC236}">
+                <a16:creationId xmlns:a16="http://schemas.microsoft.com/office/drawing/2014/main" id="{C81DEC93-61DC-6186-D061-9A9CBA440023}"/>
+              </a:ext>
+            </a:extLst>
+          </p:cNvPr>
+          <p:cNvPicPr>
+            <a:picLocks noChangeAspect="1"/>
+          </p:cNvPicPr>
           <p:nvPr/>
         </p:nvPicPr>
         <p:blipFill>
-          <a:blip r:embed="rId2"/>
-          <a:srcRect l="9230" t="39960" r="1567" b="0"/>
-          <a:stretch/>
+          <a:blip r:embed="rId3">
+            <a:extLst>
+              <a:ext uri="{28A0092B-C50C-407E-A947-70E740481C1C}">
+                <a14:useLocalDpi xmlns:a14="http://schemas.microsoft.com/office/drawing/2010/main" val="0"/>
+              </a:ext>
+            </a:extLst>
+          </a:blip>
+          <a:stretch>
+            <a:fillRect/>
+          </a:stretch>
         </p:blipFill>
         <p:spPr>
           <a:xfrm>
-            <a:off x="2467080" y="1980000"/>
-            <a:ext cx="4341600" cy="2921760"/>
-          </a:xfrm>
-          <a:prstGeom prst="rect">
-            <a:avLst/>
-          </a:prstGeom>
-          <a:ln w="0">
-            <a:noFill/>
-          </a:ln>
+            <a:off x="2946266" y="0"/>
+            <a:ext cx="2927796" cy="2927796"/>
+          </a:xfrm>
+          <a:prstGeom prst="rect">
+            <a:avLst/>
+          </a:prstGeom>
         </p:spPr>
       </p:pic>
       <p:pic>
         <p:nvPicPr>
-          <p:cNvPr id="53" name="Picture 6" descr="Chart&#10;&#10;Description automatically generated"/>
-          <p:cNvPicPr/>
+          <p:cNvPr id="17" name="Picture 16" descr="A picture containing chart&#10;&#10;Description automatically generated">
+            <a:extLst>
+              <a:ext uri="{FF2B5EF4-FFF2-40B4-BE49-F238E27FC236}">
+                <a16:creationId xmlns:a16="http://schemas.microsoft.com/office/drawing/2014/main" id="{CBB9C101-AC7B-E6B6-3D16-0FD2D7587BED}"/>
+              </a:ext>
+            </a:extLst>
+          </p:cNvPr>
+          <p:cNvPicPr>
+            <a:picLocks noChangeAspect="1"/>
+          </p:cNvPicPr>
           <p:nvPr/>
         </p:nvPicPr>
         <p:blipFill>
-          <a:blip r:embed="rId3"/>
-          <a:srcRect l="19029" t="5636" r="4167" b="15787"/>
-          <a:stretch/>
+          <a:blip r:embed="rId4">
+            <a:extLst>
+              <a:ext uri="{28A0092B-C50C-407E-A947-70E740481C1C}">
+                <a14:useLocalDpi xmlns:a14="http://schemas.microsoft.com/office/drawing/2010/main" val="0"/>
+              </a:ext>
+            </a:extLst>
+          </a:blip>
+          <a:stretch>
+            <a:fillRect/>
+          </a:stretch>
         </p:blipFill>
         <p:spPr>
           <a:xfrm>
-            <a:off x="3044160" y="4806720"/>
-            <a:ext cx="3810960" cy="3899160"/>
-          </a:xfrm>
-          <a:prstGeom prst="rect">
-            <a:avLst/>
-          </a:prstGeom>
-          <a:ln w="0">
-            <a:noFill/>
-          </a:ln>
+            <a:off x="5874062" y="0"/>
+            <a:ext cx="2927796" cy="2927796"/>
+          </a:xfrm>
+          <a:prstGeom prst="rect">
+            <a:avLst/>
+          </a:prstGeom>
         </p:spPr>
       </p:pic>
       <p:pic>
         <p:nvPicPr>
-          <p:cNvPr id="54" name="Picture 19" descr=""/>
-          <p:cNvPicPr/>
+          <p:cNvPr id="21" name="Picture 20">
+            <a:extLst>
+              <a:ext uri="{FF2B5EF4-FFF2-40B4-BE49-F238E27FC236}">
+                <a16:creationId xmlns:a16="http://schemas.microsoft.com/office/drawing/2014/main" id="{819CD6F7-6809-403B-6820-8ED43F1B17E4}"/>
+              </a:ext>
+            </a:extLst>
+          </p:cNvPr>
+          <p:cNvPicPr>
+            <a:picLocks noChangeAspect="1"/>
+          </p:cNvPicPr>
           <p:nvPr/>
         </p:nvPicPr>
         <p:blipFill>
-          <a:blip r:embed="rId4"/>
-          <a:stretch/>
+          <a:blip r:embed="rId5">
+            <a:extLst>
+              <a:ext uri="{28A0092B-C50C-407E-A947-70E740481C1C}">
+                <a14:useLocalDpi xmlns:a14="http://schemas.microsoft.com/office/drawing/2010/main" val="0"/>
+              </a:ext>
+            </a:extLst>
+          </a:blip>
+          <a:stretch>
+            <a:fillRect/>
+          </a:stretch>
         </p:blipFill>
         <p:spPr>
           <a:xfrm>
-            <a:off x="2788560" y="5754960"/>
-            <a:ext cx="255240" cy="242640"/>
-          </a:xfrm>
-          <a:prstGeom prst="rect">
-            <a:avLst/>
-          </a:prstGeom>
-          <a:ln w="0">
-            <a:noFill/>
-          </a:ln>
+            <a:off x="24282" y="0"/>
+            <a:ext cx="2802045" cy="2802045"/>
+          </a:xfrm>
+          <a:prstGeom prst="rect">
+            <a:avLst/>
+          </a:prstGeom>
         </p:spPr>
       </p:pic>
-      <p:pic>
-        <p:nvPicPr>
-          <p:cNvPr id="55" name="Picture 27" descr=""/>
-          <p:cNvPicPr/>
+      <p:sp>
+        <p:nvSpPr>
+          <p:cNvPr id="47" name="TextBox 10"/>
+          <p:cNvSpPr/>
           <p:nvPr/>
-        </p:nvPicPr>
-        <p:blipFill>
-          <a:blip r:embed="rId5"/>
-          <a:stretch/>
-        </p:blipFill>
-        <p:spPr>
-          <a:xfrm>
-            <a:off x="2683080" y="6756480"/>
-            <a:ext cx="360720" cy="242640"/>
-          </a:xfrm>
-          <a:prstGeom prst="rect">
-            <a:avLst/>
-          </a:prstGeom>
-          <a:ln w="0">
-            <a:noFill/>
-          </a:ln>
-        </p:spPr>
-      </p:pic>
-      <p:pic>
-        <p:nvPicPr>
-          <p:cNvPr id="56" name="Picture 29" descr=""/>
-          <p:cNvPicPr/>
+        </p:nvSpPr>
+        <p:spPr>
+          <a:xfrm>
+            <a:off x="18470" y="-9747"/>
+            <a:ext cx="248009" cy="323897"/>
+          </a:xfrm>
+          <a:prstGeom prst="rect">
+            <a:avLst/>
+          </a:prstGeom>
+          <a:noFill/>
+          <a:ln w="0">
+            <a:noFill/>
+          </a:ln>
+        </p:spPr>
+        <p:style>
+          <a:lnRef idx="0">
+            <a:scrgbClr r="0" g="0" b="0"/>
+          </a:lnRef>
+          <a:fillRef idx="0">
+            <a:scrgbClr r="0" g="0" b="0"/>
+          </a:fillRef>
+          <a:effectRef idx="0">
+            <a:scrgbClr r="0" g="0" b="0"/>
+          </a:effectRef>
+          <a:fontRef idx="minor"/>
+        </p:style>
+        <p:txBody>
+          <a:bodyPr wrap="none" lIns="63337" tIns="31668" rIns="63337" bIns="31668" anchor="t">
+            <a:spAutoFit/>
+          </a:bodyPr>
+          <a:lstStyle/>
+          <a:p>
+            <a:pPr>
+              <a:lnSpc>
+                <a:spcPct val="100000"/>
+              </a:lnSpc>
+              <a:buNone/>
+            </a:pPr>
+            <a:r>
+              <a:rPr lang="en-GB" sz="1689" b="1" spc="-1" dirty="0">
+                <a:solidFill>
+                  <a:srgbClr val="000000"/>
+                </a:solidFill>
+                <a:latin typeface="Arial"/>
+              </a:rPr>
+              <a:t>a</a:t>
+            </a:r>
+            <a:endParaRPr lang="en-GB" sz="1689" spc="-1" dirty="0">
+              <a:latin typeface="Arial"/>
+            </a:endParaRPr>
+          </a:p>
+        </p:txBody>
+      </p:sp>
+      <p:sp>
+        <p:nvSpPr>
+          <p:cNvPr id="22" name="TextBox 10">
+            <a:extLst>
+              <a:ext uri="{FF2B5EF4-FFF2-40B4-BE49-F238E27FC236}">
+                <a16:creationId xmlns:a16="http://schemas.microsoft.com/office/drawing/2014/main" id="{04D65FE6-0491-EE9A-2FC5-E7B6100F3660}"/>
+              </a:ext>
+            </a:extLst>
+          </p:cNvPr>
+          <p:cNvSpPr/>
           <p:nvPr/>
-        </p:nvPicPr>
-        <p:blipFill>
-          <a:blip r:embed="rId6"/>
-          <a:stretch/>
-        </p:blipFill>
-        <p:spPr>
-          <a:xfrm>
-            <a:off x="2680200" y="7702560"/>
-            <a:ext cx="363960" cy="242640"/>
-          </a:xfrm>
-          <a:prstGeom prst="rect">
-            <a:avLst/>
-          </a:prstGeom>
-          <a:ln w="0">
-            <a:noFill/>
-          </a:ln>
-        </p:spPr>
-      </p:pic>
-      <p:pic>
-        <p:nvPicPr>
-          <p:cNvPr id="57" name="Picture 23" descr=""/>
-          <p:cNvPicPr/>
+        </p:nvSpPr>
+        <p:spPr>
+          <a:xfrm>
+            <a:off x="3037892" y="-9748"/>
+            <a:ext cx="260833" cy="323897"/>
+          </a:xfrm>
+          <a:prstGeom prst="rect">
+            <a:avLst/>
+          </a:prstGeom>
+          <a:noFill/>
+          <a:ln w="0">
+            <a:noFill/>
+          </a:ln>
+        </p:spPr>
+        <p:style>
+          <a:lnRef idx="0">
+            <a:scrgbClr r="0" g="0" b="0"/>
+          </a:lnRef>
+          <a:fillRef idx="0">
+            <a:scrgbClr r="0" g="0" b="0"/>
+          </a:fillRef>
+          <a:effectRef idx="0">
+            <a:scrgbClr r="0" g="0" b="0"/>
+          </a:effectRef>
+          <a:fontRef idx="minor"/>
+        </p:style>
+        <p:txBody>
+          <a:bodyPr wrap="none" lIns="63337" tIns="31668" rIns="63337" bIns="31668" anchor="t">
+            <a:spAutoFit/>
+          </a:bodyPr>
+          <a:lstStyle/>
+          <a:p>
+            <a:pPr>
+              <a:lnSpc>
+                <a:spcPct val="100000"/>
+              </a:lnSpc>
+              <a:buNone/>
+            </a:pPr>
+            <a:r>
+              <a:rPr lang="en-GB" sz="1689" b="1" spc="-1" dirty="0">
+                <a:solidFill>
+                  <a:srgbClr val="000000"/>
+                </a:solidFill>
+                <a:latin typeface="Arial"/>
+              </a:rPr>
+              <a:t>b</a:t>
+            </a:r>
+            <a:endParaRPr lang="en-GB" sz="1689" spc="-1" dirty="0">
+              <a:latin typeface="Arial"/>
+            </a:endParaRPr>
+          </a:p>
+        </p:txBody>
+      </p:sp>
+      <p:sp>
+        <p:nvSpPr>
+          <p:cNvPr id="23" name="TextBox 10">
+            <a:extLst>
+              <a:ext uri="{FF2B5EF4-FFF2-40B4-BE49-F238E27FC236}">
+                <a16:creationId xmlns:a16="http://schemas.microsoft.com/office/drawing/2014/main" id="{BB2807E3-E894-FBDB-3D7E-65767D37D1F3}"/>
+              </a:ext>
+            </a:extLst>
+          </p:cNvPr>
+          <p:cNvSpPr/>
           <p:nvPr/>
-        </p:nvPicPr>
-        <p:blipFill>
-          <a:blip r:embed="rId7"/>
-          <a:stretch/>
-        </p:blipFill>
-        <p:spPr>
-          <a:xfrm>
-            <a:off x="2887920" y="4780800"/>
-            <a:ext cx="156240" cy="242640"/>
-          </a:xfrm>
-          <a:prstGeom prst="rect">
-            <a:avLst/>
-          </a:prstGeom>
-          <a:ln w="0">
-            <a:noFill/>
-          </a:ln>
-        </p:spPr>
-      </p:pic>
-      <p:pic>
-        <p:nvPicPr>
-          <p:cNvPr id="58" name="Picture 5" descr=""/>
-          <p:cNvPicPr/>
-          <p:nvPr/>
-        </p:nvPicPr>
-        <p:blipFill>
-          <a:blip r:embed="rId8"/>
-          <a:stretch/>
-        </p:blipFill>
-        <p:spPr>
-          <a:xfrm>
-            <a:off x="2171880" y="6424920"/>
-            <a:ext cx="269280" cy="1277280"/>
-          </a:xfrm>
-          <a:prstGeom prst="rect">
-            <a:avLst/>
-          </a:prstGeom>
-          <a:ln w="0">
-            <a:noFill/>
-          </a:ln>
-        </p:spPr>
-      </p:pic>
-      <p:pic>
-        <p:nvPicPr>
-          <p:cNvPr id="59" name="Picture 16" descr=""/>
-          <p:cNvPicPr/>
-          <p:nvPr/>
-        </p:nvPicPr>
-        <p:blipFill>
-          <a:blip r:embed="rId9"/>
-          <a:stretch/>
-        </p:blipFill>
-        <p:spPr>
-          <a:xfrm>
-            <a:off x="3093480" y="8688960"/>
-            <a:ext cx="156240" cy="242640"/>
-          </a:xfrm>
-          <a:prstGeom prst="rect">
-            <a:avLst/>
-          </a:prstGeom>
-          <a:ln w="0">
-            <a:noFill/>
-          </a:ln>
-        </p:spPr>
-      </p:pic>
-      <p:pic>
-        <p:nvPicPr>
-          <p:cNvPr id="60" name="Picture 13" descr=""/>
-          <p:cNvPicPr/>
-          <p:nvPr/>
-        </p:nvPicPr>
-        <p:blipFill>
-          <a:blip r:embed="rId10"/>
-          <a:stretch/>
-        </p:blipFill>
-        <p:spPr>
-          <a:xfrm>
-            <a:off x="4319280" y="8949240"/>
-            <a:ext cx="1261440" cy="258480"/>
-          </a:xfrm>
-          <a:prstGeom prst="rect">
-            <a:avLst/>
-          </a:prstGeom>
-          <a:ln w="0">
-            <a:noFill/>
-          </a:ln>
-        </p:spPr>
-      </p:pic>
-      <p:pic>
-        <p:nvPicPr>
-          <p:cNvPr id="61" name="Picture 30" descr=""/>
-          <p:cNvPicPr/>
-          <p:nvPr/>
-        </p:nvPicPr>
-        <p:blipFill>
-          <a:blip r:embed="rId11"/>
-          <a:stretch/>
-        </p:blipFill>
-        <p:spPr>
-          <a:xfrm>
-            <a:off x="3967560" y="8712360"/>
-            <a:ext cx="255240" cy="242640"/>
-          </a:xfrm>
-          <a:prstGeom prst="rect">
-            <a:avLst/>
-          </a:prstGeom>
-          <a:ln w="0">
-            <a:noFill/>
-          </a:ln>
-        </p:spPr>
-      </p:pic>
-      <p:pic>
-        <p:nvPicPr>
-          <p:cNvPr id="62" name="Picture 31" descr=""/>
-          <p:cNvPicPr/>
-          <p:nvPr/>
-        </p:nvPicPr>
-        <p:blipFill>
-          <a:blip r:embed="rId12"/>
-          <a:stretch/>
-        </p:blipFill>
-        <p:spPr>
-          <a:xfrm>
-            <a:off x="4868640" y="8706240"/>
-            <a:ext cx="360720" cy="242640"/>
-          </a:xfrm>
-          <a:prstGeom prst="rect">
-            <a:avLst/>
-          </a:prstGeom>
-          <a:ln w="0">
-            <a:noFill/>
-          </a:ln>
-        </p:spPr>
-      </p:pic>
-      <p:pic>
-        <p:nvPicPr>
-          <p:cNvPr id="63" name="Picture 32" descr=""/>
-          <p:cNvPicPr/>
-          <p:nvPr/>
-        </p:nvPicPr>
-        <p:blipFill>
-          <a:blip r:embed="rId13"/>
-          <a:stretch/>
-        </p:blipFill>
-        <p:spPr>
-          <a:xfrm>
-            <a:off x="5842080" y="8706240"/>
-            <a:ext cx="363960" cy="242640"/>
-          </a:xfrm>
-          <a:prstGeom prst="rect">
-            <a:avLst/>
-          </a:prstGeom>
-          <a:ln w="0">
-            <a:noFill/>
-          </a:ln>
-        </p:spPr>
-      </p:pic>
+        </p:nvSpPr>
+        <p:spPr>
+          <a:xfrm>
+            <a:off x="5994001" y="-9749"/>
+            <a:ext cx="248009" cy="323897"/>
+          </a:xfrm>
+          <a:prstGeom prst="rect">
+            <a:avLst/>
+          </a:prstGeom>
+          <a:noFill/>
+          <a:ln w="0">
+            <a:noFill/>
+          </a:ln>
+        </p:spPr>
+        <p:style>
+          <a:lnRef idx="0">
+            <a:scrgbClr r="0" g="0" b="0"/>
+          </a:lnRef>
+          <a:fillRef idx="0">
+            <a:scrgbClr r="0" g="0" b="0"/>
+          </a:fillRef>
+          <a:effectRef idx="0">
+            <a:scrgbClr r="0" g="0" b="0"/>
+          </a:effectRef>
+          <a:fontRef idx="minor"/>
+        </p:style>
+        <p:txBody>
+          <a:bodyPr wrap="none" lIns="63337" tIns="31668" rIns="63337" bIns="31668" anchor="t">
+            <a:spAutoFit/>
+          </a:bodyPr>
+          <a:lstStyle/>
+          <a:p>
+            <a:pPr>
+              <a:lnSpc>
+                <a:spcPct val="100000"/>
+              </a:lnSpc>
+              <a:buNone/>
+            </a:pPr>
+            <a:r>
+              <a:rPr lang="en-GB" sz="1689" b="1" spc="-1" dirty="0">
+                <a:solidFill>
+                  <a:srgbClr val="000000"/>
+                </a:solidFill>
+                <a:latin typeface="Arial"/>
+              </a:rPr>
+              <a:t>c</a:t>
+            </a:r>
+            <a:endParaRPr lang="en-GB" sz="1689" spc="-1" dirty="0">
+              <a:latin typeface="Arial"/>
+            </a:endParaRPr>
+          </a:p>
+        </p:txBody>
+      </p:sp>
     </p:spTree>
   </p:cSld>
-  <mc:AlternateContent>
-    <mc:Choice Requires="p14">
-      <p:transition spd="slow" p14:dur="2000"/>
-    </mc:Choice>
-    <mc:Fallback>
-      <p:transition spd="slow"/>
-    </mc:Fallback>
-  </mc:AlternateContent>
+  <p:clrMapOvr>
+    <a:masterClrMapping/>
+  </p:clrMapOvr>
 </p:sld>
 </file>
 
@@ -3815,34 +4524,34 @@
         <a:sysClr val="window" lastClr="FFFFFF"/>
       </a:lt1>
       <a:dk2>
-        <a:srgbClr val="44546a"/>
+        <a:srgbClr val="44546A"/>
       </a:dk2>
       <a:lt2>
-        <a:srgbClr val="e7e6e6"/>
+        <a:srgbClr val="E7E6E6"/>
       </a:lt2>
       <a:accent1>
-        <a:srgbClr val="4472c4"/>
+        <a:srgbClr val="4472C4"/>
       </a:accent1>
       <a:accent2>
-        <a:srgbClr val="ed7d31"/>
+        <a:srgbClr val="ED7D31"/>
       </a:accent2>
       <a:accent3>
-        <a:srgbClr val="a5a5a5"/>
+        <a:srgbClr val="A5A5A5"/>
       </a:accent3>
       <a:accent4>
-        <a:srgbClr val="ffc000"/>
+        <a:srgbClr val="FFC000"/>
       </a:accent4>
       <a:accent5>
-        <a:srgbClr val="5b9bd5"/>
+        <a:srgbClr val="5B9BD5"/>
       </a:accent5>
       <a:accent6>
-        <a:srgbClr val="70ad47"/>
+        <a:srgbClr val="70AD47"/>
       </a:accent6>
       <a:hlink>
-        <a:srgbClr val="0563c1"/>
+        <a:srgbClr val="0563C1"/>
       </a:hlink>
       <a:folHlink>
-        <a:srgbClr val="954f72"/>
+        <a:srgbClr val="954F72"/>
       </a:folHlink>
     </a:clrScheme>
     <a:fontScheme name="Office">
@@ -4027,6 +4736,8 @@
       </a:bgFillStyleLst>
     </a:fmtScheme>
   </a:themeElements>
+  <a:objectDefaults/>
+  <a:extraClrSchemeLst/>
 </a:theme>
 </file>
 
@@ -4041,34 +4752,34 @@
         <a:sysClr val="window" lastClr="FFFFFF"/>
       </a:lt1>
       <a:dk2>
-        <a:srgbClr val="44546a"/>
+        <a:srgbClr val="44546A"/>
       </a:dk2>
       <a:lt2>
-        <a:srgbClr val="e7e6e6"/>
+        <a:srgbClr val="E7E6E6"/>
       </a:lt2>
       <a:accent1>
-        <a:srgbClr val="4472c4"/>
+        <a:srgbClr val="4472C4"/>
       </a:accent1>
       <a:accent2>
-        <a:srgbClr val="ed7d31"/>
+        <a:srgbClr val="ED7D31"/>
       </a:accent2>
       <a:accent3>
-        <a:srgbClr val="a5a5a5"/>
+        <a:srgbClr val="A5A5A5"/>
       </a:accent3>
       <a:accent4>
-        <a:srgbClr val="ffc000"/>
+        <a:srgbClr val="FFC000"/>
       </a:accent4>
       <a:accent5>
-        <a:srgbClr val="5b9bd5"/>
+        <a:srgbClr val="5B9BD5"/>
       </a:accent5>
       <a:accent6>
-        <a:srgbClr val="70ad47"/>
+        <a:srgbClr val="70AD47"/>
       </a:accent6>
       <a:hlink>
-        <a:srgbClr val="0563c1"/>
+        <a:srgbClr val="0563C1"/>
       </a:hlink>
       <a:folHlink>
-        <a:srgbClr val="954f72"/>
+        <a:srgbClr val="954F72"/>
       </a:folHlink>
     </a:clrScheme>
     <a:fontScheme name="Office">
@@ -4253,5 +4964,7 @@
       </a:bgFillStyleLst>
     </a:fmtScheme>
   </a:themeElements>
+  <a:objectDefaults/>
+  <a:extraClrSchemeLst/>
 </a:theme>
 </file>
</xml_diff>